<commit_message>
Delete Photon Server Renewal
- Light PPT Data Update

- Delete resource data
</commit_message>
<xml_diff>
--- a/Assets/Class/Light/PPT Data/Light Example.pptx
+++ b/Assets/Class/Light/PPT Data/Light Example.pptx
@@ -2,23 +2,23 @@
 <file path=ppt/presentation.xml><?xml version="1.0" encoding="utf-8"?>
 <p:presentation xmlns:a="http://schemas.openxmlformats.org/drawingml/2006/main" xmlns:r="http://schemas.openxmlformats.org/officeDocument/2006/relationships" xmlns:p="http://schemas.openxmlformats.org/presentationml/2006/main" xmlns:p14="http://schemas.microsoft.com/office/powerpoint/2010/main" saveSubsetFonts="1" firstSlideNum="0">
   <p:sldMasterIdLst>
-    <p:sldMasterId id="2147485977" r:id="rId12"/>
+    <p:sldMasterId id="2147485987" r:id="rId12"/>
   </p:sldMasterIdLst>
   <p:notesMasterIdLst>
     <p:notesMasterId r:id="rId14"/>
   </p:notesMasterIdLst>
   <p:sldIdLst>
     <p:sldId id="287" r:id="rId16"/>
-    <p:sldId id="315" r:id="rId18"/>
-    <p:sldId id="316" r:id="rId20"/>
-    <p:sldId id="317" r:id="rId21"/>
+    <p:sldId id="315" r:id="rId17"/>
+    <p:sldId id="316" r:id="rId19"/>
+    <p:sldId id="317" r:id="rId20"/>
     <p:sldId id="294" r:id="rId22"/>
     <p:sldId id="299" r:id="rId23"/>
-    <p:sldId id="307" r:id="rId25"/>
-    <p:sldId id="308" r:id="rId27"/>
-    <p:sldId id="310" r:id="rId29"/>
-    <p:sldId id="311" r:id="rId31"/>
-    <p:sldId id="313" r:id="rId33"/>
+    <p:sldId id="318" r:id="rId24"/>
+    <p:sldId id="310" r:id="rId25"/>
+    <p:sldId id="308" r:id="rId26"/>
+    <p:sldId id="311" r:id="rId27"/>
+    <p:sldId id="313" r:id="rId29"/>
   </p:sldIdLst>
   <p:sldSz cx="12192000" cy="6858000"/>
   <p:notesSz cx="6858000" cy="9144000"/>
@@ -1643,7 +1643,7 @@
         <p:spPr>
           <a:xfrm rot="0">
             <a:off x="685800" y="1143000"/>
-            <a:ext cx="5492750" cy="3092450"/>
+            <a:ext cx="5491480" cy="3091180"/>
           </a:xfrm>
           <a:prstGeom prst="rect"/>
           <a:noFill/>
@@ -1682,7 +1682,7 @@
         <p:spPr>
           <a:xfrm rot="0">
             <a:off x="685800" y="4400550"/>
-            <a:ext cx="5492750" cy="3606800"/>
+            <a:ext cx="5491480" cy="3605530"/>
           </a:xfrm>
           <a:prstGeom prst="rect"/>
         </p:spPr>
@@ -1712,7 +1712,7 @@
         <p:spPr>
           <a:xfrm rot="0">
             <a:off x="3884930" y="8685530"/>
-            <a:ext cx="2978150" cy="464820"/>
+            <a:ext cx="2976880" cy="463550"/>
           </a:xfrm>
           <a:prstGeom prst="rect"/>
         </p:spPr>
@@ -1785,7 +1785,7 @@
         <p:spPr>
           <a:xfrm rot="0">
             <a:off x="685800" y="1143000"/>
-            <a:ext cx="5492750" cy="3092450"/>
+            <a:ext cx="5493385" cy="3093085"/>
           </a:xfrm>
           <a:prstGeom prst="rect"/>
           <a:noFill/>
@@ -1824,7 +1824,7 @@
         <p:spPr>
           <a:xfrm rot="0">
             <a:off x="685800" y="4400550"/>
-            <a:ext cx="5492750" cy="3606800"/>
+            <a:ext cx="5493385" cy="3607435"/>
           </a:xfrm>
           <a:prstGeom prst="rect"/>
         </p:spPr>
@@ -1854,7 +1854,7 @@
         <p:spPr>
           <a:xfrm rot="0">
             <a:off x="3884930" y="8685530"/>
-            <a:ext cx="2978150" cy="464820"/>
+            <a:ext cx="2978785" cy="465455"/>
           </a:xfrm>
           <a:prstGeom prst="rect"/>
         </p:spPr>
@@ -1927,7 +1927,7 @@
         <p:spPr>
           <a:xfrm rot="0">
             <a:off x="685800" y="1143000"/>
-            <a:ext cx="5493385" cy="3093085"/>
+            <a:ext cx="5492750" cy="3092450"/>
           </a:xfrm>
           <a:prstGeom prst="rect"/>
           <a:noFill/>
@@ -1966,7 +1966,7 @@
         <p:spPr>
           <a:xfrm rot="0">
             <a:off x="685800" y="4400550"/>
-            <a:ext cx="5493385" cy="3607435"/>
+            <a:ext cx="5492750" cy="3606800"/>
           </a:xfrm>
           <a:prstGeom prst="rect"/>
         </p:spPr>
@@ -1996,7 +1996,7 @@
         <p:spPr>
           <a:xfrm rot="0">
             <a:off x="3884930" y="8685530"/>
-            <a:ext cx="2978785" cy="465455"/>
+            <a:ext cx="2978150" cy="464820"/>
           </a:xfrm>
           <a:prstGeom prst="rect"/>
         </p:spPr>
@@ -7208,7 +7208,7 @@
       </p:sp>
       <p:pic>
         <p:nvPicPr>
-          <p:cNvPr id="1138" name="그림 1" descr="C:/Users/Admin1/AppData/Roaming/PolarisOffice/ETemp/2796_7928192/fImage159531766827.png"/>
+          <p:cNvPr id="1138" name="그림 1"/>
           <p:cNvPicPr>
             <a:picLocks noChangeAspect="1"/>
           </p:cNvPicPr>
@@ -7239,7 +7239,7 @@
       </p:pic>
       <p:pic>
         <p:nvPicPr>
-          <p:cNvPr id="1139" name="그림 5" descr="C:/Users/Admin1/AppData/Roaming/PolarisOffice/ETemp/2796_7928192/fImage441636241.png"/>
+          <p:cNvPr id="1139" name="그림 5"/>
           <p:cNvPicPr>
             <a:picLocks noChangeAspect="1"/>
           </p:cNvPicPr>
@@ -7270,7 +7270,7 @@
       </p:pic>
       <p:pic>
         <p:nvPicPr>
-          <p:cNvPr id="1140" name="그림 13" descr="C:/Users/Admin1/AppData/Roaming/PolarisOffice/ETemp/2796_7928192/fImage130273758467.png"/>
+          <p:cNvPr id="1140" name="그림 13"/>
           <p:cNvPicPr>
             <a:picLocks noChangeAspect="1"/>
           </p:cNvPicPr>
@@ -7301,17 +7301,17 @@
       </p:pic>
       <p:pic>
         <p:nvPicPr>
-          <p:cNvPr id="1141" name="그림 16" descr="C:/Users/Admin1/AppData/Roaming/PolarisOffice/ETemp/2796_7928192/fImage127673766334.png"/>
+          <p:cNvPr id="1141" name="그림 16" descr="C:/Users/Admin1/AppData/Roaming/PolarisOffice/ETemp/10232_14344976/fImage127673766334.png"/>
           <p:cNvPicPr>
             <a:picLocks noChangeAspect="1"/>
           </p:cNvPicPr>
           <p:nvPr/>
         </p:nvPicPr>
         <p:blipFill rotWithShape="1">
-          <a:blip r:embed="rId30" cstate="print">
+          <a:blip r:embed="rId30" cstate="hqprint">
             <a:extLst>
               <a:ext uri="{28A0092B-C50C-407E-A947-70E740481C1C}">
-                <a14:useLocalDpi xmlns:a14="http://schemas.microsoft.com/office/drawing/2010/main" val="0"/>
+                <a14:useLocalDpi xmlns:a14="http://schemas.microsoft.com/office/drawing/2010/main"/>
               </a:ext>
             </a:extLst>
           </a:blip>
@@ -7322,7 +7322,7 @@
         <p:spPr>
           <a:xfrm rot="0">
             <a:off x="6824980" y="3830320"/>
-            <a:ext cx="4140835" cy="1416050"/>
+            <a:ext cx="4141470" cy="1519555"/>
           </a:xfrm>
           <a:prstGeom prst="roundRect"/>
           <a:solidFill>
@@ -8829,8 +8829,8 @@
         </p:nvSpPr>
         <p:spPr>
           <a:xfrm rot="0">
-            <a:off x="1240790" y="2668270"/>
-            <a:ext cx="4135755" cy="1231900"/>
+            <a:off x="1240790" y="2651125"/>
+            <a:ext cx="4136390" cy="1232535"/>
           </a:xfrm>
           <a:prstGeom prst="rect"/>
           <a:noFill/>
@@ -9095,7 +9095,7 @@
       </p:sp>
       <p:pic>
         <p:nvPicPr>
-          <p:cNvPr id="1150" name="그림 34" descr="C:/Users/Admin1/AppData/Roaming/PolarisOffice/ETemp/8668_11011536/fImage158423979358.png"/>
+          <p:cNvPr id="1150" name="그림 34" descr="C:/Users/Admin1/AppData/Roaming/PolarisOffice/ETemp/10232_14344976/fImage158423979358.png"/>
           <p:cNvPicPr>
             <a:picLocks noChangeAspect="1"/>
           </p:cNvPicPr>
@@ -9116,7 +9116,7 @@
         <p:spPr>
           <a:xfrm rot="0">
             <a:off x="1240790" y="4030980"/>
-            <a:ext cx="4135755" cy="1310640"/>
+            <a:ext cx="4136390" cy="1327150"/>
           </a:xfrm>
           <a:prstGeom prst="roundRect"/>
           <a:solidFill>
@@ -9126,7 +9126,7 @@
       </p:pic>
       <p:pic>
         <p:nvPicPr>
-          <p:cNvPr id="1151" name="그림 40" descr="C:/Users/Admin1/AppData/Roaming/PolarisOffice/ETemp/8668_11011536/fImage232114126962.png"/>
+          <p:cNvPr id="1151" name="그림 40"/>
           <p:cNvPicPr>
             <a:picLocks noChangeAspect="1"/>
           </p:cNvPicPr>
@@ -9262,7 +9262,14 @@
                 <a:latin typeface="맑은 고딕" charset="0"/>
                 <a:ea typeface="맑은 고딕" charset="0"/>
               </a:rPr>
-              <a:t>하위 오브젝트로 Light에 </a:t>
+              <a:t>하위</a:t>
+            </a:r>
+            <a:r>
+              <a:rPr lang="ko-KR" sz="1800">
+                <a:latin typeface="맑은 고딕" charset="0"/>
+                <a:ea typeface="맑은 고딕" charset="0"/>
+              </a:rPr>
+              <a:t> 오브젝트로 Light에 </a:t>
             </a:r>
             <a:r>
               <a:rPr lang="ko-KR" sz="1800">
@@ -9276,7 +9283,14 @@
                 <a:latin typeface="맑은 고딕" charset="0"/>
                 <a:ea typeface="맑은 고딕" charset="0"/>
               </a:rPr>
-              <a:t> Light를 생성합니다.</a:t>
+              <a:t> Light를 </a:t>
+            </a:r>
+            <a:r>
+              <a:rPr lang="ko-KR" sz="1800">
+                <a:latin typeface="맑은 고딕" charset="0"/>
+                <a:ea typeface="맑은 고딕" charset="0"/>
+              </a:rPr>
+              <a:t>생성합니다.</a:t>
             </a:r>
             <a:endParaRPr lang="ko-KR" altLang="en-US" sz="1800">
               <a:latin typeface="맑은 고딕" charset="0"/>
@@ -9287,7 +9301,7 @@
       </p:sp>
       <p:pic>
         <p:nvPicPr>
-          <p:cNvPr id="1154" name="그림 8" descr="C:/Users/Admin1/AppData/Roaming/PolarisOffice/ETemp/8668_11011536/fImage22421721541.png"/>
+          <p:cNvPr id="1154" name="그림 8"/>
           <p:cNvPicPr>
             <a:picLocks noChangeAspect="1"/>
           </p:cNvPicPr>
@@ -10156,7 +10170,7 @@
         <p:spPr>
           <a:xfrm rot="0">
             <a:off x="1238885" y="5273675"/>
-            <a:ext cx="4137025" cy="954405"/>
+            <a:ext cx="4154170" cy="954405"/>
           </a:xfrm>
           <a:prstGeom prst="rect"/>
           <a:noFill/>
@@ -10183,7 +10197,7 @@
                 <a:latin typeface="맑은 고딕" charset="0"/>
                 <a:ea typeface="맑은 고딕" charset="0"/>
               </a:rPr>
-              <a:t>1</a:t>
+              <a:t>12.</a:t>
             </a:r>
             <a:r>
               <a:rPr lang="ko-KR" sz="2000" b="1">
@@ -10193,26 +10207,6 @@
                 <a:latin typeface="맑은 고딕" charset="0"/>
                 <a:ea typeface="맑은 고딕" charset="0"/>
               </a:rPr>
-              <a:t>2</a:t>
-            </a:r>
-            <a:r>
-              <a:rPr lang="ko-KR" sz="2000" b="1">
-                <a:solidFill>
-                  <a:srgbClr val="0611F2"/>
-                </a:solidFill>
-                <a:latin typeface="맑은 고딕" charset="0"/>
-                <a:ea typeface="맑은 고딕" charset="0"/>
-              </a:rPr>
-              <a:t>.</a:t>
-            </a:r>
-            <a:r>
-              <a:rPr lang="ko-KR" sz="2000" b="1">
-                <a:solidFill>
-                  <a:srgbClr val="0611F2"/>
-                </a:solidFill>
-                <a:latin typeface="맑은 고딕" charset="0"/>
-                <a:ea typeface="맑은 고딕" charset="0"/>
-              </a:rPr>
               <a:t> </a:t>
             </a:r>
             <a:r>
@@ -10248,56 +10242,21 @@
                 <a:latin typeface="맑은 고딕" charset="0"/>
                 <a:ea typeface="맑은 고딕" charset="0"/>
               </a:rPr>
-              <a:t> </a:t>
-            </a:r>
-            <a:r>
-              <a:rPr lang="ko-KR" sz="1800">
-                <a:latin typeface="맑은 고딕" charset="0"/>
-                <a:ea typeface="맑은 고딕" charset="0"/>
-              </a:rPr>
-              <a:t>오브젝트로</a:t>
-            </a:r>
-            <a:r>
-              <a:rPr lang="ko-KR" sz="1800">
-                <a:latin typeface="맑은 고딕" charset="0"/>
-                <a:ea typeface="맑은 고딕" charset="0"/>
-              </a:rPr>
-              <a:t> Light에 </a:t>
-            </a:r>
-            <a:r>
-              <a:rPr lang="ko-KR" sz="1800">
-                <a:latin typeface="맑은 고딕" charset="0"/>
-                <a:ea typeface="맑은 고딕" charset="0"/>
-              </a:rPr>
-              <a:t>P</a:t>
-            </a:r>
-            <a:r>
-              <a:rPr lang="ko-KR" sz="1800">
-                <a:latin typeface="맑은 고딕" charset="0"/>
-                <a:ea typeface="맑은 고딕" charset="0"/>
-              </a:rPr>
-              <a:t>oint</a:t>
-            </a:r>
-            <a:r>
-              <a:rPr lang="ko-KR" sz="1800">
-                <a:latin typeface="맑은 고딕" charset="0"/>
-                <a:ea typeface="맑은 고딕" charset="0"/>
-              </a:rPr>
-              <a:t> </a:t>
-            </a:r>
-            <a:r>
-              <a:rPr lang="ko-KR" sz="1800">
-                <a:latin typeface="맑은 고딕" charset="0"/>
-                <a:ea typeface="맑은 고딕" charset="0"/>
-              </a:rPr>
-              <a:t>Light를</a:t>
-            </a:r>
-            <a:r>
-              <a:rPr lang="ko-KR" sz="1800">
-                <a:latin typeface="맑은 고딕" charset="0"/>
-                <a:ea typeface="맑은 고딕" charset="0"/>
-              </a:rPr>
-              <a:t> </a:t>
+              <a:t> 오브젝트로 Light에 </a:t>
+            </a:r>
+            <a:r>
+              <a:rPr lang="ko-KR" sz="1800">
+                <a:latin typeface="맑은 고딕" charset="0"/>
+                <a:ea typeface="맑은 고딕" charset="0"/>
+              </a:rPr>
+              <a:t>Point</a:t>
+            </a:r>
+            <a:r>
+              <a:rPr lang="ko-KR" sz="1800">
+                <a:latin typeface="맑은 고딕" charset="0"/>
+                <a:ea typeface="맑은 고딕" charset="0"/>
+              </a:rPr>
+              <a:t> Light를 </a:t>
             </a:r>
             <a:r>
               <a:rPr lang="ko-KR" sz="1800">
@@ -10315,7 +10274,7 @@
       </p:sp>
       <p:pic>
         <p:nvPicPr>
-          <p:cNvPr id="1136" name="그림 15" descr="C:/Users/Admin1/AppData/Roaming/PolarisOffice/ETemp/8668_11011536/fImage115991459169.png"/>
+          <p:cNvPr id="1136" name="그림 15"/>
           <p:cNvPicPr>
             <a:picLocks noChangeAspect="1"/>
           </p:cNvPicPr>
@@ -10346,7 +10305,7 @@
       </p:pic>
       <p:pic>
         <p:nvPicPr>
-          <p:cNvPr id="1141" name="그림 14" descr="C:/Users/Admin1/AppData/Roaming/PolarisOffice/ETemp/8668_11011536/fImage83402199169.png"/>
+          <p:cNvPr id="1141" name="그림 14"/>
           <p:cNvPicPr>
             <a:picLocks noChangeAspect="1"/>
           </p:cNvPicPr>
@@ -10377,7 +10336,7 @@
       </p:pic>
       <p:pic>
         <p:nvPicPr>
-          <p:cNvPr id="1142" name="그림 17" descr="C:/Users/Admin1/AppData/Roaming/PolarisOffice/ETemp/8668_11011536/fImage2437361564464.png"/>
+          <p:cNvPr id="1142" name="그림 17"/>
           <p:cNvPicPr>
             <a:picLocks noChangeAspect="1"/>
           </p:cNvPicPr>
@@ -10506,7 +10465,7 @@
       </p:sp>
       <p:pic>
         <p:nvPicPr>
-          <p:cNvPr id="1144" name="그림 19" descr="C:/Users/Admin1/AppData/Roaming/PolarisOffice/ETemp/8668_11011536/fImage125702225724.png"/>
+          <p:cNvPr id="1144" name="그림 19"/>
           <p:cNvPicPr>
             <a:picLocks noChangeAspect="1"/>
           </p:cNvPicPr>
@@ -10697,8 +10656,8 @@
         </p:nvSpPr>
         <p:spPr>
           <a:xfrm rot="0">
-            <a:off x="4500245" y="327660"/>
-            <a:ext cx="3190240" cy="554990"/>
+            <a:off x="4427855" y="318770"/>
+            <a:ext cx="3323590" cy="478155"/>
           </a:xfrm>
           <a:prstGeom prst="rect"/>
           <a:noFill/>
@@ -10713,34 +10672,148 @@
           </a:bodyPr>
           <a:lstStyle/>
           <a:p>
-            <a:pPr marL="0" indent="0" algn="l" latinLnBrk="0">
-              <a:buFontTx/>
-              <a:buNone/>
-            </a:pPr>
-            <a:r>
-              <a:rPr lang="ko-KR" altLang="en-US" sz="3000" b="1">
+            <a:pPr marL="0" indent="0" algn="ctr" latinLnBrk="0">
+              <a:buFontTx/>
+              <a:buNone/>
+            </a:pPr>
+            <a:r>
+              <a:rPr lang="ko-KR" altLang="en-US" sz="2500" b="1">
                 <a:solidFill>
                   <a:schemeClr val="tx1"/>
                 </a:solidFill>
-                <a:latin typeface="맑은 고딕" charset="0"/>
-                <a:ea typeface="맑은 고딕" charset="0"/>
-              </a:rPr>
-              <a:t>네</a:t>
-            </a:r>
-            <a:r>
-              <a:rPr lang="ko-KR" altLang="en-US" sz="3000" b="1">
+                <a:latin typeface="나눔바른고딕" charset="0"/>
+                <a:ea typeface="나눔바른고딕" charset="0"/>
+              </a:rPr>
+              <a:t>여섯</a:t>
+            </a:r>
+            <a:r>
+              <a:rPr lang="ko-KR" altLang="en-US" sz="2500" b="1">
                 <a:solidFill>
                   <a:schemeClr val="tx1"/>
                 </a:solidFill>
-                <a:latin typeface="맑은 고딕" charset="0"/>
-                <a:ea typeface="맑은 고딕" charset="0"/>
-              </a:rPr>
-              <a:t> 번째 튜토리얼</a:t>
-            </a:r>
-            <a:endParaRPr lang="ko-KR" altLang="en-US" sz="3000" b="1">
+                <a:latin typeface="나눔바른고딕" charset="0"/>
+                <a:ea typeface="나눔바른고딕" charset="0"/>
+              </a:rPr>
+              <a:t> </a:t>
+            </a:r>
+            <a:r>
+              <a:rPr lang="ko-KR" altLang="en-US" sz="2500" b="1">
+                <a:solidFill>
+                  <a:schemeClr val="tx1"/>
+                </a:solidFill>
+                <a:latin typeface="나눔바른고딕" charset="0"/>
+                <a:ea typeface="나눔바른고딕" charset="0"/>
+              </a:rPr>
+              <a:t>번째 튜토리</a:t>
+            </a:r>
+            <a:r>
+              <a:rPr lang="ko-KR" altLang="en-US" sz="2500" b="1">
+                <a:solidFill>
+                  <a:schemeClr val="tx1"/>
+                </a:solidFill>
+                <a:latin typeface="나눔바른고딕" charset="0"/>
+                <a:ea typeface="나눔바른고딕" charset="0"/>
+              </a:rPr>
+              <a:t>얼</a:t>
+            </a:r>
+            <a:endParaRPr lang="ko-KR" altLang="en-US" sz="2500" b="1">
               <a:solidFill>
                 <a:schemeClr val="tx1"/>
               </a:solidFill>
+              <a:latin typeface="나눔바른고딕" charset="0"/>
+              <a:ea typeface="나눔바른고딕" charset="0"/>
+            </a:endParaRPr>
+          </a:p>
+        </p:txBody>
+      </p:sp>
+      <p:sp>
+        <p:nvSpPr>
+          <p:cNvPr id="1158" name="텍스트 상자 66"/>
+          <p:cNvSpPr txBox="1">
+            <a:spLocks/>
+          </p:cNvSpPr>
+          <p:nvPr/>
+        </p:nvSpPr>
+        <p:spPr>
+          <a:xfrm rot="0">
+            <a:off x="1231265" y="5481955"/>
+            <a:ext cx="4144645" cy="704215"/>
+          </a:xfrm>
+          <a:prstGeom prst="rect"/>
+          <a:noFill/>
+        </p:spPr>
+        <p:txBody>
+          <a:bodyPr wrap="square" lIns="0" tIns="0" rIns="0" bIns="0" numCol="1" vert="horz" anchor="t">
+            <a:noAutofit/>
+          </a:bodyPr>
+          <a:lstStyle/>
+          <a:p>
+            <a:pPr marL="0" indent="0" algn="l" latinLnBrk="0" hangingPunct="1">
+              <a:buFontTx/>
+              <a:buNone/>
+            </a:pPr>
+            <a:r>
+              <a:rPr lang="ko-KR" sz="2000" b="1">
+                <a:solidFill>
+                  <a:srgbClr val="0611F2"/>
+                </a:solidFill>
+                <a:latin typeface="맑은 고딕" charset="0"/>
+                <a:ea typeface="맑은 고딕" charset="0"/>
+              </a:rPr>
+              <a:t>1</a:t>
+            </a:r>
+            <a:r>
+              <a:rPr lang="ko-KR" sz="2000" b="1">
+                <a:solidFill>
+                  <a:srgbClr val="0611F2"/>
+                </a:solidFill>
+                <a:latin typeface="맑은 고딕" charset="0"/>
+                <a:ea typeface="맑은 고딕" charset="0"/>
+              </a:rPr>
+              <a:t>5</a:t>
+            </a:r>
+            <a:r>
+              <a:rPr lang="ko-KR" sz="2000" b="1">
+                <a:solidFill>
+                  <a:srgbClr val="0611F2"/>
+                </a:solidFill>
+                <a:latin typeface="맑은 고딕" charset="0"/>
+                <a:ea typeface="맑은 고딕" charset="0"/>
+              </a:rPr>
+              <a:t>.</a:t>
+            </a:r>
+            <a:r>
+              <a:rPr lang="ko-KR" sz="2000" b="1">
+                <a:solidFill>
+                  <a:srgbClr val="0611F2"/>
+                </a:solidFill>
+                <a:latin typeface="맑은 고딕" charset="0"/>
+                <a:ea typeface="맑은 고딕" charset="0"/>
+              </a:rPr>
+              <a:t> </a:t>
+            </a:r>
+            <a:r>
+              <a:rPr lang="ko-KR" sz="1800">
+                <a:latin typeface="맑은 고딕" charset="0"/>
+                <a:ea typeface="맑은 고딕" charset="0"/>
+              </a:rPr>
+              <a:t>그다음 Area Light 오브젝트의 </a:t>
+            </a:r>
+            <a:r>
+              <a:rPr lang="ko-KR" sz="1800">
+                <a:latin typeface="맑은 고딕" charset="0"/>
+                <a:ea typeface="맑은 고딕" charset="0"/>
+              </a:rPr>
+              <a:t>위치와</a:t>
+            </a:r>
+            <a:r>
+              <a:rPr lang="ko-KR" sz="1800">
+                <a:latin typeface="맑은 고딕" charset="0"/>
+                <a:ea typeface="맑은 고딕" charset="0"/>
+              </a:rPr>
+              <a:t> 회전 값을 설정합니다.</a:t>
+            </a:r>
+            <a:endParaRPr lang="ko-KR" altLang="en-US" sz="1800">
               <a:latin typeface="맑은 고딕" charset="0"/>
               <a:ea typeface="맑은 고딕" charset="0"/>
             </a:endParaRPr>
@@ -10749,14 +10822,14 @@
       </p:sp>
       <p:pic>
         <p:nvPicPr>
-          <p:cNvPr id="1153" name="그림 57"/>
+          <p:cNvPr id="1161" name="그림 1" descr="C:/Users/Admin1/AppData/Roaming/PolarisOffice/ETemp/10232_14344976/fImage827216841.png"/>
           <p:cNvPicPr>
             <a:picLocks noChangeAspect="1"/>
           </p:cNvPicPr>
           <p:nvPr/>
         </p:nvPicPr>
         <p:blipFill rotWithShape="1">
-          <a:blip r:embed="rId9" cstate="print">
+          <a:blip r:embed="rId13" cstate="print">
             <a:extLst>
               <a:ext uri="{28A0092B-C50C-407E-A947-70E740481C1C}">
                 <a14:useLocalDpi xmlns:a14="http://schemas.microsoft.com/office/drawing/2010/main" val="0"/>
@@ -10769,8 +10842,8 @@
         </p:blipFill>
         <p:spPr>
           <a:xfrm rot="0">
-            <a:off x="2751455" y="1204595"/>
-            <a:ext cx="2619375" cy="1106805"/>
+            <a:off x="1231265" y="1455420"/>
+            <a:ext cx="1397000" cy="1103630"/>
           </a:xfrm>
           <a:prstGeom prst="roundRect"/>
           <a:solidFill>
@@ -10780,14 +10853,190 @@
       </p:pic>
       <p:pic>
         <p:nvPicPr>
-          <p:cNvPr id="1154" name="그림 60"/>
+          <p:cNvPr id="1162" name="그림 4" descr="C:/Users/Admin1/AppData/Roaming/PolarisOffice/ETemp/10232_14344976/fImage92243935724.png"/>
           <p:cNvPicPr>
             <a:picLocks noChangeAspect="1"/>
           </p:cNvPicPr>
           <p:nvPr/>
         </p:nvPicPr>
         <p:blipFill rotWithShape="1">
-          <a:blip r:embed="rId10" cstate="print">
+          <a:blip r:embed="rId14" cstate="hqprint">
+            <a:extLst>
+              <a:ext uri="{28A0092B-C50C-407E-A947-70E740481C1C}">
+                <a14:useLocalDpi xmlns:a14="http://schemas.microsoft.com/office/drawing/2010/main"/>
+              </a:ext>
+            </a:extLst>
+          </a:blip>
+          <a:stretch>
+            <a:fillRect/>
+          </a:stretch>
+        </p:blipFill>
+        <p:spPr>
+          <a:xfrm rot="0">
+            <a:off x="2739390" y="1463040"/>
+            <a:ext cx="2627630" cy="1096645"/>
+          </a:xfrm>
+          <a:prstGeom prst="roundRect"/>
+          <a:solidFill>
+            <a:srgbClr val="EDEDED"/>
+          </a:solidFill>
+        </p:spPr>
+      </p:pic>
+      <p:pic>
+        <p:nvPicPr>
+          <p:cNvPr id="1163" name="그림 5" descr="C:/Users/Admin1/AppData/Roaming/PolarisOffice/ETemp/10232_14344976/fImage22421721541.png"/>
+          <p:cNvPicPr>
+            <a:picLocks noChangeAspect="1"/>
+          </p:cNvPicPr>
+          <p:nvPr/>
+        </p:nvPicPr>
+        <p:blipFill rotWithShape="1">
+          <a:blip r:embed="rId15" cstate="hqprint">
+            <a:extLst>
+              <a:ext uri="{28A0092B-C50C-407E-A947-70E740481C1C}">
+                <a14:useLocalDpi xmlns:a14="http://schemas.microsoft.com/office/drawing/2010/main"/>
+              </a:ext>
+            </a:extLst>
+          </a:blip>
+          <a:stretch>
+            <a:fillRect/>
+          </a:stretch>
+        </p:blipFill>
+        <p:spPr>
+          <a:xfrm rot="10800000">
+            <a:off x="2316480" y="1835150"/>
+            <a:ext cx="625475" cy="351790"/>
+          </a:xfrm>
+          <a:prstGeom prst="rect"/>
+          <a:noFill/>
+        </p:spPr>
+      </p:pic>
+      <p:sp>
+        <p:nvSpPr>
+          <p:cNvPr id="1164" name="텍스트 상자 6"/>
+          <p:cNvSpPr txBox="1">
+            <a:spLocks/>
+          </p:cNvSpPr>
+          <p:nvPr/>
+        </p:nvSpPr>
+        <p:spPr>
+          <a:xfrm rot="0">
+            <a:off x="1234440" y="2673985"/>
+            <a:ext cx="4132580" cy="1138555"/>
+          </a:xfrm>
+          <a:prstGeom prst="rect"/>
+          <a:noFill/>
+        </p:spPr>
+        <p:txBody>
+          <a:bodyPr wrap="square" lIns="0" tIns="0" rIns="0" bIns="0" vert="horz" anchor="t">
+            <a:noAutofit/>
+          </a:bodyPr>
+          <a:lstStyle/>
+          <a:p>
+            <a:pPr marL="0" indent="0" algn="l" latinLnBrk="0" hangingPunct="1">
+              <a:buFontTx/>
+              <a:buNone/>
+            </a:pPr>
+            <a:r>
+              <a:rPr lang="ko-KR" sz="2000" b="1">
+                <a:solidFill>
+                  <a:srgbClr val="0611F2"/>
+                </a:solidFill>
+                <a:latin typeface="맑은 고딕" charset="0"/>
+                <a:ea typeface="맑은 고딕" charset="0"/>
+              </a:rPr>
+              <a:t>14.</a:t>
+            </a:r>
+            <a:r>
+              <a:rPr lang="ko-KR" sz="2000" b="1">
+                <a:solidFill>
+                  <a:srgbClr val="0611F2"/>
+                </a:solidFill>
+                <a:latin typeface="맑은 고딕" charset="0"/>
+                <a:ea typeface="맑은 고딕" charset="0"/>
+              </a:rPr>
+              <a:t> </a:t>
+            </a:r>
+            <a:r>
+              <a:rPr lang="ko-KR" sz="1800">
+                <a:latin typeface="맑은 고딕" charset="0"/>
+                <a:ea typeface="맑은 고딕" charset="0"/>
+              </a:rPr>
+              <a:t>그런 다음 Project 폴더에 있는 </a:t>
+            </a:r>
+            <a:r>
+              <a:rPr lang="ko-KR" sz="1800">
+                <a:latin typeface="맑은 고딕" charset="0"/>
+                <a:ea typeface="맑은 고딕" charset="0"/>
+              </a:rPr>
+              <a:t>Model</a:t>
+            </a:r>
+            <a:r>
+              <a:rPr lang="ko-KR" sz="1800">
+                <a:latin typeface="맑은 고딕" charset="0"/>
+                <a:ea typeface="맑은 고딕" charset="0"/>
+              </a:rPr>
+              <a:t> 폴더에 Street Lamp를 월드 </a:t>
+            </a:r>
+            <a:r>
+              <a:rPr lang="ko-KR" sz="1800">
+                <a:latin typeface="맑은 고딕" charset="0"/>
+                <a:ea typeface="맑은 고딕" charset="0"/>
+              </a:rPr>
+              <a:t>공간에</a:t>
+            </a:r>
+            <a:r>
+              <a:rPr lang="ko-KR" sz="1800">
+                <a:latin typeface="맑은 고딕" charset="0"/>
+                <a:ea typeface="맑은 고딕" charset="0"/>
+              </a:rPr>
+              <a:t> 배치하고 Area Street </a:t>
+            </a:r>
+            <a:r>
+              <a:rPr lang="ko-KR" sz="1800">
+                <a:latin typeface="맑은 고딕" charset="0"/>
+                <a:ea typeface="맑은 고딕" charset="0"/>
+              </a:rPr>
+              <a:t>Lamp라는</a:t>
+            </a:r>
+            <a:r>
+              <a:rPr lang="ko-KR" sz="1800">
+                <a:latin typeface="맑은 고딕" charset="0"/>
+                <a:ea typeface="맑은 고딕" charset="0"/>
+              </a:rPr>
+              <a:t> </a:t>
+            </a:r>
+            <a:r>
+              <a:rPr lang="ko-KR" sz="1800">
+                <a:latin typeface="맑은 고딕" charset="0"/>
+                <a:ea typeface="맑은 고딕" charset="0"/>
+              </a:rPr>
+              <a:t>이름으로</a:t>
+            </a:r>
+            <a:r>
+              <a:rPr lang="ko-KR" sz="1800">
+                <a:latin typeface="맑은 고딕" charset="0"/>
+                <a:ea typeface="맑은 고딕" charset="0"/>
+              </a:rPr>
+              <a:t> 정의합니다.</a:t>
+            </a:r>
+            <a:endParaRPr lang="ko-KR" altLang="en-US" sz="1800">
+              <a:latin typeface="맑은 고딕" charset="0"/>
+              <a:ea typeface="맑은 고딕" charset="0"/>
+            </a:endParaRPr>
+          </a:p>
+        </p:txBody>
+      </p:sp>
+      <p:pic>
+        <p:nvPicPr>
+          <p:cNvPr id="1166" name="그림 10" descr="C:/Users/Admin1/AppData/Roaming/PolarisOffice/ETemp/10232_14344976/fImage161391738467.png"/>
+          <p:cNvPicPr>
+            <a:picLocks noChangeAspect="1"/>
+          </p:cNvPicPr>
+          <p:nvPr/>
+        </p:nvPicPr>
+        <p:blipFill rotWithShape="1">
+          <a:blip r:embed="rId16" cstate="print">
             <a:extLst>
               <a:ext uri="{28A0092B-C50C-407E-A947-70E740481C1C}">
                 <a14:useLocalDpi xmlns:a14="http://schemas.microsoft.com/office/drawing/2010/main" val="0"/>
@@ -10800,8 +11049,8 @@
         </p:blipFill>
         <p:spPr>
           <a:xfrm rot="0">
-            <a:off x="1328420" y="1205865"/>
-            <a:ext cx="1290955" cy="1089025"/>
+            <a:off x="1231900" y="3985895"/>
+            <a:ext cx="4144010" cy="1363980"/>
           </a:xfrm>
           <a:prstGeom prst="roundRect"/>
           <a:solidFill>
@@ -10809,119 +11058,16 @@
           </a:solidFill>
         </p:spPr>
       </p:pic>
-      <p:cxnSp>
-        <p:nvCxnSpPr>
-          <p:cNvPr id="1155" name="도형 61"/>
-          <p:cNvCxnSpPr/>
-          <p:nvPr/>
-        </p:nvCxnSpPr>
-        <p:spPr>
-          <a:xfrm rot="0" flipH="1">
-            <a:off x="2028190" y="1845310"/>
-            <a:ext cx="865505" cy="366395"/>
-          </a:xfrm>
-          <a:prstGeom prst="straightConnector1"/>
-          <a:ln w="6350" cap="flat" cmpd="sng">
-            <a:prstDash/>
-            <a:headEnd type="none" w="med" len="med"/>
-            <a:tailEnd type="triangle" w="med" len="med"/>
-          </a:ln>
-        </p:spPr>
-        <p:style>
-          <a:lnRef idx="1">
-            <a:schemeClr val="accent1"/>
-          </a:lnRef>
-          <a:fillRef idx="0">
-            <a:schemeClr val="accent1"/>
-          </a:fillRef>
-          <a:effectRef idx="0">
-            <a:schemeClr val="accent1"/>
-          </a:effectRef>
-          <a:fontRef idx="minor">
-            <a:schemeClr val="tx1"/>
-          </a:fontRef>
-        </p:style>
-      </p:cxnSp>
-      <p:sp>
-        <p:nvSpPr>
-          <p:cNvPr id="1156" name="텍스트 상자 62"/>
-          <p:cNvSpPr txBox="1">
-            <a:spLocks/>
-          </p:cNvSpPr>
-          <p:nvPr/>
-        </p:nvSpPr>
-        <p:spPr>
-          <a:xfrm rot="0">
-            <a:off x="1341755" y="2458720"/>
-            <a:ext cx="4029075" cy="941705"/>
-          </a:xfrm>
-          <a:prstGeom prst="rect"/>
-          <a:noFill/>
-        </p:spPr>
-        <p:txBody>
-          <a:bodyPr wrap="square" lIns="0" tIns="0" rIns="0" bIns="0" numCol="1" vert="horz" anchor="t">
-            <a:noAutofit/>
-          </a:bodyPr>
-          <a:lstStyle/>
-          <a:p>
-            <a:pPr marL="0" indent="0" algn="l" latinLnBrk="0" hangingPunct="1">
-              <a:buFontTx/>
-              <a:buNone/>
-            </a:pPr>
-            <a:r>
-              <a:rPr lang="ko-KR" sz="2000" b="1">
-                <a:solidFill>
-                  <a:srgbClr val="0611F2"/>
-                </a:solidFill>
-                <a:latin typeface="맑은 고딕" charset="0"/>
-                <a:ea typeface="맑은 고딕" charset="0"/>
-              </a:rPr>
-              <a:t>9</a:t>
-            </a:r>
-            <a:r>
-              <a:rPr lang="ko-KR" sz="2000" b="1">
-                <a:solidFill>
-                  <a:srgbClr val="0611F2"/>
-                </a:solidFill>
-                <a:latin typeface="맑은 고딕" charset="0"/>
-                <a:ea typeface="맑은 고딕" charset="0"/>
-              </a:rPr>
-              <a:t>. </a:t>
-            </a:r>
-            <a:r>
-              <a:rPr lang="ko-KR" sz="1800">
-                <a:latin typeface="맑은 고딕" charset="0"/>
-                <a:ea typeface="맑은 고딕" charset="0"/>
-              </a:rPr>
-              <a:t>이제 Project 폴더에 있는 Texture 폴더에 Road 텍스처를 선택하고 Floor 오브젝트에 넣어줍니다.</a:t>
-            </a:r>
-            <a:endParaRPr lang="ko-KR" altLang="en-US" sz="1800">
-              <a:latin typeface="맑은 고딕" charset="0"/>
-              <a:ea typeface="맑은 고딕" charset="0"/>
-            </a:endParaRPr>
-          </a:p>
-          <a:p>
-            <a:pPr marL="0" indent="0" algn="l" latinLnBrk="0" hangingPunct="1">
-              <a:buFontTx/>
-              <a:buNone/>
-            </a:pPr>
-            <a:endParaRPr lang="ko-KR" altLang="en-US" sz="1800">
-              <a:latin typeface="맑은 고딕" charset="0"/>
-              <a:ea typeface="맑은 고딕" charset="0"/>
-            </a:endParaRPr>
-          </a:p>
-        </p:txBody>
-      </p:sp>
       <p:pic>
         <p:nvPicPr>
-          <p:cNvPr id="1157" name="그림 63"/>
+          <p:cNvPr id="1167" name="그림 13" descr="C:/Users/Admin1/AppData/Roaming/PolarisOffice/ETemp/10232_14344976/fImage174022586334.png"/>
           <p:cNvPicPr>
             <a:picLocks noChangeAspect="1"/>
           </p:cNvPicPr>
           <p:nvPr/>
         </p:nvPicPr>
         <p:blipFill rotWithShape="1">
-          <a:blip r:embed="rId11" cstate="print">
+          <a:blip r:embed="rId17" cstate="print">
             <a:extLst>
               <a:ext uri="{28A0092B-C50C-407E-A947-70E740481C1C}">
                 <a14:useLocalDpi xmlns:a14="http://schemas.microsoft.com/office/drawing/2010/main" val="0"/>
@@ -10934,8 +11080,8 @@
         </p:blipFill>
         <p:spPr>
           <a:xfrm rot="0">
-            <a:off x="1334135" y="3549650"/>
-            <a:ext cx="4053205" cy="1754505"/>
+            <a:off x="6813550" y="1456055"/>
+            <a:ext cx="2791460" cy="3583305"/>
           </a:xfrm>
           <a:prstGeom prst="roundRect"/>
           <a:solidFill>
@@ -10943,76 +11089,16 @@
           </a:solidFill>
         </p:spPr>
       </p:pic>
-      <p:sp>
-        <p:nvSpPr>
-          <p:cNvPr id="1158" name="텍스트 상자 66"/>
-          <p:cNvSpPr txBox="1">
-            <a:spLocks/>
-          </p:cNvSpPr>
-          <p:nvPr/>
-        </p:nvSpPr>
-        <p:spPr>
-          <a:xfrm rot="0">
-            <a:off x="1322070" y="5481955"/>
-            <a:ext cx="4029075" cy="703580"/>
-          </a:xfrm>
-          <a:prstGeom prst="rect"/>
-          <a:noFill/>
-        </p:spPr>
-        <p:txBody>
-          <a:bodyPr wrap="square" lIns="0" tIns="0" rIns="0" bIns="0" numCol="1" vert="horz" anchor="t">
-            <a:noAutofit/>
-          </a:bodyPr>
-          <a:lstStyle/>
-          <a:p>
-            <a:pPr marL="0" indent="0" algn="l" latinLnBrk="0" hangingPunct="1">
-              <a:buFontTx/>
-              <a:buNone/>
-            </a:pPr>
-            <a:r>
-              <a:rPr lang="ko-KR" sz="2000" b="1">
-                <a:solidFill>
-                  <a:srgbClr val="0611F2"/>
-                </a:solidFill>
-                <a:latin typeface="맑은 고딕" charset="0"/>
-                <a:ea typeface="맑은 고딕" charset="0"/>
-              </a:rPr>
-              <a:t>10</a:t>
-            </a:r>
-            <a:r>
-              <a:rPr lang="ko-KR" sz="2000" b="1">
-                <a:solidFill>
-                  <a:srgbClr val="0611F2"/>
-                </a:solidFill>
-                <a:latin typeface="맑은 고딕" charset="0"/>
-                <a:ea typeface="맑은 고딕" charset="0"/>
-              </a:rPr>
-              <a:t>. </a:t>
-            </a:r>
-            <a:r>
-              <a:rPr lang="ko-KR" sz="1800">
-                <a:latin typeface="맑은 고딕" charset="0"/>
-                <a:ea typeface="맑은 고딕" charset="0"/>
-              </a:rPr>
-              <a:t>그다음으로 Character 오브젝트의 위치를 변경합니다.</a:t>
-            </a:r>
-            <a:endParaRPr lang="ko-KR" altLang="en-US" sz="1800">
-              <a:latin typeface="맑은 고딕" charset="0"/>
-              <a:ea typeface="맑은 고딕" charset="0"/>
-            </a:endParaRPr>
-          </a:p>
-        </p:txBody>
-      </p:sp>
       <p:pic>
         <p:nvPicPr>
-          <p:cNvPr id="1159" name="그림 1"/>
+          <p:cNvPr id="1168" name="그림 16" descr="C:/Users/Admin1/AppData/Roaming/PolarisOffice/ETemp/10232_14344976/fImage93402596500.png"/>
           <p:cNvPicPr>
             <a:picLocks noChangeAspect="1"/>
           </p:cNvPicPr>
           <p:nvPr/>
         </p:nvPicPr>
         <p:blipFill rotWithShape="1">
-          <a:blip r:embed="rId12" cstate="print">
+          <a:blip r:embed="rId18" cstate="print">
             <a:extLst>
               <a:ext uri="{28A0092B-C50C-407E-A947-70E740481C1C}">
                 <a14:useLocalDpi xmlns:a14="http://schemas.microsoft.com/office/drawing/2010/main" val="0"/>
@@ -11025,16 +11111,18 @@
         </p:blipFill>
         <p:spPr>
           <a:xfrm rot="0">
-            <a:off x="6806565" y="1198880"/>
-            <a:ext cx="4022725" cy="3861435"/>
-          </a:xfrm>
-          <a:prstGeom prst="rect"/>
-          <a:noFill/>
+            <a:off x="9733915" y="2350770"/>
+            <a:ext cx="1223645" cy="1784350"/>
+          </a:xfrm>
+          <a:prstGeom prst="roundRect"/>
+          <a:solidFill>
+            <a:srgbClr val="EDEDED"/>
+          </a:solidFill>
         </p:spPr>
       </p:pic>
       <p:sp>
         <p:nvSpPr>
-          <p:cNvPr id="1160" name="텍스트 상자 4"/>
+          <p:cNvPr id="1169" name="텍스트 상자 19"/>
           <p:cNvSpPr txBox="1">
             <a:spLocks/>
           </p:cNvSpPr>
@@ -11042,15 +11130,19 @@
         </p:nvSpPr>
         <p:spPr>
           <a:xfrm rot="0">
-            <a:off x="6807835" y="5224780"/>
-            <a:ext cx="4012565" cy="959485"/>
+            <a:off x="6800850" y="5226685"/>
+            <a:ext cx="4156710" cy="954405"/>
           </a:xfrm>
           <a:prstGeom prst="rect"/>
           <a:noFill/>
-        </p:spPr>
-        <p:txBody>
-          <a:bodyPr wrap="square" lIns="0" tIns="0" rIns="0" bIns="0" numCol="1" vert="horz" anchor="t">
-            <a:noAutofit/>
+          <a:ln w="0">
+            <a:noFill/>
+            <a:prstDash/>
+          </a:ln>
+        </p:spPr>
+        <p:txBody>
+          <a:bodyPr wrap="square" lIns="89535" tIns="46355" rIns="89535" bIns="46355" numCol="1" vert="horz" anchor="t">
+            <a:spAutoFit/>
           </a:bodyPr>
           <a:lstStyle/>
           <a:p>
@@ -11076,7 +11168,7 @@
                 <a:latin typeface="맑은 고딕" charset="0"/>
                 <a:ea typeface="맑은 고딕" charset="0"/>
               </a:rPr>
-              <a:t>1</a:t>
+              <a:t>6</a:t>
             </a:r>
             <a:r>
               <a:rPr lang="ko-KR" sz="2000" b="1">
@@ -11086,21 +11178,87 @@
                 <a:latin typeface="맑은 고딕" charset="0"/>
                 <a:ea typeface="맑은 고딕" charset="0"/>
               </a:rPr>
-              <a:t>. </a:t>
-            </a:r>
-            <a:r>
-              <a:rPr lang="ko-KR" sz="1800">
-                <a:latin typeface="맑은 고딕" charset="0"/>
-                <a:ea typeface="맑은 고딕" charset="0"/>
-              </a:rPr>
-              <a:t>그</a:t>
-            </a:r>
-            <a:r>
-              <a:rPr lang="ko-KR" sz="1800">
-                <a:latin typeface="맑은 고딕" charset="0"/>
-                <a:ea typeface="맑은 고딕" charset="0"/>
-              </a:rPr>
-              <a:t>런 다음 Window에서 Rendering을 선택하고 Lighting Settings를 선택합니다. </a:t>
+              <a:t>.</a:t>
+            </a:r>
+            <a:r>
+              <a:rPr lang="ko-KR" sz="2000" b="1">
+                <a:solidFill>
+                  <a:srgbClr val="0611F2"/>
+                </a:solidFill>
+                <a:latin typeface="맑은 고딕" charset="0"/>
+                <a:ea typeface="맑은 고딕" charset="0"/>
+              </a:rPr>
+              <a:t> </a:t>
+            </a:r>
+            <a:r>
+              <a:rPr lang="ko-KR" sz="1800">
+                <a:latin typeface="맑은 고딕" charset="0"/>
+                <a:ea typeface="맑은 고딕" charset="0"/>
+              </a:rPr>
+              <a:t>그러고 나서 Area Street Lamp </a:t>
+            </a:r>
+            <a:r>
+              <a:rPr lang="ko-KR" sz="1800">
+                <a:latin typeface="맑은 고딕" charset="0"/>
+                <a:ea typeface="맑은 고딕" charset="0"/>
+              </a:rPr>
+              <a:t>오브젝트의</a:t>
+            </a:r>
+            <a:r>
+              <a:rPr lang="ko-KR" sz="1800">
+                <a:latin typeface="맑은 고딕" charset="0"/>
+                <a:ea typeface="맑은 고딕" charset="0"/>
+              </a:rPr>
+              <a:t> </a:t>
+            </a:r>
+            <a:r>
+              <a:rPr lang="ko-KR" sz="1800">
+                <a:latin typeface="맑은 고딕" charset="0"/>
+                <a:ea typeface="맑은 고딕" charset="0"/>
+              </a:rPr>
+              <a:t>하위</a:t>
+            </a:r>
+            <a:r>
+              <a:rPr lang="ko-KR" sz="1800">
+                <a:latin typeface="맑은 고딕" charset="0"/>
+                <a:ea typeface="맑은 고딕" charset="0"/>
+              </a:rPr>
+              <a:t> 오브젝트로 Light에 </a:t>
+            </a:r>
+            <a:r>
+              <a:rPr lang="ko-KR" sz="1800">
+                <a:latin typeface="맑은 고딕" charset="0"/>
+                <a:ea typeface="맑은 고딕" charset="0"/>
+              </a:rPr>
+              <a:t>Area</a:t>
+            </a:r>
+            <a:r>
+              <a:rPr lang="ko-KR" sz="1800">
+                <a:latin typeface="맑은 고딕" charset="0"/>
+                <a:ea typeface="맑은 고딕" charset="0"/>
+              </a:rPr>
+              <a:t> </a:t>
+            </a:r>
+            <a:r>
+              <a:rPr lang="ko-KR" sz="1800">
+                <a:latin typeface="맑은 고딕" charset="0"/>
+                <a:ea typeface="맑은 고딕" charset="0"/>
+              </a:rPr>
+              <a:t>Light를</a:t>
+            </a:r>
+            <a:r>
+              <a:rPr lang="ko-KR" sz="1800">
+                <a:latin typeface="맑은 고딕" charset="0"/>
+                <a:ea typeface="맑은 고딕" charset="0"/>
+              </a:rPr>
+              <a:t> </a:t>
+            </a:r>
+            <a:r>
+              <a:rPr lang="ko-KR" sz="1800">
+                <a:latin typeface="맑은 고딕" charset="0"/>
+                <a:ea typeface="맑은 고딕" charset="0"/>
+              </a:rPr>
+              <a:t>생성합니다.</a:t>
             </a:r>
             <a:endParaRPr lang="ko-KR" altLang="en-US" sz="1800">
               <a:latin typeface="맑은 고딕" charset="0"/>
@@ -11133,7 +11291,7 @@
 </file>
 
 <file path=ppt/slides/slide7.xml><?xml version="1.0" encoding="utf-8"?>
-<p:sld xmlns:a="http://schemas.openxmlformats.org/drawingml/2006/main" xmlns:r="http://schemas.openxmlformats.org/officeDocument/2006/relationships" xmlns:p="http://schemas.openxmlformats.org/presentationml/2006/main" xmlns:p14="http://schemas.microsoft.com/office/powerpoint/2010/main">
+<p:sld xmlns:a="http://schemas.openxmlformats.org/drawingml/2006/main" xmlns:r="http://schemas.openxmlformats.org/officeDocument/2006/relationships" xmlns:p="http://schemas.openxmlformats.org/presentationml/2006/main">
   <p:cSld>
     <p:spTree>
       <p:nvGrpSpPr>
@@ -11159,8 +11317,8 @@
         </p:nvSpPr>
         <p:spPr>
           <a:xfrm rot="0">
-            <a:off x="4292600" y="318770"/>
-            <a:ext cx="3613150" cy="554990"/>
+            <a:off x="4427855" y="318770"/>
+            <a:ext cx="3323590" cy="478155"/>
           </a:xfrm>
           <a:prstGeom prst="rect"/>
           <a:noFill/>
@@ -11175,53 +11333,63 @@
           </a:bodyPr>
           <a:lstStyle/>
           <a:p>
-            <a:pPr marL="0" indent="0" algn="l" latinLnBrk="0">
-              <a:buFontTx/>
-              <a:buNone/>
-            </a:pPr>
-            <a:r>
-              <a:rPr lang="ko-KR" altLang="en-US" sz="3000" b="1">
+            <a:pPr marL="0" indent="0" algn="ctr" latinLnBrk="0">
+              <a:buFontTx/>
+              <a:buNone/>
+            </a:pPr>
+            <a:r>
+              <a:rPr lang="ko-KR" altLang="en-US" sz="2500" b="1">
                 <a:solidFill>
                   <a:schemeClr val="tx1"/>
                 </a:solidFill>
-                <a:latin typeface="맑은 고딕" charset="0"/>
-                <a:ea typeface="맑은 고딕" charset="0"/>
-              </a:rPr>
-              <a:t>열</a:t>
-            </a:r>
-            <a:r>
-              <a:rPr lang="ko-KR" altLang="en-US" sz="3000" b="1">
+                <a:latin typeface="나눔바른고딕" charset="0"/>
+                <a:ea typeface="나눔바른고딕" charset="0"/>
+              </a:rPr>
+              <a:t>일곱</a:t>
+            </a:r>
+            <a:r>
+              <a:rPr lang="ko-KR" altLang="en-US" sz="2500" b="1">
                 <a:solidFill>
                   <a:schemeClr val="tx1"/>
                 </a:solidFill>
-                <a:latin typeface="맑은 고딕" charset="0"/>
-                <a:ea typeface="맑은 고딕" charset="0"/>
-              </a:rPr>
-              <a:t>두</a:t>
-            </a:r>
-            <a:r>
-              <a:rPr lang="ko-KR" altLang="en-US" sz="3000" b="1">
+                <a:latin typeface="나눔바른고딕" charset="0"/>
+                <a:ea typeface="나눔바른고딕" charset="0"/>
+              </a:rPr>
+              <a:t> </a:t>
+            </a:r>
+            <a:r>
+              <a:rPr lang="ko-KR" altLang="en-US" sz="2500" b="1">
                 <a:solidFill>
                   <a:schemeClr val="tx1"/>
                 </a:solidFill>
-                <a:latin typeface="맑은 고딕" charset="0"/>
-                <a:ea typeface="맑은 고딕" charset="0"/>
-              </a:rPr>
-              <a:t> 번째 튜토리얼</a:t>
-            </a:r>
-            <a:endParaRPr lang="ko-KR" altLang="en-US" sz="3000" b="1">
+                <a:latin typeface="나눔바른고딕" charset="0"/>
+                <a:ea typeface="나눔바른고딕" charset="0"/>
+              </a:rPr>
+              <a:t>번째 튜토리</a:t>
+            </a:r>
+            <a:r>
+              <a:rPr lang="ko-KR" altLang="en-US" sz="2500" b="1">
+                <a:solidFill>
+                  <a:schemeClr val="tx1"/>
+                </a:solidFill>
+                <a:latin typeface="나눔바른고딕" charset="0"/>
+                <a:ea typeface="나눔바른고딕" charset="0"/>
+              </a:rPr>
+              <a:t>얼</a:t>
+            </a:r>
+            <a:endParaRPr lang="ko-KR" altLang="en-US" sz="2500" b="1">
               <a:solidFill>
                 <a:schemeClr val="tx1"/>
               </a:solidFill>
-              <a:latin typeface="맑은 고딕" charset="0"/>
-              <a:ea typeface="맑은 고딕" charset="0"/>
+              <a:latin typeface="나눔바른고딕" charset="0"/>
+              <a:ea typeface="나눔바른고딕" charset="0"/>
             </a:endParaRPr>
           </a:p>
         </p:txBody>
       </p:sp>
       <p:sp>
         <p:nvSpPr>
-          <p:cNvPr id="1200" name="Rect 0"/>
+          <p:cNvPr id="1160" name="Rect 0"/>
           <p:cNvSpPr txBox="1">
             <a:spLocks/>
           </p:cNvSpPr>
@@ -11229,8 +11397,8 @@
         </p:nvSpPr>
         <p:spPr>
           <a:xfrm rot="0">
-            <a:off x="1310005" y="2571750"/>
-            <a:ext cx="4059555" cy="646430"/>
+            <a:off x="1231900" y="5233035"/>
+            <a:ext cx="4126865" cy="960120"/>
           </a:xfrm>
           <a:prstGeom prst="rect"/>
           <a:noFill/>
@@ -11241,42 +11409,40 @@
           </a:bodyPr>
           <a:lstStyle/>
           <a:p>
-            <a:pPr marL="0" indent="0" rtl="0" algn="l" defTabSz="914400" eaLnBrk="1" latinLnBrk="0" hangingPunct="1">
-              <a:buFontTx/>
-              <a:buNone/>
-            </a:pPr>
-            <a:r>
-              <a:rPr sz="1800" b="1">
-                <a:solidFill>
-                  <a:srgbClr val="0611F2"/>
-                </a:solidFill>
-                <a:latin typeface="맑은 고딕" charset="0"/>
-                <a:ea typeface="맑은 고딕" charset="0"/>
-              </a:rPr>
-              <a:t>2</a:t>
-            </a:r>
-            <a:r>
-              <a:rPr lang="ko-KR" sz="1800" b="1">
-                <a:solidFill>
-                  <a:srgbClr val="0611F2"/>
-                </a:solidFill>
-                <a:latin typeface="맑은 고딕" charset="0"/>
-                <a:ea typeface="맑은 고딕" charset="0"/>
-              </a:rPr>
-              <a:t>9</a:t>
-            </a:r>
-            <a:r>
-              <a:rPr sz="1800" b="1">
-                <a:solidFill>
-                  <a:srgbClr val="0611F2"/>
-                </a:solidFill>
-                <a:latin typeface="맑은 고딕" charset="0"/>
-                <a:ea typeface="맑은 고딕" charset="0"/>
-              </a:rPr>
-              <a:t>.</a:t>
-            </a:r>
-            <a:r>
-              <a:rPr sz="1800">
+            <a:pPr marL="0" indent="0" algn="l" latinLnBrk="0" hangingPunct="1">
+              <a:buFontTx/>
+              <a:buNone/>
+            </a:pPr>
+            <a:r>
+              <a:rPr lang="ko-KR" sz="1800">
+                <a:latin typeface="맑은 고딕" charset="0"/>
+                <a:ea typeface="맑은 고딕" charset="0"/>
+              </a:rPr>
+              <a:t>A</a:t>
+            </a:r>
+            <a:r>
+              <a:rPr lang="ko-KR" sz="1800">
+                <a:latin typeface="맑은 고딕" charset="0"/>
+                <a:ea typeface="맑은 고딕" charset="0"/>
+              </a:rPr>
+              <a:t>rea</a:t>
+            </a:r>
+            <a:r>
+              <a:rPr lang="ko-KR" sz="1800">
+                <a:latin typeface="맑은 고딕" charset="0"/>
+                <a:ea typeface="맑은 고딕" charset="0"/>
+              </a:rPr>
+              <a:t> Light는 전체 표면 영역에 의해 </a:t>
+            </a:r>
+            <a:r>
+              <a:rPr lang="ko-KR" sz="1800">
+                <a:latin typeface="맑은 고딕" charset="0"/>
+                <a:ea typeface="맑은 고딕" charset="0"/>
+              </a:rPr>
+              <a:t>모든</a:t>
+            </a:r>
+            <a:r>
+              <a:rPr lang="ko-KR" sz="1800">
                 <a:latin typeface="맑은 고딕" charset="0"/>
                 <a:ea typeface="맑은 고딕" charset="0"/>
               </a:rPr>
@@ -11287,18 +11453,186 @@
                 <a:latin typeface="맑은 고딕" charset="0"/>
                 <a:ea typeface="맑은 고딕" charset="0"/>
               </a:rPr>
-              <a:t>이제 Bulb 오브젝트의 위치와 회전 값을 설정합니다.</a:t>
+              <a:t>방향으로 사각형의 한 쪽 면에서만 </a:t>
+            </a:r>
+            <a:r>
+              <a:rPr lang="ko-KR" sz="1800">
+                <a:latin typeface="맑은 고딕" charset="0"/>
+                <a:ea typeface="맑은 고딕" charset="0"/>
+              </a:rPr>
+              <a:t>발사하</a:t>
+            </a:r>
+            <a:r>
+              <a:rPr lang="ko-KR" sz="1800">
+                <a:latin typeface="맑은 고딕" charset="0"/>
+                <a:ea typeface="맑은 고딕" charset="0"/>
+              </a:rPr>
+              <a:t>는</a:t>
+            </a:r>
+            <a:r>
+              <a:rPr lang="ko-KR" sz="1800">
+                <a:latin typeface="맑은 고딕" charset="0"/>
+                <a:ea typeface="맑은 고딕" charset="0"/>
+              </a:rPr>
+              <a:t> 조명입니다.</a:t>
             </a:r>
             <a:endParaRPr lang="ko-KR" altLang="en-US" sz="1800">
               <a:latin typeface="맑은 고딕" charset="0"/>
               <a:ea typeface="맑은 고딕" charset="0"/>
             </a:endParaRPr>
           </a:p>
+        </p:txBody>
+      </p:sp>
+      <p:pic>
+        <p:nvPicPr>
+          <p:cNvPr id="1165" name="Picture " descr="C:/Users/Admin1/AppData/Roaming/PolarisOffice/ETemp/10232_14344976/fImage89212539169.png"/>
+          <p:cNvPicPr>
+            <a:picLocks noChangeAspect="1"/>
+          </p:cNvPicPr>
+          <p:nvPr/>
+        </p:nvPicPr>
+        <p:blipFill rotWithShape="1">
+          <a:blip r:embed="rId2" cstate="print">
+            <a:extLst>
+              <a:ext uri="{28A0092B-C50C-407E-A947-70E740481C1C}">
+                <a14:useLocalDpi xmlns:a14="http://schemas.microsoft.com/office/drawing/2010/main" val="0"/>
+              </a:ext>
+            </a:extLst>
+          </a:blip>
+          <a:stretch>
+            <a:fillRect/>
+          </a:stretch>
+        </p:blipFill>
+        <p:spPr>
+          <a:xfrm rot="0">
+            <a:off x="1231900" y="3677920"/>
+            <a:ext cx="4135120" cy="1387475"/>
+          </a:xfrm>
+          <a:prstGeom prst="roundRect"/>
+          <a:solidFill>
+            <a:srgbClr val="EDEDED"/>
+          </a:solidFill>
+        </p:spPr>
+      </p:pic>
+      <p:sp>
+        <p:nvSpPr>
+          <p:cNvPr id="1166" name="텍스트 상자 20"/>
+          <p:cNvSpPr txBox="1">
+            <a:spLocks/>
+          </p:cNvSpPr>
+          <p:nvPr/>
+        </p:nvSpPr>
+        <p:spPr>
+          <a:xfrm rot="0">
+            <a:off x="1240790" y="2880995"/>
+            <a:ext cx="4119245" cy="677545"/>
+          </a:xfrm>
+          <a:prstGeom prst="rect"/>
+          <a:noFill/>
+          <a:ln w="0">
+            <a:noFill/>
+            <a:prstDash/>
+          </a:ln>
+        </p:spPr>
+        <p:txBody>
+          <a:bodyPr wrap="square" lIns="89535" tIns="46355" rIns="89535" bIns="46355" numCol="1" vert="horz" anchor="t">
+            <a:spAutoFit/>
+          </a:bodyPr>
+          <a:lstStyle/>
           <a:p>
             <a:pPr marL="0" indent="0" algn="l" latinLnBrk="0" hangingPunct="1">
               <a:buFontTx/>
               <a:buNone/>
             </a:pPr>
+            <a:r>
+              <a:rPr lang="ko-KR" sz="2000" b="1">
+                <a:solidFill>
+                  <a:srgbClr val="0611F2"/>
+                </a:solidFill>
+                <a:latin typeface="맑은 고딕" charset="0"/>
+                <a:ea typeface="맑은 고딕" charset="0"/>
+              </a:rPr>
+              <a:t>1</a:t>
+            </a:r>
+            <a:r>
+              <a:rPr lang="ko-KR" sz="2000" b="1">
+                <a:solidFill>
+                  <a:srgbClr val="0611F2"/>
+                </a:solidFill>
+                <a:latin typeface="맑은 고딕" charset="0"/>
+                <a:ea typeface="맑은 고딕" charset="0"/>
+              </a:rPr>
+              <a:t>7</a:t>
+            </a:r>
+            <a:r>
+              <a:rPr lang="ko-KR" sz="2000" b="1">
+                <a:solidFill>
+                  <a:srgbClr val="0611F2"/>
+                </a:solidFill>
+                <a:latin typeface="맑은 고딕" charset="0"/>
+                <a:ea typeface="맑은 고딕" charset="0"/>
+              </a:rPr>
+              <a:t>.</a:t>
+            </a:r>
+            <a:r>
+              <a:rPr lang="ko-KR" sz="2000" b="1">
+                <a:solidFill>
+                  <a:srgbClr val="0611F2"/>
+                </a:solidFill>
+                <a:latin typeface="맑은 고딕" charset="0"/>
+                <a:ea typeface="맑은 고딕" charset="0"/>
+              </a:rPr>
+              <a:t> </a:t>
+            </a:r>
+            <a:r>
+              <a:rPr lang="ko-KR" sz="1800">
+                <a:latin typeface="맑은 고딕" charset="0"/>
+                <a:ea typeface="맑은 고딕" charset="0"/>
+              </a:rPr>
+              <a:t>이제 Area Light 오브젝트의 </a:t>
+            </a:r>
+            <a:r>
+              <a:rPr lang="ko-KR" sz="1800">
+                <a:latin typeface="맑은 고딕" charset="0"/>
+                <a:ea typeface="맑은 고딕" charset="0"/>
+              </a:rPr>
+              <a:t>위치와</a:t>
+            </a:r>
+            <a:r>
+              <a:rPr lang="ko-KR" sz="1800">
+                <a:latin typeface="맑은 고딕" charset="0"/>
+                <a:ea typeface="맑은 고딕" charset="0"/>
+              </a:rPr>
+              <a:t> </a:t>
+            </a:r>
+            <a:r>
+              <a:rPr lang="ko-KR" sz="1800">
+                <a:latin typeface="맑은 고딕" charset="0"/>
+                <a:ea typeface="맑은 고딕" charset="0"/>
+              </a:rPr>
+              <a:t>회전</a:t>
+            </a:r>
+            <a:r>
+              <a:rPr lang="ko-KR" sz="1800">
+                <a:latin typeface="맑은 고딕" charset="0"/>
+                <a:ea typeface="맑은 고딕" charset="0"/>
+              </a:rPr>
+              <a:t> </a:t>
+            </a:r>
+            <a:r>
+              <a:rPr lang="ko-KR" sz="1800">
+                <a:latin typeface="맑은 고딕" charset="0"/>
+                <a:ea typeface="맑은 고딕" charset="0"/>
+              </a:rPr>
+              <a:t>값을</a:t>
+            </a:r>
+            <a:r>
+              <a:rPr lang="ko-KR" sz="1800">
+                <a:latin typeface="맑은 고딕" charset="0"/>
+                <a:ea typeface="맑은 고딕" charset="0"/>
+              </a:rPr>
+              <a:t> 설정합니다.</a:t>
+            </a:r>
             <a:endParaRPr lang="ko-KR" altLang="en-US" sz="1800">
               <a:latin typeface="맑은 고딕" charset="0"/>
               <a:ea typeface="맑은 고딕" charset="0"/>
@@ -11308,7 +11642,7 @@
       </p:sp>
       <p:pic>
         <p:nvPicPr>
-          <p:cNvPr id="1204" name="그림 18"/>
+          <p:cNvPr id="1167" name="그림 22" descr="C:/Users/Admin1/AppData/Roaming/PolarisOffice/ETemp/10232_14344976/fImage125422635724.png"/>
           <p:cNvPicPr>
             <a:picLocks noChangeAspect="1"/>
           </p:cNvPicPr>
@@ -11328,8 +11662,8 @@
         </p:blipFill>
         <p:spPr>
           <a:xfrm rot="0">
-            <a:off x="1307465" y="3322320"/>
-            <a:ext cx="4055745" cy="2135505"/>
+            <a:off x="1231900" y="1435735"/>
+            <a:ext cx="4126865" cy="1346835"/>
           </a:xfrm>
           <a:prstGeom prst="roundRect"/>
           <a:solidFill>
@@ -11337,90 +11671,19 @@
           </a:solidFill>
         </p:spPr>
       </p:pic>
-      <p:sp>
-        <p:nvSpPr>
-          <p:cNvPr id="1205" name="텍스트 상자 21"/>
-          <p:cNvSpPr txBox="1">
-            <a:spLocks/>
-          </p:cNvSpPr>
-          <p:nvPr/>
-        </p:nvSpPr>
-        <p:spPr>
-          <a:xfrm rot="0">
-            <a:off x="1295400" y="5586095"/>
-            <a:ext cx="4069715" cy="647065"/>
-          </a:xfrm>
-          <a:prstGeom prst="rect"/>
-          <a:noFill/>
-          <a:ln w="0">
-            <a:noFill/>
-            <a:prstDash/>
-          </a:ln>
-        </p:spPr>
-        <p:txBody>
-          <a:bodyPr wrap="square" lIns="89535" tIns="46355" rIns="89535" bIns="46355" numCol="1" vert="horz" anchor="t">
-            <a:spAutoFit/>
-          </a:bodyPr>
-          <a:lstStyle/>
-          <a:p>
-            <a:pPr marL="0" indent="0" rtl="0" algn="l" defTabSz="914400" eaLnBrk="1" latinLnBrk="0" hangingPunct="1">
-              <a:buFontTx/>
-              <a:buNone/>
-            </a:pPr>
-            <a:r>
-              <a:rPr sz="1800" b="1">
-                <a:solidFill>
-                  <a:srgbClr val="0611F2"/>
-                </a:solidFill>
-                <a:latin typeface="맑은 고딕" charset="0"/>
-                <a:ea typeface="맑은 고딕" charset="0"/>
-              </a:rPr>
-              <a:t>30</a:t>
-            </a:r>
-            <a:r>
-              <a:rPr sz="1800" b="1">
-                <a:solidFill>
-                  <a:srgbClr val="0611F2"/>
-                </a:solidFill>
-                <a:latin typeface="맑은 고딕" charset="0"/>
-                <a:ea typeface="맑은 고딕" charset="0"/>
-              </a:rPr>
-              <a:t>.</a:t>
-            </a:r>
-            <a:r>
-              <a:rPr sz="1800">
-                <a:latin typeface="맑은 고딕" charset="0"/>
-                <a:ea typeface="맑은 고딕" charset="0"/>
-              </a:rPr>
-              <a:t> </a:t>
-            </a:r>
-            <a:r>
-              <a:rPr lang="ko-KR" sz="1800">
-                <a:latin typeface="맑은 고딕" charset="0"/>
-                <a:ea typeface="맑은 고딕" charset="0"/>
-              </a:rPr>
-              <a:t>그리고 Bulb 오브젝트의 Spot Angle과 Mode를 변경합니다.</a:t>
-            </a:r>
-            <a:endParaRPr lang="ko-KR" altLang="en-US" sz="1800">
-              <a:latin typeface="맑은 고딕" charset="0"/>
-              <a:ea typeface="맑은 고딕" charset="0"/>
-            </a:endParaRPr>
-          </a:p>
-        </p:txBody>
-      </p:sp>
       <p:pic>
         <p:nvPicPr>
-          <p:cNvPr id="1206" name="그림 25"/>
+          <p:cNvPr id="1168" name="그림 25" descr="C:/Users/Admin1/AppData/Roaming/PolarisOffice/ETemp/10232_14344976/fImage483792641478.png"/>
           <p:cNvPicPr>
             <a:picLocks noChangeAspect="1"/>
           </p:cNvPicPr>
           <p:nvPr/>
         </p:nvPicPr>
         <p:blipFill rotWithShape="1">
-          <a:blip r:embed="rId4" cstate="hqprint">
+          <a:blip r:embed="rId4" cstate="print">
             <a:extLst>
               <a:ext uri="{28A0092B-C50C-407E-A947-70E740481C1C}">
-                <a14:useLocalDpi xmlns:a14="http://schemas.microsoft.com/office/drawing/2010/main"/>
+                <a14:useLocalDpi xmlns:a14="http://schemas.microsoft.com/office/drawing/2010/main" val="0"/>
               </a:ext>
             </a:extLst>
           </a:blip>
@@ -11430,16 +11693,82 @@
         </p:blipFill>
         <p:spPr>
           <a:xfrm rot="0">
-            <a:off x="6806565" y="1198880"/>
-            <a:ext cx="4023360" cy="3999865"/>
-          </a:xfrm>
-          <a:prstGeom prst="rect"/>
-          <a:noFill/>
+            <a:off x="8295005" y="1438275"/>
+            <a:ext cx="2670810" cy="1215390"/>
+          </a:xfrm>
+          <a:prstGeom prst="roundRect"/>
+          <a:solidFill>
+            <a:srgbClr val="EDEDED"/>
+          </a:solidFill>
         </p:spPr>
       </p:pic>
-      <p:sp>
-        <p:nvSpPr>
-          <p:cNvPr id="1207" name="텍스트 상자 26"/>
+      <p:pic>
+        <p:nvPicPr>
+          <p:cNvPr id="1169" name="그림 30" descr="C:/Users/Admin1/AppData/Roaming/PolarisOffice/ETemp/10232_14344976/fImage80882679358.png"/>
+          <p:cNvPicPr>
+            <a:picLocks noChangeAspect="1"/>
+          </p:cNvPicPr>
+          <p:nvPr/>
+        </p:nvPicPr>
+        <p:blipFill rotWithShape="1">
+          <a:blip r:embed="rId5" cstate="print">
+            <a:extLst>
+              <a:ext uri="{28A0092B-C50C-407E-A947-70E740481C1C}">
+                <a14:useLocalDpi xmlns:a14="http://schemas.microsoft.com/office/drawing/2010/main" val="0"/>
+              </a:ext>
+            </a:extLst>
+          </a:blip>
+          <a:stretch>
+            <a:fillRect/>
+          </a:stretch>
+        </p:blipFill>
+        <p:spPr>
+          <a:xfrm rot="0">
+            <a:off x="6820535" y="1447165"/>
+            <a:ext cx="1329055" cy="1198245"/>
+          </a:xfrm>
+          <a:prstGeom prst="roundRect"/>
+          <a:solidFill>
+            <a:srgbClr val="EDEDED"/>
+          </a:solidFill>
+        </p:spPr>
+      </p:pic>
+      <p:cxnSp>
+        <p:nvCxnSpPr>
+          <p:cNvPr id="1170" name="도형 33"/>
+          <p:cNvCxnSpPr/>
+          <p:nvPr/>
+        </p:nvCxnSpPr>
+        <p:spPr>
+          <a:xfrm rot="0" flipH="1">
+            <a:off x="7743825" y="1920240"/>
+            <a:ext cx="1137920" cy="78740"/>
+          </a:xfrm>
+          <a:prstGeom prst="straightConnector1"/>
+          <a:ln w="6350" cap="flat" cmpd="sng">
+            <a:prstDash/>
+            <a:headEnd type="none" w="med" len="med"/>
+            <a:tailEnd type="triangle" w="med" len="med"/>
+          </a:ln>
+        </p:spPr>
+        <p:style>
+          <a:lnRef idx="1">
+            <a:schemeClr val="accent1"/>
+          </a:lnRef>
+          <a:fillRef idx="0">
+            <a:schemeClr val="accent1"/>
+          </a:fillRef>
+          <a:effectRef idx="0">
+            <a:schemeClr val="accent1"/>
+          </a:effectRef>
+          <a:fontRef idx="minor">
+            <a:schemeClr val="tx1"/>
+          </a:fontRef>
+        </p:style>
+      </p:cxnSp>
+      <p:sp>
+        <p:nvSpPr>
+          <p:cNvPr id="1171" name="텍스트 상자 34"/>
           <p:cNvSpPr txBox="1">
             <a:spLocks/>
           </p:cNvSpPr>
@@ -11447,15 +11776,19 @@
         </p:nvSpPr>
         <p:spPr>
           <a:xfrm rot="0">
-            <a:off x="6807835" y="5328920"/>
-            <a:ext cx="4013200" cy="907415"/>
+            <a:off x="6822440" y="2763520"/>
+            <a:ext cx="4152265" cy="954405"/>
           </a:xfrm>
           <a:prstGeom prst="rect"/>
           <a:noFill/>
-        </p:spPr>
-        <p:txBody>
-          <a:bodyPr wrap="square" lIns="0" tIns="0" rIns="0" bIns="0" numCol="1" vert="horz" anchor="t">
-            <a:noAutofit/>
+          <a:ln w="0">
+            <a:noFill/>
+            <a:prstDash/>
+          </a:ln>
+        </p:spPr>
+        <p:txBody>
+          <a:bodyPr wrap="square" lIns="89535" tIns="46355" rIns="89535" bIns="46355" numCol="1" vert="horz" anchor="t">
+            <a:spAutoFit/>
           </a:bodyPr>
           <a:lstStyle/>
           <a:p>
@@ -11471,7 +11804,7 @@
                 <a:latin typeface="맑은 고딕" charset="0"/>
                 <a:ea typeface="맑은 고딕" charset="0"/>
               </a:rPr>
-              <a:t>31</a:t>
+              <a:t>18.</a:t>
             </a:r>
             <a:r>
               <a:rPr lang="ko-KR" sz="2000" b="1">
@@ -11481,14 +11814,70 @@
                 <a:latin typeface="맑은 고딕" charset="0"/>
                 <a:ea typeface="맑은 고딕" charset="0"/>
               </a:rPr>
-              <a:t>. </a:t>
-            </a:r>
-            <a:r>
-              <a:rPr lang="ko-KR" sz="1800">
-                <a:latin typeface="맑은 고딕" charset="0"/>
-                <a:ea typeface="맑은 고딕" charset="0"/>
-              </a:rPr>
-              <a:t>그런 다음 Window에서 Rendering을 선택하고 Lighting Settings를 선택합니다. </a:t>
+              <a:t> </a:t>
+            </a:r>
+            <a:r>
+              <a:rPr lang="ko-KR" sz="1800">
+                <a:latin typeface="맑은 고딕" charset="0"/>
+                <a:ea typeface="맑은 고딕" charset="0"/>
+              </a:rPr>
+              <a:t>그리고 Project 폴더 아래에 있는 </a:t>
+            </a:r>
+            <a:r>
+              <a:rPr lang="ko-KR" sz="1800">
+                <a:latin typeface="맑은 고딕" charset="0"/>
+                <a:ea typeface="맑은 고딕" charset="0"/>
+              </a:rPr>
+              <a:t>Texture</a:t>
+            </a:r>
+            <a:r>
+              <a:rPr lang="ko-KR" sz="1800">
+                <a:latin typeface="맑은 고딕" charset="0"/>
+                <a:ea typeface="맑은 고딕" charset="0"/>
+              </a:rPr>
+              <a:t> 폴더에 Road 텍스처를 </a:t>
+            </a:r>
+            <a:r>
+              <a:rPr lang="ko-KR" sz="1800">
+                <a:latin typeface="맑은 고딕" charset="0"/>
+                <a:ea typeface="맑은 고딕" charset="0"/>
+              </a:rPr>
+              <a:t>Left</a:t>
+            </a:r>
+            <a:r>
+              <a:rPr lang="ko-KR" sz="1800">
+                <a:latin typeface="맑은 고딕" charset="0"/>
+                <a:ea typeface="맑은 고딕" charset="0"/>
+              </a:rPr>
+              <a:t> </a:t>
+            </a:r>
+            <a:r>
+              <a:rPr lang="ko-KR" sz="1800">
+                <a:latin typeface="맑은 고딕" charset="0"/>
+                <a:ea typeface="맑은 고딕" charset="0"/>
+              </a:rPr>
+              <a:t>Ground</a:t>
+            </a:r>
+            <a:r>
+              <a:rPr lang="ko-KR" sz="1800">
+                <a:latin typeface="맑은 고딕" charset="0"/>
+                <a:ea typeface="맑은 고딕" charset="0"/>
+              </a:rPr>
+              <a:t> </a:t>
+            </a:r>
+            <a:r>
+              <a:rPr lang="ko-KR" sz="1800">
+                <a:latin typeface="맑은 고딕" charset="0"/>
+                <a:ea typeface="맑은 고딕" charset="0"/>
+              </a:rPr>
+              <a:t>오브젝트에 </a:t>
+            </a:r>
+            <a:r>
+              <a:rPr lang="ko-KR" sz="1800">
+                <a:latin typeface="맑은 고딕" charset="0"/>
+                <a:ea typeface="맑은 고딕" charset="0"/>
+              </a:rPr>
+              <a:t>넣어줍니다.</a:t>
             </a:r>
             <a:endParaRPr lang="ko-KR" altLang="en-US" sz="1800">
               <a:latin typeface="맑은 고딕" charset="0"/>
@@ -11497,9 +11886,164 @@
           </a:p>
         </p:txBody>
       </p:sp>
+      <p:sp>
+        <p:nvSpPr>
+          <p:cNvPr id="1175" name="텍스트 상자 39"/>
+          <p:cNvSpPr txBox="1">
+            <a:spLocks/>
+          </p:cNvSpPr>
+          <p:nvPr/>
+        </p:nvSpPr>
+        <p:spPr>
+          <a:xfrm rot="0">
+            <a:off x="6822440" y="5238750"/>
+            <a:ext cx="4152265" cy="954405"/>
+          </a:xfrm>
+          <a:prstGeom prst="rect"/>
+          <a:noFill/>
+          <a:ln w="0">
+            <a:noFill/>
+            <a:prstDash/>
+          </a:ln>
+        </p:spPr>
+        <p:txBody>
+          <a:bodyPr wrap="square" lIns="89535" tIns="46355" rIns="89535" bIns="46355" numCol="1" vert="horz" anchor="t">
+            <a:spAutoFit/>
+          </a:bodyPr>
+          <a:lstStyle/>
+          <a:p>
+            <a:pPr marL="0" indent="0" algn="l" latinLnBrk="0" hangingPunct="1">
+              <a:buFontTx/>
+              <a:buNone/>
+            </a:pPr>
+            <a:r>
+              <a:rPr lang="ko-KR" sz="2000" b="1">
+                <a:solidFill>
+                  <a:srgbClr val="0611F2"/>
+                </a:solidFill>
+                <a:latin typeface="맑은 고딕" charset="0"/>
+                <a:ea typeface="맑은 고딕" charset="0"/>
+              </a:rPr>
+              <a:t>19.</a:t>
+            </a:r>
+            <a:r>
+              <a:rPr lang="ko-KR" sz="2000" b="1">
+                <a:solidFill>
+                  <a:srgbClr val="0611F2"/>
+                </a:solidFill>
+                <a:latin typeface="맑은 고딕" charset="0"/>
+                <a:ea typeface="맑은 고딕" charset="0"/>
+              </a:rPr>
+              <a:t> </a:t>
+            </a:r>
+            <a:r>
+              <a:rPr lang="ko-KR" sz="1800">
+                <a:latin typeface="맑은 고딕" charset="0"/>
+                <a:ea typeface="맑은 고딕" charset="0"/>
+              </a:rPr>
+              <a:t>그런 다음 Project 폴더 아래에 </a:t>
+            </a:r>
+            <a:r>
+              <a:rPr lang="ko-KR" sz="1800">
+                <a:latin typeface="맑은 고딕" charset="0"/>
+                <a:ea typeface="맑은 고딕" charset="0"/>
+              </a:rPr>
+              <a:t>있는</a:t>
+            </a:r>
+            <a:r>
+              <a:rPr lang="ko-KR" sz="1800">
+                <a:latin typeface="맑은 고딕" charset="0"/>
+                <a:ea typeface="맑은 고딕" charset="0"/>
+              </a:rPr>
+              <a:t> </a:t>
+            </a:r>
+            <a:r>
+              <a:rPr lang="ko-KR" sz="1800">
+                <a:latin typeface="맑은 고딕" charset="0"/>
+                <a:ea typeface="맑은 고딕" charset="0"/>
+              </a:rPr>
+              <a:t>Texture</a:t>
+            </a:r>
+            <a:r>
+              <a:rPr lang="ko-KR" sz="1800">
+                <a:latin typeface="맑은 고딕" charset="0"/>
+                <a:ea typeface="맑은 고딕" charset="0"/>
+              </a:rPr>
+              <a:t> </a:t>
+            </a:r>
+            <a:r>
+              <a:rPr lang="ko-KR" sz="1800">
+                <a:latin typeface="맑은 고딕" charset="0"/>
+                <a:ea typeface="맑은 고딕" charset="0"/>
+              </a:rPr>
+              <a:t>폴더에</a:t>
+            </a:r>
+            <a:r>
+              <a:rPr lang="ko-KR" sz="1800">
+                <a:latin typeface="맑은 고딕" charset="0"/>
+                <a:ea typeface="맑은 고딕" charset="0"/>
+              </a:rPr>
+              <a:t> Road 텍스처를 </a:t>
+            </a:r>
+            <a:r>
+              <a:rPr lang="ko-KR" sz="1800">
+                <a:latin typeface="맑은 고딕" charset="0"/>
+                <a:ea typeface="맑은 고딕" charset="0"/>
+              </a:rPr>
+              <a:t>Righ</a:t>
+            </a:r>
+            <a:r>
+              <a:rPr lang="ko-KR" sz="1800">
+                <a:latin typeface="맑은 고딕" charset="0"/>
+                <a:ea typeface="맑은 고딕" charset="0"/>
+              </a:rPr>
+              <a:t>t</a:t>
+            </a:r>
+            <a:r>
+              <a:rPr lang="ko-KR" sz="1800">
+                <a:latin typeface="맑은 고딕" charset="0"/>
+                <a:ea typeface="맑은 고딕" charset="0"/>
+              </a:rPr>
+              <a:t> </a:t>
+            </a:r>
+            <a:r>
+              <a:rPr lang="ko-KR" sz="1800">
+                <a:latin typeface="맑은 고딕" charset="0"/>
+                <a:ea typeface="맑은 고딕" charset="0"/>
+              </a:rPr>
+              <a:t>Ground</a:t>
+            </a:r>
+            <a:r>
+              <a:rPr lang="ko-KR" sz="1800">
+                <a:latin typeface="맑은 고딕" charset="0"/>
+                <a:ea typeface="맑은 고딕" charset="0"/>
+              </a:rPr>
+              <a:t> </a:t>
+            </a:r>
+            <a:r>
+              <a:rPr lang="ko-KR" sz="1800">
+                <a:latin typeface="맑은 고딕" charset="0"/>
+                <a:ea typeface="맑은 고딕" charset="0"/>
+              </a:rPr>
+              <a:t>오브젝트에 </a:t>
+            </a:r>
+            <a:r>
+              <a:rPr lang="ko-KR" sz="1800">
+                <a:latin typeface="맑은 고딕" charset="0"/>
+                <a:ea typeface="맑은 고딕" charset="0"/>
+              </a:rPr>
+              <a:t>넣어줍니다.</a:t>
+            </a:r>
+            <a:endParaRPr lang="ko-KR" altLang="en-US" sz="1800">
+              <a:latin typeface="맑은 고딕" charset="0"/>
+              <a:ea typeface="맑은 고딕" charset="0"/>
+            </a:endParaRPr>
+          </a:p>
+        </p:txBody>
+      </p:sp>
       <p:pic>
         <p:nvPicPr>
-          <p:cNvPr id="1208" name="그림 4"/>
+          <p:cNvPr id="1176" name="그림 40" descr="C:/Users/Admin1/AppData/Roaming/PolarisOffice/ETemp/10232_14344976/fImage483792756962.png"/>
           <p:cNvPicPr>
             <a:picLocks noChangeAspect="1"/>
           </p:cNvPicPr>
@@ -11519,8 +12063,8 @@
         </p:blipFill>
         <p:spPr>
           <a:xfrm rot="0">
-            <a:off x="1302385" y="1205230"/>
-            <a:ext cx="4060825" cy="1217295"/>
+            <a:off x="8289290" y="3904615"/>
+            <a:ext cx="2676525" cy="1215390"/>
           </a:xfrm>
           <a:prstGeom prst="roundRect"/>
           <a:solidFill>
@@ -11528,6 +12072,70 @@
           </a:solidFill>
         </p:spPr>
       </p:pic>
+      <p:pic>
+        <p:nvPicPr>
+          <p:cNvPr id="1179" name="그림 43" descr="C:/Users/Admin1/AppData/Roaming/PolarisOffice/ETemp/10232_14344976/fImage80712784464.png"/>
+          <p:cNvPicPr>
+            <a:picLocks noChangeAspect="1"/>
+          </p:cNvPicPr>
+          <p:nvPr/>
+        </p:nvPicPr>
+        <p:blipFill rotWithShape="1">
+          <a:blip r:embed="rId7" cstate="print">
+            <a:extLst>
+              <a:ext uri="{28A0092B-C50C-407E-A947-70E740481C1C}">
+                <a14:useLocalDpi xmlns:a14="http://schemas.microsoft.com/office/drawing/2010/main" val="0"/>
+              </a:ext>
+            </a:extLst>
+          </a:blip>
+          <a:stretch>
+            <a:fillRect/>
+          </a:stretch>
+        </p:blipFill>
+        <p:spPr>
+          <a:xfrm rot="0">
+            <a:off x="6826885" y="3890645"/>
+            <a:ext cx="1330960" cy="1229360"/>
+          </a:xfrm>
+          <a:prstGeom prst="roundRect"/>
+          <a:solidFill>
+            <a:srgbClr val="EDEDED"/>
+          </a:solidFill>
+        </p:spPr>
+      </p:pic>
+      <p:cxnSp>
+        <p:nvCxnSpPr>
+          <p:cNvPr id="1178" name="도형 42"/>
+          <p:cNvCxnSpPr/>
+          <p:nvPr/>
+        </p:nvCxnSpPr>
+        <p:spPr>
+          <a:xfrm rot="0" flipH="1">
+            <a:off x="7881620" y="4487545"/>
+            <a:ext cx="1000125" cy="78105"/>
+          </a:xfrm>
+          <a:prstGeom prst="straightConnector1"/>
+          <a:ln w="6350" cap="flat" cmpd="sng">
+            <a:prstDash/>
+            <a:headEnd type="none" w="med" len="med"/>
+            <a:tailEnd type="triangle" w="med" len="med"/>
+          </a:ln>
+        </p:spPr>
+        <p:style>
+          <a:lnRef idx="1">
+            <a:schemeClr val="accent1"/>
+          </a:lnRef>
+          <a:fillRef idx="0">
+            <a:schemeClr val="accent1"/>
+          </a:fillRef>
+          <a:effectRef idx="0">
+            <a:schemeClr val="accent1"/>
+          </a:effectRef>
+          <a:fontRef idx="minor">
+            <a:schemeClr val="tx1"/>
+          </a:fontRef>
+        </p:style>
+      </p:cxnSp>
     </p:spTree>
   </p:cSld>
   <p:clrMapOvr>
@@ -11578,8 +12186,8 @@
         </p:nvSpPr>
         <p:spPr>
           <a:xfrm rot="0">
-            <a:off x="4292600" y="318770"/>
-            <a:ext cx="3613150" cy="554990"/>
+            <a:off x="4102100" y="387985"/>
+            <a:ext cx="3985895" cy="478155"/>
           </a:xfrm>
           <a:prstGeom prst="rect"/>
           <a:noFill/>
@@ -11594,269 +12202,60 @@
           </a:bodyPr>
           <a:lstStyle/>
           <a:p>
-            <a:pPr marL="0" indent="0" algn="l" latinLnBrk="0">
-              <a:buFontTx/>
-              <a:buNone/>
-            </a:pPr>
-            <a:r>
-              <a:rPr lang="ko-KR" altLang="en-US" sz="3000" b="1">
+            <a:pPr marL="0" indent="0" algn="ctr" latinLnBrk="0">
+              <a:buFontTx/>
+              <a:buNone/>
+            </a:pPr>
+            <a:r>
+              <a:rPr lang="ko-KR" altLang="en-US" sz="2500" b="1">
                 <a:solidFill>
                   <a:schemeClr val="tx1"/>
                 </a:solidFill>
-                <a:latin typeface="맑은 고딕" charset="0"/>
-                <a:ea typeface="맑은 고딕" charset="0"/>
-              </a:rPr>
-              <a:t>열</a:t>
-            </a:r>
-            <a:r>
-              <a:rPr lang="ko-KR" altLang="en-US" sz="3000" b="1">
+                <a:latin typeface="나눔바른고딕" charset="0"/>
+                <a:ea typeface="나눔바른고딕" charset="0"/>
+              </a:rPr>
+              <a:t>여덟</a:t>
+            </a:r>
+            <a:r>
+              <a:rPr lang="ko-KR" altLang="en-US" sz="2500" b="1">
                 <a:solidFill>
                   <a:schemeClr val="tx1"/>
                 </a:solidFill>
-                <a:latin typeface="맑은 고딕" charset="0"/>
-                <a:ea typeface="맑은 고딕" charset="0"/>
-              </a:rPr>
-              <a:t>세</a:t>
-            </a:r>
-            <a:r>
-              <a:rPr lang="ko-KR" altLang="en-US" sz="3000" b="1">
+                <a:latin typeface="나눔바른고딕" charset="0"/>
+                <a:ea typeface="나눔바른고딕" charset="0"/>
+              </a:rPr>
+              <a:t> </a:t>
+            </a:r>
+            <a:r>
+              <a:rPr lang="ko-KR" altLang="en-US" sz="2500" b="1">
                 <a:solidFill>
                   <a:schemeClr val="tx1"/>
                 </a:solidFill>
-                <a:latin typeface="맑은 고딕" charset="0"/>
-                <a:ea typeface="맑은 고딕" charset="0"/>
-              </a:rPr>
-              <a:t> 번째 튜토리얼</a:t>
-            </a:r>
-            <a:endParaRPr lang="ko-KR" altLang="en-US" sz="3000" b="1">
+                <a:latin typeface="나눔바른고딕" charset="0"/>
+                <a:ea typeface="나눔바른고딕" charset="0"/>
+              </a:rPr>
+              <a:t>번째 튜토리얼</a:t>
+            </a:r>
+            <a:endParaRPr lang="ko-KR" altLang="en-US" sz="2500" b="1">
               <a:solidFill>
                 <a:schemeClr val="tx1"/>
               </a:solidFill>
-              <a:latin typeface="맑은 고딕" charset="0"/>
-              <a:ea typeface="맑은 고딕" charset="0"/>
-            </a:endParaRPr>
-          </a:p>
-        </p:txBody>
-      </p:sp>
-      <p:sp>
-        <p:nvSpPr>
-          <p:cNvPr id="1191" name="Rect 0"/>
-          <p:cNvSpPr txBox="1">
-            <a:spLocks/>
-          </p:cNvSpPr>
-          <p:nvPr/>
-        </p:nvSpPr>
-        <p:spPr>
-          <a:xfrm rot="0">
-            <a:off x="6845935" y="4043680"/>
-            <a:ext cx="4199255" cy="2031365"/>
-          </a:xfrm>
-          <a:prstGeom prst="rect"/>
-          <a:noFill/>
-          <a:ln w="0">
-            <a:noFill/>
-            <a:prstDash/>
-          </a:ln>
-        </p:spPr>
-        <p:txBody>
-          <a:bodyPr wrap="square" lIns="89535" tIns="46355" rIns="89535" bIns="46355" numCol="1" vert="horz" anchor="t">
-            <a:spAutoFit/>
-          </a:bodyPr>
-          <a:lstStyle/>
-          <a:p>
-            <a:pPr marL="0" indent="0" rtl="0" algn="l" defTabSz="914400" eaLnBrk="1" latinLnBrk="0" hangingPunct="1">
-              <a:buFontTx/>
-              <a:buNone/>
-            </a:pPr>
-            <a:r>
-              <a:rPr lang="ko-KR" sz="1800">
-                <a:latin typeface="맑은 고딕" charset="0"/>
-                <a:ea typeface="맑은 고딕" charset="0"/>
-              </a:rPr>
-              <a:t>라이트 맵은 실시간으로 생성되는 빛에 대한 정보를 한</a:t>
-            </a:r>
-            <a:r>
-              <a:rPr lang="ko-KR" sz="1800">
-                <a:latin typeface="맑은 고딕" charset="0"/>
-                <a:ea typeface="맑은 고딕" charset="0"/>
-              </a:rPr>
-              <a:t> </a:t>
-            </a:r>
-            <a:r>
-              <a:rPr lang="ko-KR" sz="1800">
-                <a:latin typeface="맑은 고딕" charset="0"/>
-                <a:ea typeface="맑은 고딕" charset="0"/>
-              </a:rPr>
-              <a:t>번에 </a:t>
-            </a:r>
-            <a:r>
-              <a:rPr lang="ko-KR" sz="1800">
-                <a:latin typeface="맑은 고딕" charset="0"/>
-                <a:ea typeface="맑은 고딕" charset="0"/>
-              </a:rPr>
-              <a:t>저장한 </a:t>
-            </a:r>
-            <a:r>
-              <a:rPr lang="ko-KR" sz="1800">
-                <a:latin typeface="맑은 고딕" charset="0"/>
-                <a:ea typeface="맑은 고딕" charset="0"/>
-              </a:rPr>
-              <a:t>텍스처입니다.</a:t>
-            </a:r>
-            <a:endParaRPr lang="ko-KR" altLang="en-US" sz="1800">
-              <a:latin typeface="맑은 고딕" charset="0"/>
-              <a:ea typeface="맑은 고딕" charset="0"/>
-            </a:endParaRPr>
-          </a:p>
-          <a:p>
-            <a:pPr marL="0" indent="0" rtl="0" algn="l" defTabSz="914400" eaLnBrk="1" latinLnBrk="0" hangingPunct="1">
-              <a:buFontTx/>
-              <a:buNone/>
-            </a:pPr>
-            <a:endParaRPr lang="ko-KR" altLang="en-US" sz="1800">
-              <a:latin typeface="맑은 고딕" charset="0"/>
-              <a:ea typeface="맑은 고딕" charset="0"/>
-            </a:endParaRPr>
-          </a:p>
-          <a:p>
-            <a:pPr marL="0" indent="0" rtl="0" algn="l" defTabSz="914400" eaLnBrk="1" latinLnBrk="0" hangingPunct="1">
-              <a:buFontTx/>
-              <a:buNone/>
-            </a:pPr>
-            <a:r>
-              <a:rPr lang="ko-KR" sz="1800">
-                <a:latin typeface="맑은 고딕" charset="0"/>
-                <a:ea typeface="맑은 고딕" charset="0"/>
-              </a:rPr>
-              <a:t>라이트 맵의 경우 빛을 받은 게임 오브젝트는 그림자와 반사면이 고정되어 있는 형태로 설정됩니다.</a:t>
-            </a:r>
-            <a:endParaRPr lang="ko-KR" altLang="en-US" sz="1800">
-              <a:latin typeface="맑은 고딕" charset="0"/>
-              <a:ea typeface="맑은 고딕" charset="0"/>
-            </a:endParaRPr>
-          </a:p>
-        </p:txBody>
-      </p:sp>
-      <p:sp>
-        <p:nvSpPr>
-          <p:cNvPr id="1205" name="Rect 0"/>
-          <p:cNvSpPr txBox="1">
-            <a:spLocks/>
-          </p:cNvSpPr>
-          <p:nvPr/>
-        </p:nvSpPr>
-        <p:spPr>
-          <a:xfrm rot="0">
-            <a:off x="1219200" y="5144135"/>
-            <a:ext cx="4145915" cy="923925"/>
-          </a:xfrm>
-          <a:prstGeom prst="rect"/>
-          <a:noFill/>
-          <a:ln w="0">
-            <a:noFill/>
-            <a:prstDash/>
-          </a:ln>
-        </p:spPr>
-        <p:txBody>
-          <a:bodyPr wrap="square" lIns="89535" tIns="46355" rIns="89535" bIns="46355" numCol="1" vert="horz" anchor="t">
-            <a:spAutoFit/>
-          </a:bodyPr>
-          <a:lstStyle/>
-          <a:p>
-            <a:pPr marL="0" indent="0" rtl="0" algn="l" defTabSz="914400" eaLnBrk="1" latinLnBrk="0" hangingPunct="1">
-              <a:buFontTx/>
-              <a:buNone/>
-            </a:pPr>
-            <a:r>
-              <a:rPr sz="1800" b="1">
-                <a:solidFill>
-                  <a:srgbClr val="0611F2"/>
-                </a:solidFill>
-                <a:latin typeface="맑은 고딕" charset="0"/>
-                <a:ea typeface="맑은 고딕" charset="0"/>
-              </a:rPr>
-              <a:t>3</a:t>
-            </a:r>
-            <a:r>
-              <a:rPr lang="ko-KR" sz="1800" b="1">
-                <a:solidFill>
-                  <a:srgbClr val="0611F2"/>
-                </a:solidFill>
-                <a:latin typeface="맑은 고딕" charset="0"/>
-                <a:ea typeface="맑은 고딕" charset="0"/>
-              </a:rPr>
-              <a:t>2</a:t>
-            </a:r>
-            <a:r>
-              <a:rPr sz="1800" b="1">
-                <a:solidFill>
-                  <a:srgbClr val="0611F2"/>
-                </a:solidFill>
-                <a:latin typeface="맑은 고딕" charset="0"/>
-                <a:ea typeface="맑은 고딕" charset="0"/>
-              </a:rPr>
-              <a:t>.</a:t>
-            </a:r>
-            <a:r>
-              <a:rPr sz="1800">
-                <a:latin typeface="맑은 고딕" charset="0"/>
-                <a:ea typeface="맑은 고딕" charset="0"/>
-              </a:rPr>
-              <a:t> </a:t>
-            </a:r>
-            <a:r>
-              <a:rPr lang="ko-KR" sz="1800">
-                <a:latin typeface="맑은 고딕" charset="0"/>
-                <a:ea typeface="맑은 고딕" charset="0"/>
-              </a:rPr>
-              <a:t>그다음으로 Light Probe Visualization에서 Generate Lighting을 선택합니다.</a:t>
-            </a:r>
-            <a:endParaRPr lang="ko-KR" altLang="en-US" sz="1800">
-              <a:latin typeface="맑은 고딕" charset="0"/>
-              <a:ea typeface="맑은 고딕" charset="0"/>
+              <a:latin typeface="나눔바른고딕" charset="0"/>
+              <a:ea typeface="나눔바른고딕" charset="0"/>
             </a:endParaRPr>
           </a:p>
         </p:txBody>
       </p:sp>
       <p:pic>
         <p:nvPicPr>
-          <p:cNvPr id="1206" name="그림 28"/>
+          <p:cNvPr id="1042" name="그림 44" descr="C:/Users/Admin1/AppData/Roaming/PolarisOffice/ETemp/10232_14344976/fImage50303243281.png"/>
           <p:cNvPicPr>
             <a:picLocks noChangeAspect="1"/>
           </p:cNvPicPr>
           <p:nvPr/>
         </p:nvPicPr>
         <p:blipFill rotWithShape="1">
-          <a:blip r:embed="rId2" cstate="print">
-            <a:extLst>
-              <a:ext uri="{28A0092B-C50C-407E-A947-70E740481C1C}">
-                <a14:useLocalDpi xmlns:a14="http://schemas.microsoft.com/office/drawing/2010/main" val="0"/>
-              </a:ext>
-            </a:extLst>
-          </a:blip>
-          <a:stretch>
-            <a:fillRect/>
-          </a:stretch>
-        </p:blipFill>
-        <p:spPr>
-          <a:xfrm rot="0">
-            <a:off x="1228090" y="1271270"/>
-            <a:ext cx="4133215" cy="3702685"/>
-          </a:xfrm>
-          <a:prstGeom prst="rect"/>
-          <a:noFill/>
-        </p:spPr>
-      </p:pic>
-      <p:pic>
-        <p:nvPicPr>
-          <p:cNvPr id="1207" name="그림 29"/>
-          <p:cNvPicPr>
-            <a:picLocks noChangeAspect="1"/>
-          </p:cNvPicPr>
-          <p:nvPr/>
-        </p:nvPicPr>
-        <p:blipFill rotWithShape="1">
-          <a:blip r:embed="rId3" cstate="hqprint">
+          <a:blip r:embed="rId4" cstate="hqprint">
             <a:extLst>
               <a:ext uri="{28A0092B-C50C-407E-A947-70E740481C1C}">
                 <a14:useLocalDpi xmlns:a14="http://schemas.microsoft.com/office/drawing/2010/main"/>
@@ -11869,8 +12268,8 @@
         </p:blipFill>
         <p:spPr>
           <a:xfrm rot="0">
-            <a:off x="6841490" y="1228725"/>
-            <a:ext cx="4194810" cy="2646680"/>
+            <a:off x="3684905" y="1438275"/>
+            <a:ext cx="1699260" cy="1706245"/>
           </a:xfrm>
           <a:prstGeom prst="roundRect"/>
           <a:solidFill>
@@ -11878,6 +12277,164 @@
           </a:solidFill>
         </p:spPr>
       </p:pic>
+      <p:sp>
+        <p:nvSpPr>
+          <p:cNvPr id="1043" name="텍스트 상자 45"/>
+          <p:cNvSpPr txBox="1">
+            <a:spLocks/>
+          </p:cNvSpPr>
+          <p:nvPr/>
+        </p:nvSpPr>
+        <p:spPr>
+          <a:xfrm rot="0">
+            <a:off x="1223010" y="3316605"/>
+            <a:ext cx="4161155" cy="647065"/>
+          </a:xfrm>
+          <a:prstGeom prst="rect"/>
+          <a:noFill/>
+          <a:ln w="0">
+            <a:noFill/>
+            <a:prstDash/>
+          </a:ln>
+        </p:spPr>
+        <p:txBody>
+          <a:bodyPr wrap="square" lIns="89535" tIns="46355" rIns="89535" bIns="46355" numCol="1" vert="horz" anchor="t">
+            <a:spAutoFit/>
+          </a:bodyPr>
+          <a:lstStyle/>
+          <a:p>
+            <a:pPr marL="0" indent="0" rtl="0" algn="l" defTabSz="914400" eaLnBrk="1" latinLnBrk="0" hangingPunct="1">
+              <a:buFontTx/>
+              <a:buNone/>
+            </a:pPr>
+            <a:r>
+              <a:rPr sz="1800" b="1">
+                <a:solidFill>
+                  <a:srgbClr val="0611F2"/>
+                </a:solidFill>
+                <a:latin typeface="맑은 고딕" charset="0"/>
+                <a:ea typeface="맑은 고딕" charset="0"/>
+              </a:rPr>
+              <a:t>2</a:t>
+            </a:r>
+            <a:r>
+              <a:rPr sz="1800" b="1">
+                <a:solidFill>
+                  <a:srgbClr val="0611F2"/>
+                </a:solidFill>
+                <a:latin typeface="맑은 고딕" charset="0"/>
+                <a:ea typeface="맑은 고딕" charset="0"/>
+              </a:rPr>
+              <a:t>0</a:t>
+            </a:r>
+            <a:r>
+              <a:rPr sz="1800" b="1">
+                <a:solidFill>
+                  <a:srgbClr val="0611F2"/>
+                </a:solidFill>
+                <a:latin typeface="맑은 고딕" charset="0"/>
+                <a:ea typeface="맑은 고딕" charset="0"/>
+              </a:rPr>
+              <a:t>.</a:t>
+            </a:r>
+            <a:r>
+              <a:rPr sz="1800">
+                <a:latin typeface="맑은 고딕" charset="0"/>
+                <a:ea typeface="맑은 고딕" charset="0"/>
+              </a:rPr>
+              <a:t> </a:t>
+            </a:r>
+            <a:r>
+              <a:rPr lang="ko-KR" sz="1800">
+                <a:latin typeface="맑은 고딕" charset="0"/>
+                <a:ea typeface="맑은 고딕" charset="0"/>
+              </a:rPr>
+              <a:t>그다음 </a:t>
+            </a:r>
+            <a:r>
+              <a:rPr lang="ko-KR" sz="1800">
+                <a:latin typeface="맑은 고딕" charset="0"/>
+                <a:ea typeface="맑은 고딕" charset="0"/>
+              </a:rPr>
+              <a:t>Left</a:t>
+            </a:r>
+            <a:r>
+              <a:rPr lang="ko-KR" sz="1800">
+                <a:latin typeface="맑은 고딕" charset="0"/>
+                <a:ea typeface="맑은 고딕" charset="0"/>
+              </a:rPr>
+              <a:t> </a:t>
+            </a:r>
+            <a:r>
+              <a:rPr lang="ko-KR" sz="1800">
+                <a:latin typeface="맑은 고딕" charset="0"/>
+                <a:ea typeface="맑은 고딕" charset="0"/>
+              </a:rPr>
+              <a:t>Ground</a:t>
+            </a:r>
+            <a:r>
+              <a:rPr lang="ko-KR" sz="1800">
+                <a:latin typeface="맑은 고딕" charset="0"/>
+                <a:ea typeface="맑은 고딕" charset="0"/>
+              </a:rPr>
+              <a:t> </a:t>
+            </a:r>
+            <a:r>
+              <a:rPr lang="ko-KR" sz="1800">
+                <a:latin typeface="맑은 고딕" charset="0"/>
+                <a:ea typeface="맑은 고딕" charset="0"/>
+              </a:rPr>
+              <a:t>오브젝트에</a:t>
+            </a:r>
+            <a:r>
+              <a:rPr lang="ko-KR" sz="1800">
+                <a:latin typeface="맑은 고딕" charset="0"/>
+                <a:ea typeface="맑은 고딕" charset="0"/>
+              </a:rPr>
+              <a:t> </a:t>
+            </a:r>
+            <a:r>
+              <a:rPr lang="ko-KR" sz="1800">
+                <a:latin typeface="맑은 고딕" charset="0"/>
+                <a:ea typeface="맑은 고딕" charset="0"/>
+              </a:rPr>
+              <a:t>Contribute</a:t>
+            </a:r>
+            <a:r>
+              <a:rPr lang="ko-KR" sz="1800">
+                <a:latin typeface="맑은 고딕" charset="0"/>
+                <a:ea typeface="맑은 고딕" charset="0"/>
+              </a:rPr>
+              <a:t> </a:t>
+            </a:r>
+            <a:r>
+              <a:rPr lang="ko-KR" sz="1800">
+                <a:latin typeface="맑은 고딕" charset="0"/>
+                <a:ea typeface="맑은 고딕" charset="0"/>
+              </a:rPr>
+              <a:t>GI를</a:t>
+            </a:r>
+            <a:r>
+              <a:rPr lang="ko-KR" sz="1800">
+                <a:latin typeface="맑은 고딕" charset="0"/>
+                <a:ea typeface="맑은 고딕" charset="0"/>
+              </a:rPr>
+              <a:t> </a:t>
+            </a:r>
+            <a:r>
+              <a:rPr lang="ko-KR" sz="1800">
+                <a:latin typeface="맑은 고딕" charset="0"/>
+                <a:ea typeface="맑은 고딕" charset="0"/>
+              </a:rPr>
+              <a:t>설정합니다.</a:t>
+            </a:r>
+            <a:endParaRPr lang="ko-KR" altLang="en-US" sz="1800">
+              <a:latin typeface="맑은 고딕" charset="0"/>
+              <a:ea typeface="맑은 고딕" charset="0"/>
+            </a:endParaRPr>
+          </a:p>
+        </p:txBody>
+      </p:sp>
     </p:spTree>
   </p:cSld>
   <p:clrMapOvr>
@@ -11928,8 +12485,8 @@
         </p:nvSpPr>
         <p:spPr>
           <a:xfrm rot="0">
-            <a:off x="4110990" y="327660"/>
-            <a:ext cx="3985260" cy="554990"/>
+            <a:off x="4292600" y="318770"/>
+            <a:ext cx="3613150" cy="554990"/>
           </a:xfrm>
           <a:prstGeom prst="rect"/>
           <a:noFill/>
@@ -11966,7 +12523,7 @@
                 <a:latin typeface="맑은 고딕" charset="0"/>
                 <a:ea typeface="맑은 고딕" charset="0"/>
               </a:rPr>
-              <a:t>다섯</a:t>
+              <a:t>세</a:t>
             </a:r>
             <a:r>
               <a:rPr lang="ko-KR" altLang="en-US" sz="3000" b="1">
@@ -11990,7 +12547,7 @@
       </p:sp>
       <p:sp>
         <p:nvSpPr>
-          <p:cNvPr id="1032" name="Rect 0"/>
+          <p:cNvPr id="1191" name="Rect 0"/>
           <p:cNvSpPr txBox="1">
             <a:spLocks/>
           </p:cNvSpPr>
@@ -11998,8 +12555,8 @@
         </p:nvSpPr>
         <p:spPr>
           <a:xfrm rot="0">
-            <a:off x="1449705" y="2547620"/>
-            <a:ext cx="3939540" cy="647065"/>
+            <a:off x="6845935" y="4043680"/>
+            <a:ext cx="4199255" cy="2031365"/>
           </a:xfrm>
           <a:prstGeom prst="rect"/>
           <a:noFill/>
@@ -12019,37 +12576,14 @@
               <a:buNone/>
             </a:pPr>
             <a:r>
-              <a:rPr sz="1800" b="1">
-                <a:solidFill>
-                  <a:srgbClr val="0611F2"/>
-                </a:solidFill>
-                <a:latin typeface="맑은 고딕" charset="0"/>
-                <a:ea typeface="맑은 고딕" charset="0"/>
-              </a:rPr>
-              <a:t>3</a:t>
-            </a:r>
-            <a:r>
-              <a:rPr lang="ko-KR" sz="1800" b="1">
-                <a:solidFill>
-                  <a:srgbClr val="0611F2"/>
-                </a:solidFill>
-                <a:latin typeface="맑은 고딕" charset="0"/>
-                <a:ea typeface="맑은 고딕" charset="0"/>
-              </a:rPr>
-              <a:t>6</a:t>
-            </a:r>
-            <a:r>
-              <a:rPr sz="1800" b="1">
-                <a:solidFill>
-                  <a:srgbClr val="0611F2"/>
-                </a:solidFill>
-                <a:latin typeface="맑은 고딕" charset="0"/>
-                <a:ea typeface="맑은 고딕" charset="0"/>
-              </a:rPr>
-              <a:t>.</a:t>
-            </a:r>
-            <a:r>
-              <a:rPr sz="1800">
+              <a:rPr lang="ko-KR" sz="1800">
+                <a:latin typeface="맑은 고딕" charset="0"/>
+                <a:ea typeface="맑은 고딕" charset="0"/>
+              </a:rPr>
+              <a:t>라이트 맵은 실시간으로 생성되는 빛에 대한 정보를 한</a:t>
+            </a:r>
+            <a:r>
+              <a:rPr lang="ko-KR" sz="1800">
                 <a:latin typeface="맑은 고딕" charset="0"/>
                 <a:ea typeface="맑은 고딕" charset="0"/>
               </a:rPr>
@@ -12060,318 +12594,66 @@
                 <a:latin typeface="맑은 고딕" charset="0"/>
                 <a:ea typeface="맑은 고딕" charset="0"/>
               </a:rPr>
-              <a:t>그다음으로 Wood Street Light 오브젝트의 위치 값을 설정합니다.</a:t>
+              <a:t>번에 </a:t>
+            </a:r>
+            <a:r>
+              <a:rPr lang="ko-KR" sz="1800">
+                <a:latin typeface="맑은 고딕" charset="0"/>
+                <a:ea typeface="맑은 고딕" charset="0"/>
+              </a:rPr>
+              <a:t>저장한 </a:t>
+            </a:r>
+            <a:r>
+              <a:rPr lang="ko-KR" sz="1800">
+                <a:latin typeface="맑은 고딕" charset="0"/>
+                <a:ea typeface="맑은 고딕" charset="0"/>
+              </a:rPr>
+              <a:t>텍스처입니다.</a:t>
             </a:r>
             <a:endParaRPr lang="ko-KR" altLang="en-US" sz="1800">
               <a:latin typeface="맑은 고딕" charset="0"/>
               <a:ea typeface="맑은 고딕" charset="0"/>
             </a:endParaRPr>
           </a:p>
-        </p:txBody>
-      </p:sp>
-      <p:sp>
-        <p:nvSpPr>
-          <p:cNvPr id="1039" name="Rect 0"/>
-          <p:cNvSpPr txBox="1">
-            <a:spLocks/>
-          </p:cNvSpPr>
-          <p:nvPr/>
-        </p:nvSpPr>
-        <p:spPr>
-          <a:xfrm rot="0">
-            <a:off x="6842760" y="5208270"/>
-            <a:ext cx="4084320" cy="923925"/>
-          </a:xfrm>
-          <a:prstGeom prst="rect"/>
-          <a:noFill/>
-          <a:ln w="0">
-            <a:noFill/>
-            <a:prstDash/>
-          </a:ln>
-        </p:spPr>
-        <p:txBody>
-          <a:bodyPr wrap="square" lIns="89535" tIns="46355" rIns="89535" bIns="46355" numCol="1" vert="horz" anchor="t">
-            <a:spAutoFit/>
-          </a:bodyPr>
-          <a:lstStyle/>
           <a:p>
             <a:pPr marL="0" indent="0" rtl="0" algn="l" defTabSz="914400" eaLnBrk="1" latinLnBrk="0" hangingPunct="1">
               <a:buFontTx/>
               <a:buNone/>
             </a:pPr>
-            <a:r>
-              <a:rPr sz="1800" b="1">
-                <a:solidFill>
-                  <a:srgbClr val="0611F2"/>
-                </a:solidFill>
-                <a:latin typeface="맑은 고딕" charset="0"/>
-                <a:ea typeface="맑은 고딕" charset="0"/>
-              </a:rPr>
-              <a:t>3</a:t>
-            </a:r>
-            <a:r>
-              <a:rPr lang="ko-KR" sz="1800" b="1">
-                <a:solidFill>
-                  <a:srgbClr val="0611F2"/>
-                </a:solidFill>
-                <a:latin typeface="맑은 고딕" charset="0"/>
-                <a:ea typeface="맑은 고딕" charset="0"/>
-              </a:rPr>
-              <a:t>8</a:t>
-            </a:r>
-            <a:r>
-              <a:rPr sz="1800" b="1">
-                <a:solidFill>
-                  <a:srgbClr val="0611F2"/>
-                </a:solidFill>
-                <a:latin typeface="맑은 고딕" charset="0"/>
-                <a:ea typeface="맑은 고딕" charset="0"/>
-              </a:rPr>
-              <a:t>.</a:t>
-            </a:r>
-            <a:r>
-              <a:rPr sz="1800">
-                <a:latin typeface="맑은 고딕" charset="0"/>
-                <a:ea typeface="맑은 고딕" charset="0"/>
-              </a:rPr>
-              <a:t> 그</a:t>
-            </a:r>
-            <a:r>
-              <a:rPr lang="ko-KR" sz="1800">
-                <a:latin typeface="맑은 고딕" charset="0"/>
-                <a:ea typeface="맑은 고딕" charset="0"/>
-              </a:rPr>
-              <a:t>런 다음 Light에서 Point Light를 생성한 다음 Emergency Light라는 이름으로 정의합니다</a:t>
-            </a:r>
-            <a:r>
-              <a:rPr lang="ko-KR" sz="1800">
-                <a:latin typeface="맑은 고딕" charset="0"/>
-                <a:ea typeface="맑은 고딕" charset="0"/>
-              </a:rPr>
-              <a:t>.</a:t>
-            </a:r>
             <a:endParaRPr lang="ko-KR" altLang="en-US" sz="1800">
               <a:latin typeface="맑은 고딕" charset="0"/>
               <a:ea typeface="맑은 고딕" charset="0"/>
             </a:endParaRPr>
           </a:p>
+          <a:p>
+            <a:pPr marL="0" indent="0" rtl="0" algn="l" defTabSz="914400" eaLnBrk="1" latinLnBrk="0" hangingPunct="1">
+              <a:buFontTx/>
+              <a:buNone/>
+            </a:pPr>
+            <a:r>
+              <a:rPr lang="ko-KR" sz="1800">
+                <a:latin typeface="맑은 고딕" charset="0"/>
+                <a:ea typeface="맑은 고딕" charset="0"/>
+              </a:rPr>
+              <a:t>라이트 맵의 경우 빛을 받은 게임 오브젝트는 그림자와 반사면이 고정되어 있는 형태로 설정됩니다.</a:t>
+            </a:r>
+            <a:endParaRPr lang="ko-KR" altLang="en-US" sz="1800">
+              <a:latin typeface="맑은 고딕" charset="0"/>
+              <a:ea typeface="맑은 고딕" charset="0"/>
+            </a:endParaRPr>
+          </a:p>
         </p:txBody>
       </p:sp>
       <p:pic>
         <p:nvPicPr>
-          <p:cNvPr id="1040" name="그림 37"/>
+          <p:cNvPr id="1207" name="그림 29"/>
           <p:cNvPicPr>
             <a:picLocks noChangeAspect="1"/>
           </p:cNvPicPr>
           <p:nvPr/>
         </p:nvPicPr>
         <p:blipFill rotWithShape="1">
-          <a:blip r:embed="rId2" cstate="print">
-            <a:extLst>
-              <a:ext uri="{28A0092B-C50C-407E-A947-70E740481C1C}">
-                <a14:useLocalDpi xmlns:a14="http://schemas.microsoft.com/office/drawing/2010/main" val="0"/>
-              </a:ext>
-            </a:extLst>
-          </a:blip>
-          <a:stretch>
-            <a:fillRect/>
-          </a:stretch>
-        </p:blipFill>
-        <p:spPr>
-          <a:xfrm rot="0">
-            <a:off x="1445260" y="1333500"/>
-            <a:ext cx="3943350" cy="1166495"/>
-          </a:xfrm>
-          <a:prstGeom prst="roundRect"/>
-          <a:solidFill>
-            <a:srgbClr val="EDEDED"/>
-          </a:solidFill>
-        </p:spPr>
-      </p:pic>
-      <p:pic>
-        <p:nvPicPr>
-          <p:cNvPr id="1041" name="그림 41"/>
-          <p:cNvPicPr>
-            <a:picLocks noChangeAspect="1"/>
-          </p:cNvPicPr>
-          <p:nvPr/>
-        </p:nvPicPr>
-        <p:blipFill rotWithShape="1">
-          <a:blip r:embed="rId3" cstate="print">
-            <a:extLst>
-              <a:ext uri="{28A0092B-C50C-407E-A947-70E740481C1C}">
-                <a14:useLocalDpi xmlns:a14="http://schemas.microsoft.com/office/drawing/2010/main" val="0"/>
-              </a:ext>
-            </a:extLst>
-          </a:blip>
-          <a:stretch>
-            <a:fillRect/>
-          </a:stretch>
-        </p:blipFill>
-        <p:spPr>
-          <a:xfrm rot="0">
-            <a:off x="1451610" y="3355975"/>
-            <a:ext cx="2172970" cy="2007235"/>
-          </a:xfrm>
-          <a:prstGeom prst="roundRect"/>
-          <a:solidFill>
-            <a:srgbClr val="EDEDED"/>
-          </a:solidFill>
-        </p:spPr>
-      </p:pic>
-      <p:pic>
-        <p:nvPicPr>
-          <p:cNvPr id="1042" name="그림 44"/>
-          <p:cNvPicPr>
-            <a:picLocks noChangeAspect="1"/>
-          </p:cNvPicPr>
-          <p:nvPr/>
-        </p:nvPicPr>
-        <p:blipFill rotWithShape="1">
-          <a:blip r:embed="rId4" cstate="print">
-            <a:extLst>
-              <a:ext uri="{28A0092B-C50C-407E-A947-70E740481C1C}">
-                <a14:useLocalDpi xmlns:a14="http://schemas.microsoft.com/office/drawing/2010/main" val="0"/>
-              </a:ext>
-            </a:extLst>
-          </a:blip>
-          <a:stretch>
-            <a:fillRect/>
-          </a:stretch>
-        </p:blipFill>
-        <p:spPr>
-          <a:xfrm rot="0">
-            <a:off x="3883025" y="3364230"/>
-            <a:ext cx="1506220" cy="1998980"/>
-          </a:xfrm>
-          <a:prstGeom prst="roundRect"/>
-          <a:solidFill>
-            <a:srgbClr val="EDEDED"/>
-          </a:solidFill>
-        </p:spPr>
-      </p:pic>
-      <p:sp>
-        <p:nvSpPr>
-          <p:cNvPr id="1043" name="텍스트 상자 45"/>
-          <p:cNvSpPr txBox="1">
-            <a:spLocks/>
-          </p:cNvSpPr>
-          <p:nvPr/>
-        </p:nvSpPr>
-        <p:spPr>
-          <a:xfrm rot="0">
-            <a:off x="1466215" y="5487035"/>
-            <a:ext cx="3923030" cy="647065"/>
-          </a:xfrm>
-          <a:prstGeom prst="rect"/>
-          <a:noFill/>
-          <a:ln w="0">
-            <a:noFill/>
-            <a:prstDash/>
-          </a:ln>
-        </p:spPr>
-        <p:txBody>
-          <a:bodyPr wrap="square" lIns="89535" tIns="46355" rIns="89535" bIns="46355" numCol="1" vert="horz" anchor="t">
-            <a:spAutoFit/>
-          </a:bodyPr>
-          <a:lstStyle/>
-          <a:p>
-            <a:pPr marL="0" indent="0" rtl="0" algn="l" defTabSz="914400" eaLnBrk="1" latinLnBrk="0" hangingPunct="1">
-              <a:buFontTx/>
-              <a:buNone/>
-            </a:pPr>
-            <a:r>
-              <a:rPr sz="1800" b="1">
-                <a:solidFill>
-                  <a:srgbClr val="0611F2"/>
-                </a:solidFill>
-                <a:latin typeface="맑은 고딕" charset="0"/>
-                <a:ea typeface="맑은 고딕" charset="0"/>
-              </a:rPr>
-              <a:t>3</a:t>
-            </a:r>
-            <a:r>
-              <a:rPr lang="ko-KR" sz="1800" b="1">
-                <a:solidFill>
-                  <a:srgbClr val="0611F2"/>
-                </a:solidFill>
-                <a:latin typeface="맑은 고딕" charset="0"/>
-                <a:ea typeface="맑은 고딕" charset="0"/>
-              </a:rPr>
-              <a:t>7</a:t>
-            </a:r>
-            <a:r>
-              <a:rPr sz="1800" b="1">
-                <a:solidFill>
-                  <a:srgbClr val="0611F2"/>
-                </a:solidFill>
-                <a:latin typeface="맑은 고딕" charset="0"/>
-                <a:ea typeface="맑은 고딕" charset="0"/>
-              </a:rPr>
-              <a:t>.</a:t>
-            </a:r>
-            <a:r>
-              <a:rPr sz="1800">
-                <a:latin typeface="맑은 고딕" charset="0"/>
-                <a:ea typeface="맑은 고딕" charset="0"/>
-              </a:rPr>
-              <a:t> </a:t>
-            </a:r>
-            <a:r>
-              <a:rPr lang="ko-KR" sz="1800">
-                <a:latin typeface="맑은 고딕" charset="0"/>
-                <a:ea typeface="맑은 고딕" charset="0"/>
-              </a:rPr>
-              <a:t>이제 Character 오브젝트에 Contribute GI를 설정합니다.</a:t>
-            </a:r>
-            <a:endParaRPr lang="ko-KR" altLang="en-US" sz="1800">
-              <a:latin typeface="맑은 고딕" charset="0"/>
-              <a:ea typeface="맑은 고딕" charset="0"/>
-            </a:endParaRPr>
-          </a:p>
-        </p:txBody>
-      </p:sp>
-      <p:pic>
-        <p:nvPicPr>
-          <p:cNvPr id="1044" name="그림 46"/>
-          <p:cNvPicPr>
-            <a:picLocks noChangeAspect="1"/>
-          </p:cNvPicPr>
-          <p:nvPr/>
-        </p:nvPicPr>
-        <p:blipFill rotWithShape="1">
-          <a:blip r:embed="rId5" cstate="print">
-            <a:extLst>
-              <a:ext uri="{28A0092B-C50C-407E-A947-70E740481C1C}">
-                <a14:useLocalDpi xmlns:a14="http://schemas.microsoft.com/office/drawing/2010/main" val="0"/>
-              </a:ext>
-            </a:extLst>
-          </a:blip>
-          <a:stretch>
-            <a:fillRect/>
-          </a:stretch>
-        </p:blipFill>
-        <p:spPr>
-          <a:xfrm rot="0">
-            <a:off x="9583420" y="1877060"/>
-            <a:ext cx="1330325" cy="2629535"/>
-          </a:xfrm>
-          <a:prstGeom prst="roundRect"/>
-          <a:solidFill>
-            <a:srgbClr val="EDEDED"/>
-          </a:solidFill>
-        </p:spPr>
-      </p:pic>
-      <p:pic>
-        <p:nvPicPr>
-          <p:cNvPr id="1045" name="그림 49"/>
-          <p:cNvPicPr>
-            <a:picLocks noChangeAspect="1"/>
-          </p:cNvPicPr>
-          <p:nvPr/>
-        </p:nvPicPr>
-        <p:blipFill rotWithShape="1">
-          <a:blip r:embed="rId6" cstate="hqprint">
+          <a:blip r:embed="rId3" cstate="hqprint">
             <a:extLst>
               <a:ext uri="{28A0092B-C50C-407E-A947-70E740481C1C}">
                 <a14:useLocalDpi xmlns:a14="http://schemas.microsoft.com/office/drawing/2010/main"/>
@@ -12384,8 +12666,8 @@
         </p:blipFill>
         <p:spPr>
           <a:xfrm rot="0">
-            <a:off x="6832600" y="1332865"/>
-            <a:ext cx="2531110" cy="3727450"/>
+            <a:off x="6841490" y="1228725"/>
+            <a:ext cx="4194810" cy="2646680"/>
           </a:xfrm>
           <a:prstGeom prst="roundRect"/>
           <a:solidFill>
@@ -12393,6 +12675,123 @@
           </a:solidFill>
         </p:spPr>
       </p:pic>
+      <p:pic>
+        <p:nvPicPr>
+          <p:cNvPr id="1208" name="그림 48" descr="C:/Users/Admin1/AppData/Roaming/PolarisOffice/ETemp/10232_14344976/fImage211388841.png"/>
+          <p:cNvPicPr>
+            <a:picLocks noChangeAspect="1"/>
+          </p:cNvPicPr>
+          <p:nvPr/>
+        </p:nvPicPr>
+        <p:blipFill rotWithShape="1">
+          <a:blip r:embed="rId5" cstate="hqprint">
+            <a:extLst>
+              <a:ext uri="{28A0092B-C50C-407E-A947-70E740481C1C}">
+                <a14:useLocalDpi xmlns:a14="http://schemas.microsoft.com/office/drawing/2010/main"/>
+              </a:ext>
+            </a:extLst>
+          </a:blip>
+          <a:stretch>
+            <a:fillRect/>
+          </a:stretch>
+        </p:blipFill>
+        <p:spPr>
+          <a:xfrm rot="0">
+            <a:off x="1164590" y="1190625"/>
+            <a:ext cx="4023995" cy="4000500"/>
+          </a:xfrm>
+          <a:prstGeom prst="rect"/>
+          <a:noFill/>
+        </p:spPr>
+      </p:pic>
+      <p:sp>
+        <p:nvSpPr>
+          <p:cNvPr id="1209" name="텍스트 상자 49"/>
+          <p:cNvSpPr txBox="1">
+            <a:spLocks/>
+          </p:cNvSpPr>
+          <p:nvPr/>
+        </p:nvSpPr>
+        <p:spPr>
+          <a:xfrm rot="0">
+            <a:off x="1165860" y="5320665"/>
+            <a:ext cx="4013835" cy="908050"/>
+          </a:xfrm>
+          <a:prstGeom prst="rect"/>
+          <a:noFill/>
+        </p:spPr>
+        <p:txBody>
+          <a:bodyPr wrap="square" lIns="0" tIns="0" rIns="0" bIns="0" numCol="1" vert="horz" anchor="t">
+            <a:noAutofit/>
+          </a:bodyPr>
+          <a:lstStyle/>
+          <a:p>
+            <a:pPr marL="0" indent="0" algn="l" latinLnBrk="0" hangingPunct="1">
+              <a:buFontTx/>
+              <a:buNone/>
+            </a:pPr>
+            <a:r>
+              <a:rPr lang="ko-KR" sz="2000" b="1">
+                <a:solidFill>
+                  <a:srgbClr val="0611F2"/>
+                </a:solidFill>
+                <a:latin typeface="맑은 고딕" charset="0"/>
+                <a:ea typeface="맑은 고딕" charset="0"/>
+              </a:rPr>
+              <a:t>31.</a:t>
+            </a:r>
+            <a:r>
+              <a:rPr lang="ko-KR" sz="2000" b="1">
+                <a:solidFill>
+                  <a:srgbClr val="0611F2"/>
+                </a:solidFill>
+                <a:latin typeface="맑은 고딕" charset="0"/>
+                <a:ea typeface="맑은 고딕" charset="0"/>
+              </a:rPr>
+              <a:t> </a:t>
+            </a:r>
+            <a:r>
+              <a:rPr lang="ko-KR" sz="1800">
+                <a:latin typeface="맑은 고딕" charset="0"/>
+                <a:ea typeface="맑은 고딕" charset="0"/>
+              </a:rPr>
+              <a:t>그런 다음 Window에서 </a:t>
+            </a:r>
+            <a:r>
+              <a:rPr lang="ko-KR" sz="1800">
+                <a:latin typeface="맑은 고딕" charset="0"/>
+                <a:ea typeface="맑은 고딕" charset="0"/>
+              </a:rPr>
+              <a:t>Rendering을</a:t>
+            </a:r>
+            <a:r>
+              <a:rPr lang="ko-KR" sz="1800">
+                <a:latin typeface="맑은 고딕" charset="0"/>
+                <a:ea typeface="맑은 고딕" charset="0"/>
+              </a:rPr>
+              <a:t> 선택하고 Lighting </a:t>
+            </a:r>
+            <a:r>
+              <a:rPr lang="ko-KR" sz="1800">
+                <a:latin typeface="맑은 고딕" charset="0"/>
+                <a:ea typeface="맑은 고딕" charset="0"/>
+              </a:rPr>
+              <a:t>Settings를</a:t>
+            </a:r>
+            <a:r>
+              <a:rPr lang="ko-KR" sz="1800">
+                <a:latin typeface="맑은 고딕" charset="0"/>
+                <a:ea typeface="맑은 고딕" charset="0"/>
+              </a:rPr>
+              <a:t> 선택합니다. </a:t>
+            </a:r>
+            <a:endParaRPr lang="ko-KR" altLang="en-US" sz="1800">
+              <a:latin typeface="맑은 고딕" charset="0"/>
+              <a:ea typeface="맑은 고딕" charset="0"/>
+            </a:endParaRPr>
+          </a:p>
+        </p:txBody>
+      </p:sp>
     </p:spTree>
   </p:cSld>
   <p:clrMapOvr>

</xml_diff>

<commit_message>
Instantiate and Destroy Tutorial Renewal
- Realization of 3D object appearing
  in 2D space using render texture

- System planning to create game
  objects without prefab

- In LateUpdate, insert the position
  value of the game object to
  implement the camera object
  following

- Each PPT data update

- Adding and deleting resource data
</commit_message>
<xml_diff>
--- a/Assets/Class/Light/PPT Data/Light Example.pptx
+++ b/Assets/Class/Light/PPT Data/Light Example.pptx
@@ -2,7 +2,7 @@
 <file path=ppt/presentation.xml><?xml version="1.0" encoding="utf-8"?>
 <p:presentation xmlns:a="http://schemas.openxmlformats.org/drawingml/2006/main" xmlns:r="http://schemas.openxmlformats.org/officeDocument/2006/relationships" xmlns:p="http://schemas.openxmlformats.org/presentationml/2006/main" xmlns:p14="http://schemas.microsoft.com/office/powerpoint/2010/main" saveSubsetFonts="1" firstSlideNum="0">
   <p:sldMasterIdLst>
-    <p:sldMasterId id="2147486000" r:id="rId12"/>
+    <p:sldMasterId id="2147486013" r:id="rId12"/>
   </p:sldMasterIdLst>
   <p:notesMasterIdLst>
     <p:notesMasterId r:id="rId14"/>
@@ -16,9 +16,11 @@
     <p:sldId id="299" r:id="rId26"/>
     <p:sldId id="318" r:id="rId28"/>
     <p:sldId id="310" r:id="rId30"/>
-    <p:sldId id="319" r:id="rId31"/>
-    <p:sldId id="308" r:id="rId32"/>
-    <p:sldId id="313" r:id="rId34"/>
+    <p:sldId id="319" r:id="rId32"/>
+    <p:sldId id="320" r:id="rId34"/>
+    <p:sldId id="321" r:id="rId35"/>
+    <p:sldId id="308" r:id="rId36"/>
+    <p:sldId id="313" r:id="rId37"/>
   </p:sldIdLst>
   <p:sldSz cx="12192000" cy="6858000"/>
   <p:notesSz cx="6858000" cy="9144000"/>
@@ -649,7 +651,7 @@
         <p:spPr>
           <a:xfrm rot="0">
             <a:off x="685800" y="1143000"/>
-            <a:ext cx="5492750" cy="3092450"/>
+            <a:ext cx="5495290" cy="3094990"/>
           </a:xfrm>
           <a:prstGeom prst="rect"/>
           <a:noFill/>
@@ -688,7 +690,7 @@
         <p:spPr>
           <a:xfrm rot="0">
             <a:off x="685800" y="4400550"/>
-            <a:ext cx="5492750" cy="3606800"/>
+            <a:ext cx="5495290" cy="3609340"/>
           </a:xfrm>
           <a:prstGeom prst="rect"/>
         </p:spPr>
@@ -718,7 +720,7 @@
         <p:spPr>
           <a:xfrm rot="0">
             <a:off x="3884930" y="8685530"/>
-            <a:ext cx="2978150" cy="464820"/>
+            <a:ext cx="2980690" cy="467360"/>
           </a:xfrm>
           <a:prstGeom prst="rect"/>
         </p:spPr>
@@ -762,6 +764,290 @@
 </file>
 
 <file path=ppt/notesSlides/notesSlide11.xml><?xml version="1.0" encoding="utf-8"?>
+<p:notes xmlns:a="http://schemas.openxmlformats.org/drawingml/2006/main" xmlns:r="http://schemas.openxmlformats.org/officeDocument/2006/relationships" xmlns:p="http://schemas.openxmlformats.org/presentationml/2006/main">
+  <p:cSld>
+    <p:spTree>
+      <p:nvGrpSpPr>
+        <p:cNvPr id="1" name=""/>
+        <p:cNvGrpSpPr/>
+        <p:nvPr/>
+      </p:nvGrpSpPr>
+      <p:grpSpPr>
+        <a:xfrm>
+          <a:off x="0" y="0"/>
+          <a:ext cx="0" cy="0"/>
+          <a:chOff x="0" y="0"/>
+          <a:chExt cx="0" cy="0"/>
+        </a:xfrm>
+      </p:grpSpPr>
+      <p:sp>
+        <p:nvSpPr>
+          <p:cNvPr id="2" name="슬라이드 이미지 개체 틀 3"/>
+          <p:cNvSpPr>
+            <a:spLocks noChangeAspect="1"/>
+          </p:cNvSpPr>
+          <p:nvPr>
+            <p:ph type="sldImg" idx="2"/>
+          </p:nvPr>
+        </p:nvSpPr>
+        <p:spPr>
+          <a:xfrm rot="0">
+            <a:off x="685800" y="1143000"/>
+            <a:ext cx="5495290" cy="3094990"/>
+          </a:xfrm>
+          <a:prstGeom prst="rect"/>
+          <a:noFill/>
+          <a:ln w="12700" cap="flat" cmpd="sng">
+            <a:solidFill>
+              <a:srgbClr val="000000">
+                <a:alpha val="100000"/>
+              </a:srgbClr>
+            </a:solidFill>
+            <a:prstDash val="solid"/>
+          </a:ln>
+        </p:spPr>
+        <p:txBody>
+          <a:bodyPr wrap="square" lIns="91440" tIns="45720" rIns="91440" bIns="45720" numCol="1" vert="horz" anchor="ctr">
+            <a:noAutofit/>
+          </a:bodyPr>
+          <a:lstStyle/>
+          <a:p>
+            <a:pPr marL="0" indent="0" latinLnBrk="0">
+              <a:buFontTx/>
+              <a:buNone/>
+            </a:pPr>
+          </a:p>
+        </p:txBody>
+      </p:sp>
+      <p:sp>
+        <p:nvSpPr>
+          <p:cNvPr id="3" name="슬라이드 노트 개체 틀 4"/>
+          <p:cNvSpPr txBox="1">
+            <a:spLocks/>
+          </p:cNvSpPr>
+          <p:nvPr>
+            <p:ph type="body" idx="3"/>
+          </p:nvPr>
+        </p:nvSpPr>
+        <p:spPr>
+          <a:xfrm rot="0">
+            <a:off x="685800" y="4400550"/>
+            <a:ext cx="5495290" cy="3609340"/>
+          </a:xfrm>
+          <a:prstGeom prst="rect"/>
+        </p:spPr>
+        <p:txBody>
+          <a:bodyPr wrap="square" lIns="91440" tIns="45720" rIns="91440" bIns="45720" numCol="1" vert="horz" anchor="t">
+            <a:noAutofit/>
+          </a:bodyPr>
+          <a:lstStyle/>
+          <a:p>
+            <a:pPr marL="0" indent="0" latinLnBrk="0">
+              <a:buFontTx/>
+              <a:buNone/>
+            </a:pPr>
+          </a:p>
+        </p:txBody>
+      </p:sp>
+      <p:sp>
+        <p:nvSpPr>
+          <p:cNvPr id="4" name="슬라이드 번호 개체 틀 6"/>
+          <p:cNvSpPr txBox="1">
+            <a:spLocks/>
+          </p:cNvSpPr>
+          <p:nvPr>
+            <p:ph type="sldNum" idx="5"/>
+          </p:nvPr>
+        </p:nvSpPr>
+        <p:spPr>
+          <a:xfrm rot="0">
+            <a:off x="3884930" y="8685530"/>
+            <a:ext cx="2980690" cy="467360"/>
+          </a:xfrm>
+          <a:prstGeom prst="rect"/>
+        </p:spPr>
+        <p:txBody>
+          <a:bodyPr wrap="square" lIns="91440" tIns="45720" rIns="91440" bIns="45720" numCol="1" vert="horz" anchor="b">
+            <a:noAutofit/>
+          </a:bodyPr>
+          <a:lstStyle>
+            <a:lvl1pPr marL="0" indent="0" algn="r" latinLnBrk="0">
+              <a:buFontTx/>
+              <a:buNone/>
+              <a:defRPr lang="en-GB" altLang="en-US" sz="1200"/>
+            </a:lvl1pPr>
+          </a:lstStyle>
+          <a:p>
+            <a:pPr marL="0" indent="0" latinLnBrk="0">
+              <a:buFontTx/>
+              <a:buNone/>
+            </a:pPr>
+            <a:fld id="{B9320F77-B9A0-41C5-862A-B4B631284C64}" type="slidenum">
+              <a:rPr lang="ko-KR" altLang="en-US"/>
+              <a:t>‹#›</a:t>
+            </a:fld>
+          </a:p>
+        </p:txBody>
+      </p:sp>
+    </p:spTree>
+  </p:cSld>
+  <p:clrMapOvr>
+    <a:masterClrMapping/>
+  </p:clrMapOvr>
+  <mc:AlternateContent xmlns:mc="http://schemas.openxmlformats.org/markup-compatibility/2006">
+    <mc:Choice xmlns:p14="http://schemas.microsoft.com/office/powerpoint/2010/main" Requires="p14">
+      <p:transition spd="slow" p14:dur="0"/>
+    </mc:Choice>
+    <mc:Fallback>
+      <p:transition spd="slow"/>
+    </mc:Fallback>
+  </mc:AlternateContent>
+</p:notes>
+</file>
+
+<file path=ppt/notesSlides/notesSlide12.xml><?xml version="1.0" encoding="utf-8"?>
+<p:notes xmlns:a="http://schemas.openxmlformats.org/drawingml/2006/main" xmlns:r="http://schemas.openxmlformats.org/officeDocument/2006/relationships" xmlns:p="http://schemas.openxmlformats.org/presentationml/2006/main">
+  <p:cSld>
+    <p:spTree>
+      <p:nvGrpSpPr>
+        <p:cNvPr id="1" name=""/>
+        <p:cNvGrpSpPr/>
+        <p:nvPr/>
+      </p:nvGrpSpPr>
+      <p:grpSpPr>
+        <a:xfrm>
+          <a:off x="0" y="0"/>
+          <a:ext cx="0" cy="0"/>
+          <a:chOff x="0" y="0"/>
+          <a:chExt cx="0" cy="0"/>
+        </a:xfrm>
+      </p:grpSpPr>
+      <p:sp>
+        <p:nvSpPr>
+          <p:cNvPr id="2" name="슬라이드 이미지 개체 틀 3"/>
+          <p:cNvSpPr>
+            <a:spLocks noChangeAspect="1"/>
+          </p:cNvSpPr>
+          <p:nvPr>
+            <p:ph type="sldImg" idx="2"/>
+          </p:nvPr>
+        </p:nvSpPr>
+        <p:spPr>
+          <a:xfrm rot="0">
+            <a:off x="685800" y="1143000"/>
+            <a:ext cx="5492750" cy="3092450"/>
+          </a:xfrm>
+          <a:prstGeom prst="rect"/>
+          <a:noFill/>
+          <a:ln w="12700" cap="flat" cmpd="sng">
+            <a:solidFill>
+              <a:srgbClr val="000000">
+                <a:alpha val="100000"/>
+              </a:srgbClr>
+            </a:solidFill>
+            <a:prstDash val="solid"/>
+          </a:ln>
+        </p:spPr>
+        <p:txBody>
+          <a:bodyPr wrap="square" lIns="91440" tIns="45720" rIns="91440" bIns="45720" numCol="1" vert="horz" anchor="ctr">
+            <a:noAutofit/>
+          </a:bodyPr>
+          <a:lstStyle/>
+          <a:p>
+            <a:pPr marL="0" indent="0" latinLnBrk="0">
+              <a:buFontTx/>
+              <a:buNone/>
+            </a:pPr>
+          </a:p>
+        </p:txBody>
+      </p:sp>
+      <p:sp>
+        <p:nvSpPr>
+          <p:cNvPr id="3" name="슬라이드 노트 개체 틀 4"/>
+          <p:cNvSpPr txBox="1">
+            <a:spLocks/>
+          </p:cNvSpPr>
+          <p:nvPr>
+            <p:ph type="body" idx="3"/>
+          </p:nvPr>
+        </p:nvSpPr>
+        <p:spPr>
+          <a:xfrm rot="0">
+            <a:off x="685800" y="4400550"/>
+            <a:ext cx="5492750" cy="3606800"/>
+          </a:xfrm>
+          <a:prstGeom prst="rect"/>
+        </p:spPr>
+        <p:txBody>
+          <a:bodyPr wrap="square" lIns="91440" tIns="45720" rIns="91440" bIns="45720" numCol="1" vert="horz" anchor="t">
+            <a:noAutofit/>
+          </a:bodyPr>
+          <a:lstStyle/>
+          <a:p>
+            <a:pPr marL="0" indent="0" latinLnBrk="0">
+              <a:buFontTx/>
+              <a:buNone/>
+            </a:pPr>
+          </a:p>
+        </p:txBody>
+      </p:sp>
+      <p:sp>
+        <p:nvSpPr>
+          <p:cNvPr id="4" name="슬라이드 번호 개체 틀 6"/>
+          <p:cNvSpPr txBox="1">
+            <a:spLocks/>
+          </p:cNvSpPr>
+          <p:nvPr>
+            <p:ph type="sldNum" idx="5"/>
+          </p:nvPr>
+        </p:nvSpPr>
+        <p:spPr>
+          <a:xfrm rot="0">
+            <a:off x="3884930" y="8685530"/>
+            <a:ext cx="2978150" cy="464820"/>
+          </a:xfrm>
+          <a:prstGeom prst="rect"/>
+        </p:spPr>
+        <p:txBody>
+          <a:bodyPr wrap="square" lIns="91440" tIns="45720" rIns="91440" bIns="45720" numCol="1" vert="horz" anchor="b">
+            <a:noAutofit/>
+          </a:bodyPr>
+          <a:lstStyle>
+            <a:lvl1pPr marL="0" indent="0" algn="r" latinLnBrk="0">
+              <a:buFontTx/>
+              <a:buNone/>
+              <a:defRPr lang="en-GB" altLang="en-US" sz="1200"/>
+            </a:lvl1pPr>
+          </a:lstStyle>
+          <a:p>
+            <a:pPr marL="0" indent="0" latinLnBrk="0">
+              <a:buFontTx/>
+              <a:buNone/>
+            </a:pPr>
+            <a:fld id="{B9320F77-B9A0-41C5-862A-B4B631284C64}" type="slidenum">
+              <a:rPr lang="ko-KR" altLang="en-US"/>
+              <a:t>‹#›</a:t>
+            </a:fld>
+          </a:p>
+        </p:txBody>
+      </p:sp>
+    </p:spTree>
+  </p:cSld>
+  <p:clrMapOvr>
+    <a:masterClrMapping/>
+  </p:clrMapOvr>
+  <mc:AlternateContent xmlns:mc="http://schemas.openxmlformats.org/markup-compatibility/2006">
+    <mc:Choice xmlns:p14="http://schemas.microsoft.com/office/powerpoint/2010/main" Requires="p14">
+      <p:transition spd="slow" p14:dur="0"/>
+    </mc:Choice>
+    <mc:Fallback>
+      <p:transition spd="slow"/>
+    </mc:Fallback>
+  </mc:AlternateContent>
+</p:notes>
+</file>
+
+<file path=ppt/notesSlides/notesSlide13.xml><?xml version="1.0" encoding="utf-8"?>
 <p:notes xmlns:a="http://schemas.openxmlformats.org/drawingml/2006/main" xmlns:r="http://schemas.openxmlformats.org/officeDocument/2006/relationships" xmlns:p="http://schemas.openxmlformats.org/presentationml/2006/main">
   <p:cSld>
     <p:spTree>
@@ -7446,7 +7732,7 @@
 </file>
 
 <file path=ppt/slides/slide10.xml><?xml version="1.0" encoding="utf-8"?>
-<p:sld xmlns:a="http://schemas.openxmlformats.org/drawingml/2006/main" xmlns:r="http://schemas.openxmlformats.org/officeDocument/2006/relationships" xmlns:p="http://schemas.openxmlformats.org/presentationml/2006/main" xmlns:p14="http://schemas.microsoft.com/office/powerpoint/2010/main">
+<p:sld xmlns:a="http://schemas.openxmlformats.org/drawingml/2006/main" xmlns:r="http://schemas.openxmlformats.org/officeDocument/2006/relationships" xmlns:p="http://schemas.openxmlformats.org/presentationml/2006/main">
   <p:cSld>
     <p:spTree>
       <p:nvGrpSpPr>
@@ -7472,8 +7758,8 @@
         </p:nvSpPr>
         <p:spPr>
           <a:xfrm rot="0">
-            <a:off x="4292600" y="318770"/>
-            <a:ext cx="3613150" cy="554990"/>
+            <a:off x="4110990" y="327660"/>
+            <a:ext cx="3987165" cy="478155"/>
           </a:xfrm>
           <a:prstGeom prst="rect"/>
           <a:noFill/>
@@ -7488,41 +7774,187 @@
           </a:bodyPr>
           <a:lstStyle/>
           <a:p>
-            <a:pPr marL="0" indent="0" algn="l" latinLnBrk="0">
-              <a:buFontTx/>
-              <a:buNone/>
-            </a:pPr>
-            <a:r>
-              <a:rPr lang="ko-KR" altLang="en-US" sz="3000" b="1">
+            <a:pPr marL="0" indent="0" algn="ctr" latinLnBrk="0">
+              <a:buFontTx/>
+              <a:buNone/>
+            </a:pPr>
+            <a:r>
+              <a:rPr lang="ko-KR" altLang="en-US" sz="2500" b="1">
                 <a:solidFill>
                   <a:schemeClr val="tx1"/>
                 </a:solidFill>
-                <a:latin typeface="맑은 고딕" charset="0"/>
-                <a:ea typeface="맑은 고딕" charset="0"/>
+                <a:latin typeface="나눔바른고딕" charset="0"/>
+                <a:ea typeface="나눔바른고딕" charset="0"/>
               </a:rPr>
               <a:t>열</a:t>
             </a:r>
             <a:r>
-              <a:rPr lang="ko-KR" altLang="en-US" sz="3000" b="1">
+              <a:rPr lang="ko-KR" altLang="en-US" sz="2500" b="1">
                 <a:solidFill>
                   <a:schemeClr val="tx1"/>
                 </a:solidFill>
-                <a:latin typeface="맑은 고딕" charset="0"/>
-                <a:ea typeface="맑은 고딕" charset="0"/>
-              </a:rPr>
-              <a:t>세</a:t>
-            </a:r>
-            <a:r>
-              <a:rPr lang="ko-KR" altLang="en-US" sz="3000" b="1">
+                <a:latin typeface="나눔바른고딕" charset="0"/>
+                <a:ea typeface="나눔바른고딕" charset="0"/>
+              </a:rPr>
+              <a:t> 번째</a:t>
+            </a:r>
+            <a:r>
+              <a:rPr lang="ko-KR" altLang="en-US" sz="2500" b="1">
                 <a:solidFill>
                   <a:schemeClr val="tx1"/>
                 </a:solidFill>
-                <a:latin typeface="맑은 고딕" charset="0"/>
-                <a:ea typeface="맑은 고딕" charset="0"/>
-              </a:rPr>
-              <a:t> 번째 튜토리얼</a:t>
-            </a:r>
-            <a:endParaRPr lang="ko-KR" altLang="en-US" sz="3000" b="1">
+                <a:latin typeface="나눔바른고딕" charset="0"/>
+                <a:ea typeface="나눔바른고딕" charset="0"/>
+              </a:rPr>
+              <a:t> </a:t>
+            </a:r>
+            <a:r>
+              <a:rPr lang="ko-KR" altLang="en-US" sz="2500" b="1">
+                <a:solidFill>
+                  <a:schemeClr val="tx1"/>
+                </a:solidFill>
+                <a:latin typeface="나눔바른고딕" charset="0"/>
+                <a:ea typeface="나눔바른고딕" charset="0"/>
+              </a:rPr>
+              <a:t>튜토리얼</a:t>
+            </a:r>
+            <a:endParaRPr lang="ko-KR" altLang="en-US" sz="2500" b="1">
+              <a:solidFill>
+                <a:schemeClr val="tx1"/>
+              </a:solidFill>
+              <a:latin typeface="나눔바른고딕" charset="0"/>
+              <a:ea typeface="나눔바른고딕" charset="0"/>
+            </a:endParaRPr>
+          </a:p>
+        </p:txBody>
+      </p:sp>
+      <p:sp>
+        <p:nvSpPr>
+          <p:cNvPr id="1054" name="Rect 0"/>
+          <p:cNvSpPr txBox="1">
+            <a:spLocks/>
+          </p:cNvSpPr>
+          <p:nvPr/>
+        </p:nvSpPr>
+        <p:spPr>
+          <a:xfrm rot="0">
+            <a:off x="6822440" y="5283835"/>
+            <a:ext cx="4135120" cy="892175"/>
+          </a:xfrm>
+          <a:prstGeom prst="rect"/>
+          <a:noFill/>
+        </p:spPr>
+        <p:txBody>
+          <a:bodyPr wrap="square" lIns="0" tIns="0" rIns="0" bIns="0" numCol="1" vert="horz" anchor="t">
+            <a:noAutofit/>
+          </a:bodyPr>
+          <a:lstStyle/>
+          <a:p>
+            <a:pPr marL="0" indent="0" algn="l" latinLnBrk="0" hangingPunct="1">
+              <a:buFontTx/>
+              <a:buNone/>
+            </a:pPr>
+            <a:r>
+              <a:rPr lang="ko-KR" sz="1800" i="0" b="0">
+                <a:solidFill>
+                  <a:schemeClr val="tx1"/>
+                </a:solidFill>
+                <a:latin typeface="맑은 고딕" charset="0"/>
+                <a:ea typeface="맑은 고딕" charset="0"/>
+              </a:rPr>
+              <a:t>라이트</a:t>
+            </a:r>
+            <a:r>
+              <a:rPr lang="ko-KR" sz="1800" i="0" b="0">
+                <a:solidFill>
+                  <a:schemeClr val="tx1"/>
+                </a:solidFill>
+                <a:latin typeface="맑은 고딕" charset="0"/>
+                <a:ea typeface="맑은 고딕" charset="0"/>
+              </a:rPr>
+              <a:t> </a:t>
+            </a:r>
+            <a:r>
+              <a:rPr lang="ko-KR" sz="1800" i="0" b="0">
+                <a:solidFill>
+                  <a:schemeClr val="tx1"/>
+                </a:solidFill>
+                <a:latin typeface="맑은 고딕" charset="0"/>
+                <a:ea typeface="맑은 고딕" charset="0"/>
+              </a:rPr>
+              <a:t>프로브 그룹의 경우 영역 근처에 </a:t>
+            </a:r>
+            <a:r>
+              <a:rPr lang="ko-KR" sz="1800" i="0" b="0">
+                <a:solidFill>
+                  <a:schemeClr val="tx1"/>
+                </a:solidFill>
+                <a:latin typeface="맑은 고딕" charset="0"/>
+                <a:ea typeface="맑은 고딕" charset="0"/>
+              </a:rPr>
+              <a:t>있는</a:t>
+            </a:r>
+            <a:r>
+              <a:rPr lang="ko-KR" sz="1800" i="0" b="0">
+                <a:solidFill>
+                  <a:schemeClr val="tx1"/>
+                </a:solidFill>
+                <a:latin typeface="맑은 고딕" charset="0"/>
+                <a:ea typeface="맑은 고딕" charset="0"/>
+              </a:rPr>
+              <a:t> Mesh Renderer의 값을 보간한 </a:t>
+            </a:r>
+            <a:r>
+              <a:rPr lang="ko-KR" sz="1800" i="0" b="0">
+                <a:solidFill>
+                  <a:schemeClr val="tx1"/>
+                </a:solidFill>
+                <a:latin typeface="맑은 고딕" charset="0"/>
+                <a:ea typeface="맑은 고딕" charset="0"/>
+              </a:rPr>
+              <a:t>다</a:t>
+            </a:r>
+            <a:r>
+              <a:rPr lang="ko-KR" sz="1800" i="0" b="0">
+                <a:solidFill>
+                  <a:schemeClr val="tx1"/>
+                </a:solidFill>
+                <a:latin typeface="맑은 고딕" charset="0"/>
+                <a:ea typeface="맑은 고딕" charset="0"/>
+              </a:rPr>
+              <a:t>음</a:t>
+            </a:r>
+            <a:r>
+              <a:rPr lang="ko-KR" sz="1800" i="0" b="0">
+                <a:solidFill>
+                  <a:schemeClr val="tx1"/>
+                </a:solidFill>
+                <a:latin typeface="맑은 고딕" charset="0"/>
+                <a:ea typeface="맑은 고딕" charset="0"/>
+              </a:rPr>
+              <a:t> </a:t>
+            </a:r>
+            <a:r>
+              <a:rPr lang="ko-KR" sz="1800" i="0" b="0">
+                <a:solidFill>
+                  <a:schemeClr val="tx1"/>
+                </a:solidFill>
+                <a:latin typeface="맑은 고딕" charset="0"/>
+                <a:ea typeface="맑은 고딕" charset="0"/>
+              </a:rPr>
+              <a:t>빛을 적용시킵니다.</a:t>
+            </a:r>
+            <a:r>
+              <a:rPr lang="ko-KR" sz="1800" i="0" b="0">
+                <a:solidFill>
+                  <a:schemeClr val="tx1"/>
+                </a:solidFill>
+                <a:latin typeface="맑은 고딕" charset="0"/>
+                <a:ea typeface="맑은 고딕" charset="0"/>
+              </a:rPr>
+              <a:t>					</a:t>
+            </a:r>
+            <a:endParaRPr lang="ko-KR" altLang="en-US" sz="1800" i="0" b="0">
               <a:solidFill>
                 <a:schemeClr val="tx1"/>
               </a:solidFill>
@@ -7532,115 +7964,16 @@
           </a:p>
         </p:txBody>
       </p:sp>
-      <p:sp>
-        <p:nvSpPr>
-          <p:cNvPr id="1191" name="Rect 0"/>
-          <p:cNvSpPr txBox="1">
-            <a:spLocks/>
-          </p:cNvSpPr>
-          <p:nvPr/>
-        </p:nvSpPr>
-        <p:spPr>
-          <a:xfrm rot="0">
-            <a:off x="6845935" y="4043680"/>
-            <a:ext cx="4199255" cy="2031365"/>
-          </a:xfrm>
-          <a:prstGeom prst="rect"/>
-          <a:noFill/>
-          <a:ln w="0">
-            <a:noFill/>
-            <a:prstDash/>
-          </a:ln>
-        </p:spPr>
-        <p:txBody>
-          <a:bodyPr wrap="square" lIns="89535" tIns="46355" rIns="89535" bIns="46355" numCol="1" vert="horz" anchor="t">
-            <a:spAutoFit/>
-          </a:bodyPr>
-          <a:lstStyle/>
-          <a:p>
-            <a:pPr marL="0" indent="0" rtl="0" algn="l" defTabSz="914400" eaLnBrk="1" latinLnBrk="0" hangingPunct="1">
-              <a:buFontTx/>
-              <a:buNone/>
-            </a:pPr>
-            <a:r>
-              <a:rPr lang="ko-KR" sz="1800">
-                <a:latin typeface="맑은 고딕" charset="0"/>
-                <a:ea typeface="맑은 고딕" charset="0"/>
-              </a:rPr>
-              <a:t>라이트 맵은 실시간으로 생성되는 빛에 대한 정보를 한</a:t>
-            </a:r>
-            <a:r>
-              <a:rPr lang="ko-KR" sz="1800">
-                <a:latin typeface="맑은 고딕" charset="0"/>
-                <a:ea typeface="맑은 고딕" charset="0"/>
-              </a:rPr>
-              <a:t> </a:t>
-            </a:r>
-            <a:r>
-              <a:rPr lang="ko-KR" sz="1800">
-                <a:latin typeface="맑은 고딕" charset="0"/>
-                <a:ea typeface="맑은 고딕" charset="0"/>
-              </a:rPr>
-              <a:t>번에 </a:t>
-            </a:r>
-            <a:r>
-              <a:rPr lang="ko-KR" sz="1800">
-                <a:latin typeface="맑은 고딕" charset="0"/>
-                <a:ea typeface="맑은 고딕" charset="0"/>
-              </a:rPr>
-              <a:t>저장한 </a:t>
-            </a:r>
-            <a:r>
-              <a:rPr lang="ko-KR" sz="1800">
-                <a:latin typeface="맑은 고딕" charset="0"/>
-                <a:ea typeface="맑은 고딕" charset="0"/>
-              </a:rPr>
-              <a:t>텍스처입니다.</a:t>
-            </a:r>
-            <a:endParaRPr lang="ko-KR" altLang="en-US" sz="1800">
-              <a:latin typeface="맑은 고딕" charset="0"/>
-              <a:ea typeface="맑은 고딕" charset="0"/>
-            </a:endParaRPr>
-          </a:p>
-          <a:p>
-            <a:pPr marL="0" indent="0" rtl="0" algn="l" defTabSz="914400" eaLnBrk="1" latinLnBrk="0" hangingPunct="1">
-              <a:buFontTx/>
-              <a:buNone/>
-            </a:pPr>
-            <a:endParaRPr lang="ko-KR" altLang="en-US" sz="1800">
-              <a:latin typeface="맑은 고딕" charset="0"/>
-              <a:ea typeface="맑은 고딕" charset="0"/>
-            </a:endParaRPr>
-          </a:p>
-          <a:p>
-            <a:pPr marL="0" indent="0" rtl="0" algn="l" defTabSz="914400" eaLnBrk="1" latinLnBrk="0" hangingPunct="1">
-              <a:buFontTx/>
-              <a:buNone/>
-            </a:pPr>
-            <a:r>
-              <a:rPr lang="ko-KR" sz="1800">
-                <a:latin typeface="맑은 고딕" charset="0"/>
-                <a:ea typeface="맑은 고딕" charset="0"/>
-              </a:rPr>
-              <a:t>라이트 맵의 경우 빛을 받은 게임 오브젝트는 그림자와 반사면이 고정되어 있는 형태로 설정됩니다.</a:t>
-            </a:r>
-            <a:endParaRPr lang="ko-KR" altLang="en-US" sz="1800">
-              <a:latin typeface="맑은 고딕" charset="0"/>
-              <a:ea typeface="맑은 고딕" charset="0"/>
-            </a:endParaRPr>
-          </a:p>
-        </p:txBody>
-      </p:sp>
       <p:pic>
         <p:nvPicPr>
-          <p:cNvPr id="1207" name="그림 29"/>
+          <p:cNvPr id="1058" name="Picture " descr="C:/Users/Admin1/AppData/Roaming/PolarisOffice/ETemp/26564_9303048/fImage24803535741.png"/>
           <p:cNvPicPr>
             <a:picLocks noChangeAspect="1"/>
           </p:cNvPicPr>
           <p:nvPr/>
         </p:nvPicPr>
         <p:blipFill rotWithShape="1">
-          <a:blip r:embed="rId3" cstate="hqprint">
+          <a:blip r:embed="rId2" cstate="hqprint">
             <a:extLst>
               <a:ext uri="{28A0092B-C50C-407E-A947-70E740481C1C}">
                 <a14:useLocalDpi xmlns:a14="http://schemas.microsoft.com/office/drawing/2010/main"/>
@@ -7653,8 +7986,8 @@
         </p:blipFill>
         <p:spPr>
           <a:xfrm rot="0">
-            <a:off x="6841490" y="1228725"/>
-            <a:ext cx="4194810" cy="2646680"/>
+            <a:off x="6824980" y="2764790"/>
+            <a:ext cx="4132580" cy="2257425"/>
           </a:xfrm>
           <a:prstGeom prst="roundRect"/>
           <a:solidFill>
@@ -7662,19 +7995,295 @@
           </a:solidFill>
         </p:spPr>
       </p:pic>
+      <p:sp>
+        <p:nvSpPr>
+          <p:cNvPr id="1059" name="텍스트 상자 1"/>
+          <p:cNvSpPr txBox="1">
+            <a:spLocks/>
+          </p:cNvSpPr>
+          <p:nvPr/>
+        </p:nvSpPr>
+        <p:spPr>
+          <a:xfrm rot="0">
+            <a:off x="6826250" y="1447165"/>
+            <a:ext cx="4131310" cy="1189355"/>
+          </a:xfrm>
+          <a:prstGeom prst="rect"/>
+          <a:noFill/>
+        </p:spPr>
+        <p:txBody>
+          <a:bodyPr wrap="square" lIns="0" tIns="0" rIns="0" bIns="0" numCol="1" vert="horz" anchor="t">
+            <a:noAutofit/>
+          </a:bodyPr>
+          <a:lstStyle/>
+          <a:p>
+            <a:pPr marL="0" indent="0" algn="l" latinLnBrk="0" hangingPunct="1">
+              <a:buFontTx/>
+              <a:buNone/>
+            </a:pPr>
+            <a:r>
+              <a:rPr lang="ko-KR" sz="1800" i="0" b="0">
+                <a:solidFill>
+                  <a:schemeClr val="tx1"/>
+                </a:solidFill>
+                <a:latin typeface="맑은 고딕" charset="0"/>
+                <a:ea typeface="맑은 고딕" charset="0"/>
+              </a:rPr>
+              <a:t>라이트</a:t>
+            </a:r>
+            <a:r>
+              <a:rPr lang="ko-KR" sz="1800" i="0" b="0">
+                <a:solidFill>
+                  <a:schemeClr val="tx1"/>
+                </a:solidFill>
+                <a:latin typeface="맑은 고딕" charset="0"/>
+                <a:ea typeface="맑은 고딕" charset="0"/>
+              </a:rPr>
+              <a:t> </a:t>
+            </a:r>
+            <a:r>
+              <a:rPr lang="ko-KR" sz="1800" i="0" b="0">
+                <a:solidFill>
+                  <a:schemeClr val="tx1"/>
+                </a:solidFill>
+                <a:latin typeface="맑은 고딕" charset="0"/>
+                <a:ea typeface="맑은 고딕" charset="0"/>
+              </a:rPr>
+              <a:t>프로브</a:t>
+            </a:r>
+            <a:r>
+              <a:rPr lang="ko-KR" sz="1800" i="0" b="0">
+                <a:solidFill>
+                  <a:schemeClr val="tx1"/>
+                </a:solidFill>
+                <a:latin typeface="맑은 고딕" charset="0"/>
+                <a:ea typeface="맑은 고딕" charset="0"/>
+              </a:rPr>
+              <a:t> </a:t>
+            </a:r>
+            <a:r>
+              <a:rPr lang="ko-KR" sz="1800" i="0" b="0">
+                <a:solidFill>
+                  <a:schemeClr val="tx1"/>
+                </a:solidFill>
+                <a:latin typeface="맑은 고딕" charset="0"/>
+                <a:ea typeface="맑은 고딕" charset="0"/>
+              </a:rPr>
+              <a:t>그룹</a:t>
+            </a:r>
+            <a:r>
+              <a:rPr lang="ko-KR" sz="1800" i="0" b="0">
+                <a:solidFill>
+                  <a:schemeClr val="tx1"/>
+                </a:solidFill>
+                <a:latin typeface="맑은 고딕" charset="0"/>
+                <a:ea typeface="맑은 고딕" charset="0"/>
+              </a:rPr>
+              <a:t>은 동적으로 </a:t>
+            </a:r>
+            <a:r>
+              <a:rPr lang="ko-KR" sz="1800" i="0" b="0">
+                <a:solidFill>
+                  <a:schemeClr val="tx1"/>
+                </a:solidFill>
+                <a:latin typeface="맑은 고딕" charset="0"/>
+                <a:ea typeface="맑은 고딕" charset="0"/>
+              </a:rPr>
+              <a:t>움직이는</a:t>
+            </a:r>
+            <a:r>
+              <a:rPr lang="ko-KR" sz="1800" i="0" b="0">
+                <a:solidFill>
+                  <a:schemeClr val="tx1"/>
+                </a:solidFill>
+                <a:latin typeface="맑은 고딕" charset="0"/>
+                <a:ea typeface="맑은 고딕" charset="0"/>
+              </a:rPr>
+              <a:t> </a:t>
+            </a:r>
+            <a:r>
+              <a:rPr lang="ko-KR" sz="1800" i="0" b="0">
+                <a:solidFill>
+                  <a:schemeClr val="tx1"/>
+                </a:solidFill>
+                <a:latin typeface="맑은 고딕" charset="0"/>
+                <a:ea typeface="맑은 고딕" charset="0"/>
+              </a:rPr>
+              <a:t>오브젝트의</a:t>
+            </a:r>
+            <a:r>
+              <a:rPr lang="ko-KR" sz="1800" i="0" b="0">
+                <a:solidFill>
+                  <a:schemeClr val="tx1"/>
+                </a:solidFill>
+                <a:latin typeface="맑은 고딕" charset="0"/>
+                <a:ea typeface="맑은 고딕" charset="0"/>
+              </a:rPr>
+              <a:t> 빛 연산을 </a:t>
+            </a:r>
+            <a:r>
+              <a:rPr lang="ko-KR" sz="1800" i="0" b="0">
+                <a:solidFill>
+                  <a:schemeClr val="tx1"/>
+                </a:solidFill>
+                <a:latin typeface="맑은 고딕" charset="0"/>
+                <a:ea typeface="맑은 고딕" charset="0"/>
+              </a:rPr>
+              <a:t>사전에</a:t>
+            </a:r>
+            <a:r>
+              <a:rPr lang="ko-KR" sz="1800" i="0" b="0">
+                <a:solidFill>
+                  <a:schemeClr val="tx1"/>
+                </a:solidFill>
+                <a:latin typeface="맑은 고딕" charset="0"/>
+                <a:ea typeface="맑은 고딕" charset="0"/>
+              </a:rPr>
+              <a:t> </a:t>
+            </a:r>
+            <a:r>
+              <a:rPr lang="ko-KR" sz="1800" i="0" b="0">
+                <a:solidFill>
+                  <a:schemeClr val="tx1"/>
+                </a:solidFill>
+                <a:latin typeface="맑은 고딕" charset="0"/>
+                <a:ea typeface="맑은 고딕" charset="0"/>
+              </a:rPr>
+              <a:t>배치한</a:t>
+            </a:r>
+            <a:r>
+              <a:rPr lang="ko-KR" sz="1800" i="0" b="0">
+                <a:solidFill>
+                  <a:schemeClr val="tx1"/>
+                </a:solidFill>
+                <a:latin typeface="맑은 고딕" charset="0"/>
+                <a:ea typeface="맑은 고딕" charset="0"/>
+              </a:rPr>
+              <a:t> </a:t>
+            </a:r>
+            <a:r>
+              <a:rPr lang="ko-KR" sz="1800" i="0" b="0">
+                <a:solidFill>
+                  <a:schemeClr val="tx1"/>
+                </a:solidFill>
+                <a:latin typeface="맑은 고딕" charset="0"/>
+                <a:ea typeface="맑은 고딕" charset="0"/>
+              </a:rPr>
+              <a:t>빛의</a:t>
+            </a:r>
+            <a:r>
+              <a:rPr lang="ko-KR" sz="1800" i="0" b="0">
+                <a:solidFill>
+                  <a:schemeClr val="tx1"/>
+                </a:solidFill>
+                <a:latin typeface="맑은 고딕" charset="0"/>
+                <a:ea typeface="맑은 고딕" charset="0"/>
+              </a:rPr>
+              <a:t> </a:t>
+            </a:r>
+            <a:r>
+              <a:rPr lang="ko-KR" sz="1800" i="0" b="0">
+                <a:solidFill>
+                  <a:schemeClr val="tx1"/>
+                </a:solidFill>
+                <a:latin typeface="맑은 고딕" charset="0"/>
+                <a:ea typeface="맑은 고딕" charset="0"/>
+              </a:rPr>
+              <a:t>정보</a:t>
+            </a:r>
+            <a:r>
+              <a:rPr lang="ko-KR" sz="1800" i="0" b="0">
+                <a:solidFill>
+                  <a:schemeClr val="tx1"/>
+                </a:solidFill>
+                <a:latin typeface="맑은 고딕" charset="0"/>
+                <a:ea typeface="맑은 고딕" charset="0"/>
+              </a:rPr>
+              <a:t> </a:t>
+            </a:r>
+            <a:r>
+              <a:rPr lang="ko-KR" sz="1800" i="0" b="0">
+                <a:solidFill>
+                  <a:schemeClr val="tx1"/>
+                </a:solidFill>
+                <a:latin typeface="맑은 고딕" charset="0"/>
+                <a:ea typeface="맑은 고딕" charset="0"/>
+              </a:rPr>
+              <a:t>값을</a:t>
+            </a:r>
+            <a:r>
+              <a:rPr lang="ko-KR" sz="1800" i="0" b="0">
+                <a:solidFill>
+                  <a:schemeClr val="tx1"/>
+                </a:solidFill>
+                <a:latin typeface="맑은 고딕" charset="0"/>
+                <a:ea typeface="맑은 고딕" charset="0"/>
+              </a:rPr>
+              <a:t> </a:t>
+            </a:r>
+            <a:r>
+              <a:rPr lang="ko-KR" sz="1800" i="0" b="0">
+                <a:solidFill>
+                  <a:schemeClr val="tx1"/>
+                </a:solidFill>
+                <a:latin typeface="맑은 고딕" charset="0"/>
+                <a:ea typeface="맑은 고딕" charset="0"/>
+              </a:rPr>
+              <a:t>저장하여 해당 </a:t>
+            </a:r>
+            <a:r>
+              <a:rPr lang="ko-KR" sz="1800" i="0" b="0">
+                <a:solidFill>
+                  <a:schemeClr val="tx1"/>
+                </a:solidFill>
+                <a:latin typeface="맑은 고딕" charset="0"/>
+                <a:ea typeface="맑은 고딕" charset="0"/>
+              </a:rPr>
+              <a:t>위치에서</a:t>
+            </a:r>
+            <a:r>
+              <a:rPr lang="ko-KR" sz="1800" i="0" b="0">
+                <a:solidFill>
+                  <a:schemeClr val="tx1"/>
+                </a:solidFill>
+                <a:latin typeface="맑은 고딕" charset="0"/>
+                <a:ea typeface="맑은 고딕" charset="0"/>
+              </a:rPr>
+              <a:t> 계산하는 방법입니다.</a:t>
+            </a:r>
+            <a:r>
+              <a:rPr lang="ko-KR" sz="1800" i="0" b="0">
+                <a:solidFill>
+                  <a:schemeClr val="tx1"/>
+                </a:solidFill>
+                <a:latin typeface="맑은 고딕" charset="0"/>
+                <a:ea typeface="맑은 고딕" charset="0"/>
+              </a:rPr>
+              <a:t>		</a:t>
+            </a:r>
+            <a:endParaRPr lang="ko-KR" altLang="en-US" sz="1800" i="0" b="0">
+              <a:solidFill>
+                <a:schemeClr val="tx1"/>
+              </a:solidFill>
+              <a:latin typeface="맑은 고딕" charset="0"/>
+              <a:ea typeface="맑은 고딕" charset="0"/>
+            </a:endParaRPr>
+          </a:p>
+        </p:txBody>
+      </p:sp>
       <p:pic>
         <p:nvPicPr>
-          <p:cNvPr id="1208" name="그림 48" descr="C:/Users/Admin1/AppData/Roaming/PolarisOffice/ETemp/10232_14344976/fImage211388841.png"/>
+          <p:cNvPr id="1060" name="그림 2" descr="C:/Users/Admin1/AppData/Roaming/PolarisOffice/ETemp/26564_9303048/fImage1031526941.png"/>
           <p:cNvPicPr>
             <a:picLocks noChangeAspect="1"/>
           </p:cNvPicPr>
           <p:nvPr/>
         </p:nvPicPr>
         <p:blipFill rotWithShape="1">
-          <a:blip r:embed="rId5" cstate="hqprint">
+          <a:blip r:embed="rId3" cstate="print">
             <a:extLst>
               <a:ext uri="{28A0092B-C50C-407E-A947-70E740481C1C}">
-                <a14:useLocalDpi xmlns:a14="http://schemas.microsoft.com/office/drawing/2010/main"/>
+                <a14:useLocalDpi xmlns:a14="http://schemas.microsoft.com/office/drawing/2010/main" val="0"/>
               </a:ext>
             </a:extLst>
           </a:blip>
@@ -7684,16 +8293,49 @@
         </p:blipFill>
         <p:spPr>
           <a:xfrm rot="0">
-            <a:off x="1164590" y="1190625"/>
-            <a:ext cx="4023995" cy="4000500"/>
-          </a:xfrm>
-          <a:prstGeom prst="rect"/>
-          <a:noFill/>
+            <a:off x="4108450" y="2419985"/>
+            <a:ext cx="1258570" cy="1930400"/>
+          </a:xfrm>
+          <a:prstGeom prst="roundRect"/>
+          <a:solidFill>
+            <a:srgbClr val="EDEDED"/>
+          </a:solidFill>
+        </p:spPr>
+      </p:pic>
+      <p:pic>
+        <p:nvPicPr>
+          <p:cNvPr id="1061" name="그림 3" descr="C:/Users/Admin1/AppData/Roaming/PolarisOffice/ETemp/26564_9303048/fImage171842708467.png"/>
+          <p:cNvPicPr>
+            <a:picLocks noChangeAspect="1"/>
+          </p:cNvPicPr>
+          <p:nvPr/>
+        </p:nvPicPr>
+        <p:blipFill rotWithShape="1">
+          <a:blip r:embed="rId4" cstate="print">
+            <a:extLst>
+              <a:ext uri="{28A0092B-C50C-407E-A947-70E740481C1C}">
+                <a14:useLocalDpi xmlns:a14="http://schemas.microsoft.com/office/drawing/2010/main" val="0"/>
+              </a:ext>
+            </a:extLst>
+          </a:blip>
+          <a:stretch>
+            <a:fillRect/>
+          </a:stretch>
+        </p:blipFill>
+        <p:spPr>
+          <a:xfrm rot="0">
+            <a:off x="1231900" y="1447165"/>
+            <a:ext cx="2731135" cy="3867785"/>
+          </a:xfrm>
+          <a:prstGeom prst="roundRect"/>
+          <a:solidFill>
+            <a:srgbClr val="EDEDED"/>
+          </a:solidFill>
         </p:spPr>
       </p:pic>
       <p:sp>
         <p:nvSpPr>
-          <p:cNvPr id="1209" name="텍스트 상자 49"/>
+          <p:cNvPr id="1062" name="텍스트 상자 7"/>
           <p:cNvSpPr txBox="1">
             <a:spLocks/>
           </p:cNvSpPr>
@@ -7701,40 +8343,61 @@
         </p:nvSpPr>
         <p:spPr>
           <a:xfrm rot="0">
-            <a:off x="1165860" y="5320665"/>
-            <a:ext cx="4013835" cy="908050"/>
+            <a:off x="1231900" y="5532755"/>
+            <a:ext cx="4135120" cy="647065"/>
           </a:xfrm>
           <a:prstGeom prst="rect"/>
           <a:noFill/>
+          <a:ln w="0">
+            <a:noFill/>
+            <a:prstDash/>
+          </a:ln>
         </p:spPr>
         <p:txBody>
-          <a:bodyPr wrap="square" lIns="0" tIns="0" rIns="0" bIns="0" numCol="1" vert="horz" anchor="t">
-            <a:noAutofit/>
+          <a:bodyPr wrap="square" lIns="89535" tIns="46355" rIns="89535" bIns="46355" numCol="1" vert="horz" anchor="t">
+            <a:spAutoFit/>
           </a:bodyPr>
           <a:lstStyle/>
           <a:p>
-            <a:pPr marL="0" indent="0" algn="l" latinLnBrk="0" hangingPunct="1">
-              <a:buFontTx/>
-              <a:buNone/>
-            </a:pPr>
-            <a:r>
-              <a:rPr lang="ko-KR" sz="2000" b="1">
+            <a:pPr marL="0" indent="0" rtl="0" algn="l" defTabSz="914400" eaLnBrk="1" latinLnBrk="0" hangingPunct="1">
+              <a:buFontTx/>
+              <a:buNone/>
+            </a:pPr>
+            <a:r>
+              <a:rPr sz="1800" b="1">
                 <a:solidFill>
                   <a:srgbClr val="0611F2"/>
                 </a:solidFill>
                 <a:latin typeface="맑은 고딕" charset="0"/>
                 <a:ea typeface="맑은 고딕" charset="0"/>
               </a:rPr>
-              <a:t>31.</a:t>
-            </a:r>
-            <a:r>
-              <a:rPr lang="ko-KR" sz="2000" b="1">
+              <a:t>2</a:t>
+            </a:r>
+            <a:r>
+              <a:rPr lang="ko-KR" sz="1800" b="1">
                 <a:solidFill>
                   <a:srgbClr val="0611F2"/>
                 </a:solidFill>
                 <a:latin typeface="맑은 고딕" charset="0"/>
                 <a:ea typeface="맑은 고딕" charset="0"/>
               </a:rPr>
+              <a:t>8</a:t>
+            </a:r>
+            <a:r>
+              <a:rPr sz="1800" b="1">
+                <a:solidFill>
+                  <a:srgbClr val="0611F2"/>
+                </a:solidFill>
+                <a:latin typeface="맑은 고딕" charset="0"/>
+                <a:ea typeface="맑은 고딕" charset="0"/>
+              </a:rPr>
+              <a:t>.</a:t>
+            </a:r>
+            <a:r>
+              <a:rPr sz="1800">
+                <a:latin typeface="맑은 고딕" charset="0"/>
+                <a:ea typeface="맑은 고딕" charset="0"/>
+              </a:rPr>
               <a:t> </a:t>
             </a:r>
             <a:r>
@@ -7742,35 +8405,28 @@
                 <a:latin typeface="맑은 고딕" charset="0"/>
                 <a:ea typeface="맑은 고딕" charset="0"/>
               </a:rPr>
-              <a:t>그런 다음 Window에서 </a:t>
-            </a:r>
-            <a:r>
-              <a:rPr lang="ko-KR" sz="1800">
-                <a:latin typeface="맑은 고딕" charset="0"/>
-                <a:ea typeface="맑은 고딕" charset="0"/>
-              </a:rPr>
-              <a:t>Rendering을</a:t>
-            </a:r>
-            <a:r>
-              <a:rPr lang="ko-KR" sz="1800">
-                <a:latin typeface="맑은 고딕" charset="0"/>
-                <a:ea typeface="맑은 고딕" charset="0"/>
-              </a:rPr>
-              <a:t> 선택하고 Lighting </a:t>
-            </a:r>
-            <a:r>
-              <a:rPr lang="ko-KR" sz="1800">
-                <a:latin typeface="맑은 고딕" charset="0"/>
-                <a:ea typeface="맑은 고딕" charset="0"/>
-              </a:rPr>
-              <a:t>Settings를</a:t>
-            </a:r>
-            <a:r>
-              <a:rPr lang="ko-KR" sz="1800">
-                <a:latin typeface="맑은 고딕" charset="0"/>
-                <a:ea typeface="맑은 고딕" charset="0"/>
-              </a:rPr>
-              <a:t> 선택합니다. </a:t>
+              <a:t>그리고 Light Probe Group </a:t>
+            </a:r>
+            <a:r>
+              <a:rPr lang="ko-KR" sz="1800">
+                <a:latin typeface="맑은 고딕" charset="0"/>
+                <a:ea typeface="맑은 고딕" charset="0"/>
+              </a:rPr>
+              <a:t>오브젝트를</a:t>
+            </a:r>
+            <a:r>
+              <a:rPr lang="ko-KR" sz="1800">
+                <a:latin typeface="맑은 고딕" charset="0"/>
+                <a:ea typeface="맑은 고딕" charset="0"/>
+              </a:rPr>
+              <a:t> </a:t>
+            </a:r>
+            <a:r>
+              <a:rPr lang="ko-KR" sz="1800">
+                <a:latin typeface="맑은 고딕" charset="0"/>
+                <a:ea typeface="맑은 고딕" charset="0"/>
+              </a:rPr>
+              <a:t>생성합니다.</a:t>
             </a:r>
             <a:endParaRPr lang="ko-KR" altLang="en-US" sz="1800">
               <a:latin typeface="맑은 고딕" charset="0"/>
@@ -7803,6 +8459,958 @@
 </file>
 
 <file path=ppt/slides/slide11.xml><?xml version="1.0" encoding="utf-8"?>
+<p:sld xmlns:a="http://schemas.openxmlformats.org/drawingml/2006/main" xmlns:r="http://schemas.openxmlformats.org/officeDocument/2006/relationships" xmlns:p="http://schemas.openxmlformats.org/presentationml/2006/main">
+  <p:cSld>
+    <p:spTree>
+      <p:nvGrpSpPr>
+        <p:cNvPr id="1" name=""/>
+        <p:cNvGrpSpPr/>
+        <p:nvPr/>
+      </p:nvGrpSpPr>
+      <p:grpSpPr>
+        <a:xfrm>
+          <a:off x="0" y="0"/>
+          <a:ext cx="0" cy="0"/>
+          <a:chOff x="0" y="0"/>
+          <a:chExt cx="0" cy="0"/>
+        </a:xfrm>
+      </p:grpSpPr>
+      <p:sp>
+        <p:nvSpPr>
+          <p:cNvPr id="1031" name="Rect 0"/>
+          <p:cNvSpPr txBox="1">
+            <a:spLocks/>
+          </p:cNvSpPr>
+          <p:nvPr/>
+        </p:nvSpPr>
+        <p:spPr>
+          <a:xfrm rot="0">
+            <a:off x="4110990" y="327660"/>
+            <a:ext cx="3987165" cy="478155"/>
+          </a:xfrm>
+          <a:prstGeom prst="rect"/>
+          <a:noFill/>
+          <a:ln w="0">
+            <a:noFill/>
+            <a:prstDash/>
+          </a:ln>
+        </p:spPr>
+        <p:txBody>
+          <a:bodyPr wrap="square" lIns="89535" tIns="46355" rIns="89535" bIns="46355" numCol="1" vert="horz" anchor="t">
+            <a:spAutoFit/>
+          </a:bodyPr>
+          <a:lstStyle/>
+          <a:p>
+            <a:pPr marL="0" indent="0" algn="ctr" latinLnBrk="0">
+              <a:buFontTx/>
+              <a:buNone/>
+            </a:pPr>
+            <a:r>
+              <a:rPr lang="ko-KR" altLang="en-US" sz="2500" b="1">
+                <a:solidFill>
+                  <a:schemeClr val="tx1"/>
+                </a:solidFill>
+                <a:latin typeface="나눔바른고딕" charset="0"/>
+                <a:ea typeface="나눔바른고딕" charset="0"/>
+              </a:rPr>
+              <a:t>열한</a:t>
+            </a:r>
+            <a:r>
+              <a:rPr lang="ko-KR" altLang="en-US" sz="2500" b="1">
+                <a:solidFill>
+                  <a:schemeClr val="tx1"/>
+                </a:solidFill>
+                <a:latin typeface="나눔바른고딕" charset="0"/>
+                <a:ea typeface="나눔바른고딕" charset="0"/>
+              </a:rPr>
+              <a:t> 번째</a:t>
+            </a:r>
+            <a:r>
+              <a:rPr lang="ko-KR" altLang="en-US" sz="2500" b="1">
+                <a:solidFill>
+                  <a:schemeClr val="tx1"/>
+                </a:solidFill>
+                <a:latin typeface="나눔바른고딕" charset="0"/>
+                <a:ea typeface="나눔바른고딕" charset="0"/>
+              </a:rPr>
+              <a:t> </a:t>
+            </a:r>
+            <a:r>
+              <a:rPr lang="ko-KR" altLang="en-US" sz="2500" b="1">
+                <a:solidFill>
+                  <a:schemeClr val="tx1"/>
+                </a:solidFill>
+                <a:latin typeface="나눔바른고딕" charset="0"/>
+                <a:ea typeface="나눔바른고딕" charset="0"/>
+              </a:rPr>
+              <a:t>튜토리얼</a:t>
+            </a:r>
+            <a:endParaRPr lang="ko-KR" altLang="en-US" sz="2500" b="1">
+              <a:solidFill>
+                <a:schemeClr val="tx1"/>
+              </a:solidFill>
+              <a:latin typeface="나눔바른고딕" charset="0"/>
+              <a:ea typeface="나눔바른고딕" charset="0"/>
+            </a:endParaRPr>
+          </a:p>
+        </p:txBody>
+      </p:sp>
+      <p:sp>
+        <p:nvSpPr>
+          <p:cNvPr id="1054" name="Rect 0"/>
+          <p:cNvSpPr txBox="1">
+            <a:spLocks/>
+          </p:cNvSpPr>
+          <p:nvPr/>
+        </p:nvSpPr>
+        <p:spPr>
+          <a:xfrm rot="0">
+            <a:off x="6822440" y="5214620"/>
+            <a:ext cx="4135120" cy="892175"/>
+          </a:xfrm>
+          <a:prstGeom prst="rect"/>
+          <a:noFill/>
+        </p:spPr>
+        <p:txBody>
+          <a:bodyPr wrap="square" lIns="0" tIns="0" rIns="0" bIns="0" numCol="1" vert="horz" anchor="t">
+            <a:noAutofit/>
+          </a:bodyPr>
+          <a:lstStyle/>
+          <a:p>
+            <a:pPr marL="0" indent="0" algn="l" latinLnBrk="0" hangingPunct="1">
+              <a:buFontTx/>
+              <a:buNone/>
+            </a:pPr>
+            <a:r>
+              <a:rPr lang="ko-KR" sz="1800" i="0" b="0">
+                <a:solidFill>
+                  <a:schemeClr val="tx1"/>
+                </a:solidFill>
+                <a:latin typeface="맑은 고딕" charset="0"/>
+                <a:ea typeface="맑은 고딕" charset="0"/>
+              </a:rPr>
+              <a:t>라이트</a:t>
+            </a:r>
+            <a:r>
+              <a:rPr lang="ko-KR" sz="1800" i="0" b="0">
+                <a:solidFill>
+                  <a:schemeClr val="tx1"/>
+                </a:solidFill>
+                <a:latin typeface="맑은 고딕" charset="0"/>
+                <a:ea typeface="맑은 고딕" charset="0"/>
+              </a:rPr>
+              <a:t> </a:t>
+            </a:r>
+            <a:r>
+              <a:rPr lang="ko-KR" sz="1800" i="0" b="0">
+                <a:solidFill>
+                  <a:schemeClr val="tx1"/>
+                </a:solidFill>
+                <a:latin typeface="맑은 고딕" charset="0"/>
+                <a:ea typeface="맑은 고딕" charset="0"/>
+              </a:rPr>
+              <a:t>프로브 그룹의 경우 영역 근처에 </a:t>
+            </a:r>
+            <a:r>
+              <a:rPr lang="ko-KR" sz="1800" i="0" b="0">
+                <a:solidFill>
+                  <a:schemeClr val="tx1"/>
+                </a:solidFill>
+                <a:latin typeface="맑은 고딕" charset="0"/>
+                <a:ea typeface="맑은 고딕" charset="0"/>
+              </a:rPr>
+              <a:t>있는</a:t>
+            </a:r>
+            <a:r>
+              <a:rPr lang="ko-KR" sz="1800" i="0" b="0">
+                <a:solidFill>
+                  <a:schemeClr val="tx1"/>
+                </a:solidFill>
+                <a:latin typeface="맑은 고딕" charset="0"/>
+                <a:ea typeface="맑은 고딕" charset="0"/>
+              </a:rPr>
+              <a:t> Mesh Renderer의 값을 보간한 </a:t>
+            </a:r>
+            <a:r>
+              <a:rPr lang="ko-KR" sz="1800" i="0" b="0">
+                <a:solidFill>
+                  <a:schemeClr val="tx1"/>
+                </a:solidFill>
+                <a:latin typeface="맑은 고딕" charset="0"/>
+                <a:ea typeface="맑은 고딕" charset="0"/>
+              </a:rPr>
+              <a:t>다</a:t>
+            </a:r>
+            <a:r>
+              <a:rPr lang="ko-KR" sz="1800" i="0" b="0">
+                <a:solidFill>
+                  <a:schemeClr val="tx1"/>
+                </a:solidFill>
+                <a:latin typeface="맑은 고딕" charset="0"/>
+                <a:ea typeface="맑은 고딕" charset="0"/>
+              </a:rPr>
+              <a:t>음</a:t>
+            </a:r>
+            <a:r>
+              <a:rPr lang="ko-KR" sz="1800" i="0" b="0">
+                <a:solidFill>
+                  <a:schemeClr val="tx1"/>
+                </a:solidFill>
+                <a:latin typeface="맑은 고딕" charset="0"/>
+                <a:ea typeface="맑은 고딕" charset="0"/>
+              </a:rPr>
+              <a:t> </a:t>
+            </a:r>
+            <a:r>
+              <a:rPr lang="ko-KR" sz="1800" i="0" b="0">
+                <a:solidFill>
+                  <a:schemeClr val="tx1"/>
+                </a:solidFill>
+                <a:latin typeface="맑은 고딕" charset="0"/>
+                <a:ea typeface="맑은 고딕" charset="0"/>
+              </a:rPr>
+              <a:t>빛을 적용시킵니다.</a:t>
+            </a:r>
+            <a:r>
+              <a:rPr lang="ko-KR" sz="1800" i="0" b="0">
+                <a:solidFill>
+                  <a:schemeClr val="tx1"/>
+                </a:solidFill>
+                <a:latin typeface="맑은 고딕" charset="0"/>
+                <a:ea typeface="맑은 고딕" charset="0"/>
+              </a:rPr>
+              <a:t>					</a:t>
+            </a:r>
+            <a:endParaRPr lang="ko-KR" altLang="en-US" sz="1800" i="0" b="0">
+              <a:solidFill>
+                <a:schemeClr val="tx1"/>
+              </a:solidFill>
+              <a:latin typeface="맑은 고딕" charset="0"/>
+              <a:ea typeface="맑은 고딕" charset="0"/>
+            </a:endParaRPr>
+          </a:p>
+        </p:txBody>
+      </p:sp>
+      <p:pic>
+        <p:nvPicPr>
+          <p:cNvPr id="1058" name="Picture " descr="C:/Users/Admin1/AppData/Roaming/PolarisOffice/ETemp/26564_9303048/fImage24803535741.png"/>
+          <p:cNvPicPr>
+            <a:picLocks noChangeAspect="1"/>
+          </p:cNvPicPr>
+          <p:nvPr/>
+        </p:nvPicPr>
+        <p:blipFill rotWithShape="1">
+          <a:blip r:embed="rId2" cstate="hqprint">
+            <a:extLst>
+              <a:ext uri="{28A0092B-C50C-407E-A947-70E740481C1C}">
+                <a14:useLocalDpi xmlns:a14="http://schemas.microsoft.com/office/drawing/2010/main"/>
+              </a:ext>
+            </a:extLst>
+          </a:blip>
+          <a:stretch>
+            <a:fillRect/>
+          </a:stretch>
+        </p:blipFill>
+        <p:spPr>
+          <a:xfrm rot="0">
+            <a:off x="6824980" y="2799080"/>
+            <a:ext cx="4132580" cy="2171700"/>
+          </a:xfrm>
+          <a:prstGeom prst="roundRect"/>
+          <a:solidFill>
+            <a:srgbClr val="EDEDED"/>
+          </a:solidFill>
+        </p:spPr>
+      </p:pic>
+      <p:sp>
+        <p:nvSpPr>
+          <p:cNvPr id="1059" name="Rect 0"/>
+          <p:cNvSpPr txBox="1">
+            <a:spLocks/>
+          </p:cNvSpPr>
+          <p:nvPr/>
+        </p:nvSpPr>
+        <p:spPr>
+          <a:xfrm rot="0">
+            <a:off x="6826250" y="1447165"/>
+            <a:ext cx="4131310" cy="1189355"/>
+          </a:xfrm>
+          <a:prstGeom prst="rect"/>
+          <a:noFill/>
+        </p:spPr>
+        <p:txBody>
+          <a:bodyPr wrap="square" lIns="0" tIns="0" rIns="0" bIns="0" numCol="1" vert="horz" anchor="t">
+            <a:noAutofit/>
+          </a:bodyPr>
+          <a:lstStyle/>
+          <a:p>
+            <a:pPr marL="0" indent="0" algn="l" latinLnBrk="0" hangingPunct="1">
+              <a:buFontTx/>
+              <a:buNone/>
+            </a:pPr>
+            <a:r>
+              <a:rPr lang="ko-KR" sz="1800" i="0" b="0">
+                <a:solidFill>
+                  <a:schemeClr val="tx1"/>
+                </a:solidFill>
+                <a:latin typeface="맑은 고딕" charset="0"/>
+                <a:ea typeface="맑은 고딕" charset="0"/>
+              </a:rPr>
+              <a:t>라이트</a:t>
+            </a:r>
+            <a:r>
+              <a:rPr lang="ko-KR" sz="1800" i="0" b="0">
+                <a:solidFill>
+                  <a:schemeClr val="tx1"/>
+                </a:solidFill>
+                <a:latin typeface="맑은 고딕" charset="0"/>
+                <a:ea typeface="맑은 고딕" charset="0"/>
+              </a:rPr>
+              <a:t> </a:t>
+            </a:r>
+            <a:r>
+              <a:rPr lang="ko-KR" sz="1800" i="0" b="0">
+                <a:solidFill>
+                  <a:schemeClr val="tx1"/>
+                </a:solidFill>
+                <a:latin typeface="맑은 고딕" charset="0"/>
+                <a:ea typeface="맑은 고딕" charset="0"/>
+              </a:rPr>
+              <a:t>프로브</a:t>
+            </a:r>
+            <a:r>
+              <a:rPr lang="ko-KR" sz="1800" i="0" b="0">
+                <a:solidFill>
+                  <a:schemeClr val="tx1"/>
+                </a:solidFill>
+                <a:latin typeface="맑은 고딕" charset="0"/>
+                <a:ea typeface="맑은 고딕" charset="0"/>
+              </a:rPr>
+              <a:t> </a:t>
+            </a:r>
+            <a:r>
+              <a:rPr lang="ko-KR" sz="1800" i="0" b="0">
+                <a:solidFill>
+                  <a:schemeClr val="tx1"/>
+                </a:solidFill>
+                <a:latin typeface="맑은 고딕" charset="0"/>
+                <a:ea typeface="맑은 고딕" charset="0"/>
+              </a:rPr>
+              <a:t>그룹</a:t>
+            </a:r>
+            <a:r>
+              <a:rPr lang="ko-KR" sz="1800" i="0" b="0">
+                <a:solidFill>
+                  <a:schemeClr val="tx1"/>
+                </a:solidFill>
+                <a:latin typeface="맑은 고딕" charset="0"/>
+                <a:ea typeface="맑은 고딕" charset="0"/>
+              </a:rPr>
+              <a:t>은 동적으로 </a:t>
+            </a:r>
+            <a:r>
+              <a:rPr lang="ko-KR" sz="1800" i="0" b="0">
+                <a:solidFill>
+                  <a:schemeClr val="tx1"/>
+                </a:solidFill>
+                <a:latin typeface="맑은 고딕" charset="0"/>
+                <a:ea typeface="맑은 고딕" charset="0"/>
+              </a:rPr>
+              <a:t>움직이는</a:t>
+            </a:r>
+            <a:r>
+              <a:rPr lang="ko-KR" sz="1800" i="0" b="0">
+                <a:solidFill>
+                  <a:schemeClr val="tx1"/>
+                </a:solidFill>
+                <a:latin typeface="맑은 고딕" charset="0"/>
+                <a:ea typeface="맑은 고딕" charset="0"/>
+              </a:rPr>
+              <a:t> </a:t>
+            </a:r>
+            <a:r>
+              <a:rPr lang="ko-KR" sz="1800" i="0" b="0">
+                <a:solidFill>
+                  <a:schemeClr val="tx1"/>
+                </a:solidFill>
+                <a:latin typeface="맑은 고딕" charset="0"/>
+                <a:ea typeface="맑은 고딕" charset="0"/>
+              </a:rPr>
+              <a:t>오브젝트의</a:t>
+            </a:r>
+            <a:r>
+              <a:rPr lang="ko-KR" sz="1800" i="0" b="0">
+                <a:solidFill>
+                  <a:schemeClr val="tx1"/>
+                </a:solidFill>
+                <a:latin typeface="맑은 고딕" charset="0"/>
+                <a:ea typeface="맑은 고딕" charset="0"/>
+              </a:rPr>
+              <a:t> 빛 연산을 </a:t>
+            </a:r>
+            <a:r>
+              <a:rPr lang="ko-KR" sz="1800" i="0" b="0">
+                <a:solidFill>
+                  <a:schemeClr val="tx1"/>
+                </a:solidFill>
+                <a:latin typeface="맑은 고딕" charset="0"/>
+                <a:ea typeface="맑은 고딕" charset="0"/>
+              </a:rPr>
+              <a:t>사전에</a:t>
+            </a:r>
+            <a:r>
+              <a:rPr lang="ko-KR" sz="1800" i="0" b="0">
+                <a:solidFill>
+                  <a:schemeClr val="tx1"/>
+                </a:solidFill>
+                <a:latin typeface="맑은 고딕" charset="0"/>
+                <a:ea typeface="맑은 고딕" charset="0"/>
+              </a:rPr>
+              <a:t> </a:t>
+            </a:r>
+            <a:r>
+              <a:rPr lang="ko-KR" sz="1800" i="0" b="0">
+                <a:solidFill>
+                  <a:schemeClr val="tx1"/>
+                </a:solidFill>
+                <a:latin typeface="맑은 고딕" charset="0"/>
+                <a:ea typeface="맑은 고딕" charset="0"/>
+              </a:rPr>
+              <a:t>배치한</a:t>
+            </a:r>
+            <a:r>
+              <a:rPr lang="ko-KR" sz="1800" i="0" b="0">
+                <a:solidFill>
+                  <a:schemeClr val="tx1"/>
+                </a:solidFill>
+                <a:latin typeface="맑은 고딕" charset="0"/>
+                <a:ea typeface="맑은 고딕" charset="0"/>
+              </a:rPr>
+              <a:t> </a:t>
+            </a:r>
+            <a:r>
+              <a:rPr lang="ko-KR" sz="1800" i="0" b="0">
+                <a:solidFill>
+                  <a:schemeClr val="tx1"/>
+                </a:solidFill>
+                <a:latin typeface="맑은 고딕" charset="0"/>
+                <a:ea typeface="맑은 고딕" charset="0"/>
+              </a:rPr>
+              <a:t>빛의</a:t>
+            </a:r>
+            <a:r>
+              <a:rPr lang="ko-KR" sz="1800" i="0" b="0">
+                <a:solidFill>
+                  <a:schemeClr val="tx1"/>
+                </a:solidFill>
+                <a:latin typeface="맑은 고딕" charset="0"/>
+                <a:ea typeface="맑은 고딕" charset="0"/>
+              </a:rPr>
+              <a:t> </a:t>
+            </a:r>
+            <a:r>
+              <a:rPr lang="ko-KR" sz="1800" i="0" b="0">
+                <a:solidFill>
+                  <a:schemeClr val="tx1"/>
+                </a:solidFill>
+                <a:latin typeface="맑은 고딕" charset="0"/>
+                <a:ea typeface="맑은 고딕" charset="0"/>
+              </a:rPr>
+              <a:t>정보</a:t>
+            </a:r>
+            <a:r>
+              <a:rPr lang="ko-KR" sz="1800" i="0" b="0">
+                <a:solidFill>
+                  <a:schemeClr val="tx1"/>
+                </a:solidFill>
+                <a:latin typeface="맑은 고딕" charset="0"/>
+                <a:ea typeface="맑은 고딕" charset="0"/>
+              </a:rPr>
+              <a:t> </a:t>
+            </a:r>
+            <a:r>
+              <a:rPr lang="ko-KR" sz="1800" i="0" b="0">
+                <a:solidFill>
+                  <a:schemeClr val="tx1"/>
+                </a:solidFill>
+                <a:latin typeface="맑은 고딕" charset="0"/>
+                <a:ea typeface="맑은 고딕" charset="0"/>
+              </a:rPr>
+              <a:t>값을</a:t>
+            </a:r>
+            <a:r>
+              <a:rPr lang="ko-KR" sz="1800" i="0" b="0">
+                <a:solidFill>
+                  <a:schemeClr val="tx1"/>
+                </a:solidFill>
+                <a:latin typeface="맑은 고딕" charset="0"/>
+                <a:ea typeface="맑은 고딕" charset="0"/>
+              </a:rPr>
+              <a:t> </a:t>
+            </a:r>
+            <a:r>
+              <a:rPr lang="ko-KR" sz="1800" i="0" b="0">
+                <a:solidFill>
+                  <a:schemeClr val="tx1"/>
+                </a:solidFill>
+                <a:latin typeface="맑은 고딕" charset="0"/>
+                <a:ea typeface="맑은 고딕" charset="0"/>
+              </a:rPr>
+              <a:t>저장하여 해당 </a:t>
+            </a:r>
+            <a:r>
+              <a:rPr lang="ko-KR" sz="1800" i="0" b="0">
+                <a:solidFill>
+                  <a:schemeClr val="tx1"/>
+                </a:solidFill>
+                <a:latin typeface="맑은 고딕" charset="0"/>
+                <a:ea typeface="맑은 고딕" charset="0"/>
+              </a:rPr>
+              <a:t>위치에서</a:t>
+            </a:r>
+            <a:r>
+              <a:rPr lang="ko-KR" sz="1800" i="0" b="0">
+                <a:solidFill>
+                  <a:schemeClr val="tx1"/>
+                </a:solidFill>
+                <a:latin typeface="맑은 고딕" charset="0"/>
+                <a:ea typeface="맑은 고딕" charset="0"/>
+              </a:rPr>
+              <a:t> 계산하는 방법입니다.</a:t>
+            </a:r>
+            <a:r>
+              <a:rPr lang="ko-KR" sz="1800" i="0" b="0">
+                <a:solidFill>
+                  <a:schemeClr val="tx1"/>
+                </a:solidFill>
+                <a:latin typeface="맑은 고딕" charset="0"/>
+                <a:ea typeface="맑은 고딕" charset="0"/>
+              </a:rPr>
+              <a:t>		</a:t>
+            </a:r>
+            <a:endParaRPr lang="ko-KR" altLang="en-US" sz="1800" i="0" b="0">
+              <a:solidFill>
+                <a:schemeClr val="tx1"/>
+              </a:solidFill>
+              <a:latin typeface="맑은 고딕" charset="0"/>
+              <a:ea typeface="맑은 고딕" charset="0"/>
+            </a:endParaRPr>
+          </a:p>
+        </p:txBody>
+      </p:sp>
+      <p:pic>
+        <p:nvPicPr>
+          <p:cNvPr id="1060" name="그림 9" descr="C:/Users/Admin1/AppData/Roaming/PolarisOffice/ETemp/26564_9303048/fImage86202886962.png"/>
+          <p:cNvPicPr>
+            <a:picLocks noChangeAspect="1"/>
+          </p:cNvPicPr>
+          <p:nvPr/>
+        </p:nvPicPr>
+        <p:blipFill rotWithShape="1">
+          <a:blip r:embed="rId3" cstate="hqprint">
+            <a:extLst>
+              <a:ext uri="{28A0092B-C50C-407E-A947-70E740481C1C}">
+                <a14:useLocalDpi xmlns:a14="http://schemas.microsoft.com/office/drawing/2010/main"/>
+              </a:ext>
+            </a:extLst>
+          </a:blip>
+          <a:stretch>
+            <a:fillRect/>
+          </a:stretch>
+        </p:blipFill>
+        <p:spPr>
+          <a:xfrm rot="0">
+            <a:off x="1240790" y="1445895"/>
+            <a:ext cx="1283970" cy="1103630"/>
+          </a:xfrm>
+          <a:prstGeom prst="roundRect"/>
+          <a:solidFill>
+            <a:srgbClr val="EDEDED"/>
+          </a:solidFill>
+        </p:spPr>
+      </p:pic>
+      <p:pic>
+        <p:nvPicPr>
+          <p:cNvPr id="1061" name="그림 10" descr="C:/Users/Admin1/AppData/Roaming/PolarisOffice/ETemp/26564_9303048/fImage483892836334.png"/>
+          <p:cNvPicPr>
+            <a:picLocks noChangeAspect="1"/>
+          </p:cNvPicPr>
+          <p:nvPr/>
+        </p:nvPicPr>
+        <p:blipFill rotWithShape="1">
+          <a:blip r:embed="rId4" cstate="print">
+            <a:extLst>
+              <a:ext uri="{28A0092B-C50C-407E-A947-70E740481C1C}">
+                <a14:useLocalDpi xmlns:a14="http://schemas.microsoft.com/office/drawing/2010/main" val="0"/>
+              </a:ext>
+            </a:extLst>
+          </a:blip>
+          <a:stretch>
+            <a:fillRect/>
+          </a:stretch>
+        </p:blipFill>
+        <p:spPr>
+          <a:xfrm rot="0">
+            <a:off x="2635885" y="1446530"/>
+            <a:ext cx="2731135" cy="1103630"/>
+          </a:xfrm>
+          <a:prstGeom prst="roundRect"/>
+          <a:solidFill>
+            <a:srgbClr val="EDEDED"/>
+          </a:solidFill>
+        </p:spPr>
+      </p:pic>
+      <p:cxnSp>
+        <p:nvCxnSpPr>
+          <p:cNvPr id="1062" name="도형 13"/>
+          <p:cNvCxnSpPr/>
+          <p:nvPr/>
+        </p:nvCxnSpPr>
+        <p:spPr>
+          <a:xfrm rot="0" flipH="1">
+            <a:off x="1912620" y="1843405"/>
+            <a:ext cx="1835150" cy="680720"/>
+          </a:xfrm>
+          <a:prstGeom prst="straightConnector1"/>
+          <a:ln w="6350" cap="flat" cmpd="sng">
+            <a:prstDash/>
+            <a:headEnd type="none" w="med" len="med"/>
+            <a:tailEnd type="triangle" w="med" len="med"/>
+          </a:ln>
+        </p:spPr>
+        <p:style>
+          <a:lnRef idx="1">
+            <a:schemeClr val="accent1"/>
+          </a:lnRef>
+          <a:fillRef idx="0">
+            <a:schemeClr val="accent1"/>
+          </a:fillRef>
+          <a:effectRef idx="0">
+            <a:schemeClr val="accent1"/>
+          </a:effectRef>
+          <a:fontRef idx="minor">
+            <a:schemeClr val="tx1"/>
+          </a:fontRef>
+        </p:style>
+      </p:cxnSp>
+      <p:sp>
+        <p:nvSpPr>
+          <p:cNvPr id="1063" name="텍스트 상자 14"/>
+          <p:cNvSpPr txBox="1">
+            <a:spLocks/>
+          </p:cNvSpPr>
+          <p:nvPr/>
+        </p:nvSpPr>
+        <p:spPr>
+          <a:xfrm rot="0">
+            <a:off x="1240790" y="2696210"/>
+            <a:ext cx="4126230" cy="923925"/>
+          </a:xfrm>
+          <a:prstGeom prst="rect"/>
+          <a:noFill/>
+          <a:ln w="0">
+            <a:noFill/>
+            <a:prstDash/>
+          </a:ln>
+        </p:spPr>
+        <p:txBody>
+          <a:bodyPr wrap="square" lIns="89535" tIns="46355" rIns="89535" bIns="46355" numCol="1" vert="horz" anchor="t">
+            <a:spAutoFit/>
+          </a:bodyPr>
+          <a:lstStyle/>
+          <a:p>
+            <a:pPr marL="0" indent="0" rtl="0" algn="l" defTabSz="914400" eaLnBrk="1" latinLnBrk="0" hangingPunct="1">
+              <a:buFontTx/>
+              <a:buNone/>
+            </a:pPr>
+            <a:r>
+              <a:rPr lang="ko-KR" sz="1800" b="1">
+                <a:solidFill>
+                  <a:srgbClr val="0611F2"/>
+                </a:solidFill>
+                <a:latin typeface="맑은 고딕" charset="0"/>
+                <a:ea typeface="맑은 고딕" charset="0"/>
+              </a:rPr>
+              <a:t>2</a:t>
+            </a:r>
+            <a:r>
+              <a:rPr lang="ko-KR" sz="1800" b="1">
+                <a:solidFill>
+                  <a:srgbClr val="0611F2"/>
+                </a:solidFill>
+                <a:latin typeface="맑은 고딕" charset="0"/>
+                <a:ea typeface="맑은 고딕" charset="0"/>
+              </a:rPr>
+              <a:t>9</a:t>
+            </a:r>
+            <a:r>
+              <a:rPr sz="1800" b="1">
+                <a:solidFill>
+                  <a:srgbClr val="0611F2"/>
+                </a:solidFill>
+                <a:latin typeface="맑은 고딕" charset="0"/>
+                <a:ea typeface="맑은 고딕" charset="0"/>
+              </a:rPr>
+              <a:t>.</a:t>
+            </a:r>
+            <a:r>
+              <a:rPr sz="1800">
+                <a:latin typeface="맑은 고딕" charset="0"/>
+                <a:ea typeface="맑은 고딕" charset="0"/>
+              </a:rPr>
+              <a:t> </a:t>
+            </a:r>
+            <a:r>
+              <a:rPr lang="ko-KR" sz="1800">
+                <a:latin typeface="맑은 고딕" charset="0"/>
+                <a:ea typeface="맑은 고딕" charset="0"/>
+              </a:rPr>
+              <a:t>그런 다음 Project 폴더에 있는 </a:t>
+            </a:r>
+            <a:r>
+              <a:rPr lang="ko-KR" sz="1800">
+                <a:latin typeface="맑은 고딕" charset="0"/>
+                <a:ea typeface="맑은 고딕" charset="0"/>
+              </a:rPr>
+              <a:t>Texture</a:t>
+            </a:r>
+            <a:r>
+              <a:rPr lang="ko-KR" sz="1800">
+                <a:latin typeface="맑은 고딕" charset="0"/>
+                <a:ea typeface="맑은 고딕" charset="0"/>
+              </a:rPr>
+              <a:t> </a:t>
+            </a:r>
+            <a:r>
+              <a:rPr lang="ko-KR" sz="1800">
+                <a:latin typeface="맑은 고딕" charset="0"/>
+                <a:ea typeface="맑은 고딕" charset="0"/>
+              </a:rPr>
+              <a:t>폴더에</a:t>
+            </a:r>
+            <a:r>
+              <a:rPr lang="ko-KR" sz="1800">
+                <a:latin typeface="맑은 고딕" charset="0"/>
+                <a:ea typeface="맑은 고딕" charset="0"/>
+              </a:rPr>
+              <a:t> Robot 텍스처를 </a:t>
+            </a:r>
+            <a:r>
+              <a:rPr lang="ko-KR" sz="1800">
+                <a:latin typeface="맑은 고딕" charset="0"/>
+                <a:ea typeface="맑은 고딕" charset="0"/>
+              </a:rPr>
+              <a:t>Robot</a:t>
+            </a:r>
+            <a:r>
+              <a:rPr lang="ko-KR" sz="1800">
+                <a:latin typeface="맑은 고딕" charset="0"/>
+                <a:ea typeface="맑은 고딕" charset="0"/>
+              </a:rPr>
+              <a:t> </a:t>
+            </a:r>
+            <a:r>
+              <a:rPr lang="ko-KR" sz="1800">
+                <a:latin typeface="맑은 고딕" charset="0"/>
+                <a:ea typeface="맑은 고딕" charset="0"/>
+              </a:rPr>
+              <a:t>오브젝트에</a:t>
+            </a:r>
+            <a:r>
+              <a:rPr lang="ko-KR" sz="1800">
+                <a:latin typeface="맑은 고딕" charset="0"/>
+                <a:ea typeface="맑은 고딕" charset="0"/>
+              </a:rPr>
+              <a:t> </a:t>
+            </a:r>
+            <a:r>
+              <a:rPr lang="ko-KR" sz="1800">
+                <a:latin typeface="맑은 고딕" charset="0"/>
+                <a:ea typeface="맑은 고딕" charset="0"/>
+              </a:rPr>
+              <a:t>넣어줍니다.</a:t>
+            </a:r>
+            <a:endParaRPr lang="ko-KR" altLang="en-US" sz="1800">
+              <a:latin typeface="맑은 고딕" charset="0"/>
+              <a:ea typeface="맑은 고딕" charset="0"/>
+            </a:endParaRPr>
+          </a:p>
+        </p:txBody>
+      </p:sp>
+      <p:pic>
+        <p:nvPicPr>
+          <p:cNvPr id="1064" name="그림 15" descr="C:/Users/Admin1/AppData/Roaming/PolarisOffice/ETemp/26564_9303048/fImage129742866500.png"/>
+          <p:cNvPicPr>
+            <a:picLocks noChangeAspect="1"/>
+          </p:cNvPicPr>
+          <p:nvPr/>
+        </p:nvPicPr>
+        <p:blipFill rotWithShape="1">
+          <a:blip r:embed="rId5" cstate="print">
+            <a:extLst>
+              <a:ext uri="{28A0092B-C50C-407E-A947-70E740481C1C}">
+                <a14:useLocalDpi xmlns:a14="http://schemas.microsoft.com/office/drawing/2010/main" val="0"/>
+              </a:ext>
+            </a:extLst>
+          </a:blip>
+          <a:stretch>
+            <a:fillRect/>
+          </a:stretch>
+        </p:blipFill>
+        <p:spPr>
+          <a:xfrm rot="0">
+            <a:off x="1238885" y="3772535"/>
+            <a:ext cx="4137025" cy="1508125"/>
+          </a:xfrm>
+          <a:prstGeom prst="roundRect"/>
+          <a:solidFill>
+            <a:srgbClr val="EDEDED"/>
+          </a:solidFill>
+        </p:spPr>
+      </p:pic>
+      <p:sp>
+        <p:nvSpPr>
+          <p:cNvPr id="1065" name="텍스트 상자 18"/>
+          <p:cNvSpPr txBox="1">
+            <a:spLocks/>
+          </p:cNvSpPr>
+          <p:nvPr/>
+        </p:nvSpPr>
+        <p:spPr>
+          <a:xfrm rot="0">
+            <a:off x="1249045" y="5430520"/>
+            <a:ext cx="4126865" cy="677545"/>
+          </a:xfrm>
+          <a:prstGeom prst="rect"/>
+          <a:noFill/>
+          <a:ln w="0">
+            <a:noFill/>
+            <a:prstDash/>
+          </a:ln>
+        </p:spPr>
+        <p:txBody>
+          <a:bodyPr wrap="square" lIns="89535" tIns="46355" rIns="89535" bIns="46355" numCol="1" vert="horz" anchor="t">
+            <a:spAutoFit/>
+          </a:bodyPr>
+          <a:lstStyle/>
+          <a:p>
+            <a:pPr marL="0" indent="0" algn="l" latinLnBrk="0" hangingPunct="1">
+              <a:buFontTx/>
+              <a:buNone/>
+            </a:pPr>
+            <a:r>
+              <a:rPr lang="ko-KR" sz="2000" b="1">
+                <a:solidFill>
+                  <a:srgbClr val="0611F2"/>
+                </a:solidFill>
+                <a:latin typeface="맑은 고딕" charset="0"/>
+                <a:ea typeface="맑은 고딕" charset="0"/>
+              </a:rPr>
+              <a:t>3</a:t>
+            </a:r>
+            <a:r>
+              <a:rPr lang="ko-KR" sz="2000" b="1">
+                <a:solidFill>
+                  <a:srgbClr val="0611F2"/>
+                </a:solidFill>
+                <a:latin typeface="맑은 고딕" charset="0"/>
+                <a:ea typeface="맑은 고딕" charset="0"/>
+              </a:rPr>
+              <a:t>0</a:t>
+            </a:r>
+            <a:r>
+              <a:rPr lang="ko-KR" sz="2000" b="1">
+                <a:solidFill>
+                  <a:srgbClr val="0611F2"/>
+                </a:solidFill>
+                <a:latin typeface="맑은 고딕" charset="0"/>
+                <a:ea typeface="맑은 고딕" charset="0"/>
+              </a:rPr>
+              <a:t>.</a:t>
+            </a:r>
+            <a:r>
+              <a:rPr lang="ko-KR" sz="2000" b="1">
+                <a:solidFill>
+                  <a:srgbClr val="0611F2"/>
+                </a:solidFill>
+                <a:latin typeface="맑은 고딕" charset="0"/>
+                <a:ea typeface="맑은 고딕" charset="0"/>
+              </a:rPr>
+              <a:t> </a:t>
+            </a:r>
+            <a:r>
+              <a:rPr lang="ko-KR" sz="1800">
+                <a:latin typeface="맑은 고딕" charset="0"/>
+                <a:ea typeface="맑은 고딕" charset="0"/>
+              </a:rPr>
+              <a:t>그다음 Light Probe Group </a:t>
+            </a:r>
+            <a:r>
+              <a:rPr lang="ko-KR" sz="1800">
+                <a:latin typeface="맑은 고딕" charset="0"/>
+                <a:ea typeface="맑은 고딕" charset="0"/>
+              </a:rPr>
+              <a:t>오브젝트의</a:t>
+            </a:r>
+            <a:r>
+              <a:rPr lang="ko-KR" sz="1800">
+                <a:latin typeface="맑은 고딕" charset="0"/>
+                <a:ea typeface="맑은 고딕" charset="0"/>
+              </a:rPr>
+              <a:t> </a:t>
+            </a:r>
+            <a:r>
+              <a:rPr lang="ko-KR" sz="1800">
+                <a:latin typeface="맑은 고딕" charset="0"/>
+                <a:ea typeface="맑은 고딕" charset="0"/>
+              </a:rPr>
+              <a:t>위치 값을</a:t>
+            </a:r>
+            <a:r>
+              <a:rPr lang="ko-KR" sz="1800">
+                <a:latin typeface="맑은 고딕" charset="0"/>
+                <a:ea typeface="맑은 고딕" charset="0"/>
+              </a:rPr>
+              <a:t> </a:t>
+            </a:r>
+            <a:r>
+              <a:rPr lang="ko-KR" sz="1800">
+                <a:latin typeface="맑은 고딕" charset="0"/>
+                <a:ea typeface="맑은 고딕" charset="0"/>
+              </a:rPr>
+              <a:t>설정합니다.</a:t>
+            </a:r>
+            <a:endParaRPr lang="ko-KR" altLang="en-US" sz="1800">
+              <a:latin typeface="맑은 고딕" charset="0"/>
+              <a:ea typeface="맑은 고딕" charset="0"/>
+            </a:endParaRPr>
+          </a:p>
+        </p:txBody>
+      </p:sp>
+    </p:spTree>
+  </p:cSld>
+  <p:clrMapOvr>
+    <a:masterClrMapping/>
+  </p:clrMapOvr>
+  <mc:AlternateContent xmlns:mc="http://schemas.openxmlformats.org/markup-compatibility/2006">
+    <mc:Choice xmlns:p14="http://schemas.microsoft.com/office/powerpoint/2010/main" Requires="p14">
+      <p:transition spd="slow" p14:dur="2000"/>
+    </mc:Choice>
+    <mc:Fallback>
+      <p:transition spd="slow"/>
+    </mc:Fallback>
+  </mc:AlternateContent>
+  <p:timing>
+    <p:tnLst>
+      <p:par>
+        <p:cTn id="1" dur="indefinite" restart="never" nodeType="tmRoot"/>
+      </p:par>
+    </p:tnLst>
+  </p:timing>
+</p:sld>
+</file>
+
+<file path=ppt/slides/slide12.xml><?xml version="1.0" encoding="utf-8"?>
 <p:sld xmlns:a="http://schemas.openxmlformats.org/drawingml/2006/main" xmlns:r="http://schemas.openxmlformats.org/officeDocument/2006/relationships" xmlns:p="http://schemas.openxmlformats.org/presentationml/2006/main" xmlns:p14="http://schemas.microsoft.com/office/powerpoint/2010/main">
   <p:cSld>
     <p:spTree>
@@ -7829,8 +9437,8 @@
         </p:nvSpPr>
         <p:spPr>
           <a:xfrm rot="0">
-            <a:off x="4110990" y="327660"/>
-            <a:ext cx="3986530" cy="554990"/>
+            <a:off x="4232275" y="396240"/>
+            <a:ext cx="3719195" cy="478155"/>
           </a:xfrm>
           <a:prstGeom prst="rect"/>
           <a:noFill/>
@@ -7845,53 +9453,63 @@
           </a:bodyPr>
           <a:lstStyle/>
           <a:p>
-            <a:pPr marL="0" indent="0" algn="l" latinLnBrk="0">
-              <a:buFontTx/>
-              <a:buNone/>
-            </a:pPr>
-            <a:r>
-              <a:rPr lang="ko-KR" altLang="en-US" sz="3000" b="1">
+            <a:pPr marL="0" indent="0" algn="ctr" latinLnBrk="0">
+              <a:buFontTx/>
+              <a:buNone/>
+            </a:pPr>
+            <a:r>
+              <a:rPr lang="ko-KR" altLang="en-US" sz="2500" b="1">
                 <a:solidFill>
                   <a:schemeClr val="tx1"/>
                 </a:solidFill>
-                <a:latin typeface="맑은 고딕" charset="0"/>
-                <a:ea typeface="맑은 고딕" charset="0"/>
-              </a:rPr>
-              <a:t>열</a:t>
-            </a:r>
-            <a:r>
-              <a:rPr lang="ko-KR" altLang="en-US" sz="3000" b="1">
+                <a:latin typeface="나눔바른고딕" charset="0"/>
+                <a:ea typeface="나눔바른고딕" charset="0"/>
+              </a:rPr>
+              <a:t>열두</a:t>
+            </a:r>
+            <a:r>
+              <a:rPr lang="ko-KR" altLang="en-US" sz="2500" b="1">
                 <a:solidFill>
                   <a:schemeClr val="tx1"/>
                 </a:solidFill>
-                <a:latin typeface="맑은 고딕" charset="0"/>
-                <a:ea typeface="맑은 고딕" charset="0"/>
-              </a:rPr>
-              <a:t>여덟</a:t>
-            </a:r>
-            <a:r>
-              <a:rPr lang="ko-KR" altLang="en-US" sz="3000" b="1">
+                <a:latin typeface="나눔바른고딕" charset="0"/>
+                <a:ea typeface="나눔바른고딕" charset="0"/>
+              </a:rPr>
+              <a:t> </a:t>
+            </a:r>
+            <a:r>
+              <a:rPr lang="ko-KR" altLang="en-US" sz="2500" b="1">
                 <a:solidFill>
                   <a:schemeClr val="tx1"/>
                 </a:solidFill>
-                <a:latin typeface="맑은 고딕" charset="0"/>
-                <a:ea typeface="맑은 고딕" charset="0"/>
-              </a:rPr>
-              <a:t> 번째 튜토리얼</a:t>
-            </a:r>
-            <a:endParaRPr lang="ko-KR" altLang="en-US" sz="3000" b="1">
+                <a:latin typeface="나눔바른고딕" charset="0"/>
+                <a:ea typeface="나눔바른고딕" charset="0"/>
+              </a:rPr>
+              <a:t>번째 튜토리</a:t>
+            </a:r>
+            <a:r>
+              <a:rPr lang="ko-KR" altLang="en-US" sz="2500" b="1">
+                <a:solidFill>
+                  <a:schemeClr val="tx1"/>
+                </a:solidFill>
+                <a:latin typeface="나눔바른고딕" charset="0"/>
+                <a:ea typeface="나눔바른고딕" charset="0"/>
+              </a:rPr>
+              <a:t>얼</a:t>
+            </a:r>
+            <a:endParaRPr lang="ko-KR" altLang="en-US" sz="2500" b="1">
               <a:solidFill>
                 <a:schemeClr val="tx1"/>
               </a:solidFill>
-              <a:latin typeface="맑은 고딕" charset="0"/>
-              <a:ea typeface="맑은 고딕" charset="0"/>
+              <a:latin typeface="나눔바른고딕" charset="0"/>
+              <a:ea typeface="나눔바른고딕" charset="0"/>
             </a:endParaRPr>
           </a:p>
         </p:txBody>
       </p:sp>
       <p:sp>
         <p:nvSpPr>
-          <p:cNvPr id="1054" name="Rect 0"/>
+          <p:cNvPr id="1191" name="Rect 0"/>
           <p:cNvSpPr txBox="1">
             <a:spLocks/>
           </p:cNvSpPr>
@@ -7899,92 +9517,475 @@
         </p:nvSpPr>
         <p:spPr>
           <a:xfrm rot="0">
-            <a:off x="6832600" y="3682365"/>
-            <a:ext cx="4241800" cy="2552700"/>
+            <a:off x="6845935" y="5302250"/>
+            <a:ext cx="4119880" cy="923925"/>
           </a:xfrm>
           <a:prstGeom prst="rect"/>
           <a:noFill/>
+          <a:ln w="0">
+            <a:noFill/>
+            <a:prstDash/>
+          </a:ln>
         </p:spPr>
         <p:txBody>
-          <a:bodyPr wrap="square" lIns="0" tIns="0" rIns="0" bIns="0" numCol="1" vert="horz" anchor="t">
-            <a:noAutofit/>
+          <a:bodyPr wrap="square" lIns="89535" tIns="46355" rIns="89535" bIns="46355" numCol="1" vert="horz" anchor="t">
+            <a:spAutoFit/>
           </a:bodyPr>
           <a:lstStyle/>
           <a:p>
-            <a:pPr marL="0" indent="0" algn="l" latinLnBrk="0" hangingPunct="1">
-              <a:buFontTx/>
-              <a:buNone/>
-            </a:pPr>
-            <a:r>
-              <a:rPr lang="ko-KR" sz="1800" i="0" b="0">
-                <a:solidFill>
-                  <a:schemeClr val="tx1"/>
-                </a:solidFill>
-                <a:latin typeface="맑은 고딕" charset="0"/>
-                <a:ea typeface="맑은 고딕" charset="0"/>
-              </a:rPr>
-              <a:t>라이트 프로브 그룹이란? </a:t>
-            </a:r>
-            <a:endParaRPr lang="ko-KR" altLang="en-US" sz="1800" i="0" b="0">
-              <a:solidFill>
-                <a:schemeClr val="tx1"/>
-              </a:solidFill>
+            <a:pPr marL="0" indent="0" rtl="0" algn="l" defTabSz="914400" eaLnBrk="1" latinLnBrk="0" hangingPunct="1">
+              <a:buFontTx/>
+              <a:buNone/>
+            </a:pPr>
+            <a:r>
+              <a:rPr lang="ko-KR" sz="1800">
+                <a:latin typeface="맑은 고딕" charset="0"/>
+                <a:ea typeface="맑은 고딕" charset="0"/>
+              </a:rPr>
+              <a:t>라이트</a:t>
+            </a:r>
+            <a:r>
+              <a:rPr lang="ko-KR" sz="1800">
+                <a:latin typeface="맑은 고딕" charset="0"/>
+                <a:ea typeface="맑은 고딕" charset="0"/>
+              </a:rPr>
+              <a:t> 맵의 경우 빛을 받은 게임 </a:t>
+            </a:r>
+            <a:r>
+              <a:rPr lang="ko-KR" sz="1800">
+                <a:latin typeface="맑은 고딕" charset="0"/>
+                <a:ea typeface="맑은 고딕" charset="0"/>
+              </a:rPr>
+              <a:t>오브젝트는</a:t>
+            </a:r>
+            <a:r>
+              <a:rPr lang="ko-KR" sz="1800">
+                <a:latin typeface="맑은 고딕" charset="0"/>
+                <a:ea typeface="맑은 고딕" charset="0"/>
+              </a:rPr>
+              <a:t> 그림자와 반사면이 </a:t>
+            </a:r>
+            <a:r>
+              <a:rPr lang="ko-KR" sz="1800">
+                <a:latin typeface="맑은 고딕" charset="0"/>
+                <a:ea typeface="맑은 고딕" charset="0"/>
+              </a:rPr>
+              <a:t>고정되어</a:t>
+            </a:r>
+            <a:r>
+              <a:rPr lang="ko-KR" sz="1800">
+                <a:latin typeface="맑은 고딕" charset="0"/>
+                <a:ea typeface="맑은 고딕" charset="0"/>
+              </a:rPr>
+              <a:t> </a:t>
+            </a:r>
+            <a:r>
+              <a:rPr lang="ko-KR" sz="1800">
+                <a:latin typeface="맑은 고딕" charset="0"/>
+                <a:ea typeface="맑은 고딕" charset="0"/>
+              </a:rPr>
+              <a:t>있는</a:t>
+            </a:r>
+            <a:r>
+              <a:rPr lang="ko-KR" sz="1800">
+                <a:latin typeface="맑은 고딕" charset="0"/>
+                <a:ea typeface="맑은 고딕" charset="0"/>
+              </a:rPr>
+              <a:t> 형태로 설정됩니다.</a:t>
+            </a:r>
+            <a:endParaRPr lang="ko-KR" altLang="en-US" sz="1800">
               <a:latin typeface="맑은 고딕" charset="0"/>
               <a:ea typeface="맑은 고딕" charset="0"/>
             </a:endParaRPr>
           </a:p>
-          <a:p>
-            <a:pPr marL="0" indent="0" algn="l" latinLnBrk="0" hangingPunct="1">
-              <a:buFontTx/>
-              <a:buNone/>
-            </a:pPr>
-            <a:r>
-              <a:rPr lang="ko-KR" sz="1800" i="0" b="0">
-                <a:solidFill>
-                  <a:schemeClr val="tx1"/>
-                </a:solidFill>
-                <a:latin typeface="맑은 고딕" charset="0"/>
-                <a:ea typeface="맑은 고딕" charset="0"/>
-              </a:rPr>
-              <a:t>게임 내의 동적 오브젝트들이 빛에 대해 발생하는 연산을 줄이기 위해 실시간으로 빛을 처리하지 않고, 사전에 배치한 빛의 정보 값을 저장하여 처리합니다.</a:t>
-            </a:r>
-            <a:endParaRPr lang="ko-KR" altLang="en-US" sz="1800" i="0" b="0">
-              <a:solidFill>
-                <a:schemeClr val="tx1"/>
-              </a:solidFill>
+        </p:txBody>
+      </p:sp>
+      <p:pic>
+        <p:nvPicPr>
+          <p:cNvPr id="1207" name="그림 29" descr="C:/Users/Admin1/AppData/Roaming/PolarisOffice/ETemp/26564_9303048/fImage2270692959358.png"/>
+          <p:cNvPicPr>
+            <a:picLocks noChangeAspect="1"/>
+          </p:cNvPicPr>
+          <p:nvPr/>
+        </p:nvPicPr>
+        <p:blipFill rotWithShape="1">
+          <a:blip r:embed="rId3" cstate="hqprint">
+            <a:extLst>
+              <a:ext uri="{28A0092B-C50C-407E-A947-70E740481C1C}">
+                <a14:useLocalDpi xmlns:a14="http://schemas.microsoft.com/office/drawing/2010/main"/>
+              </a:ext>
+            </a:extLst>
+          </a:blip>
+          <a:stretch>
+            <a:fillRect/>
+          </a:stretch>
+        </p:blipFill>
+        <p:spPr>
+          <a:xfrm rot="0">
+            <a:off x="6850380" y="2548890"/>
+            <a:ext cx="4107180" cy="2516505"/>
+          </a:xfrm>
+          <a:prstGeom prst="roundRect"/>
+          <a:solidFill>
+            <a:srgbClr val="EDEDED"/>
+          </a:solidFill>
+        </p:spPr>
+      </p:pic>
+      <p:sp>
+        <p:nvSpPr>
+          <p:cNvPr id="1208" name="텍스트 상자 25"/>
+          <p:cNvSpPr txBox="1">
+            <a:spLocks/>
+          </p:cNvSpPr>
+          <p:nvPr/>
+        </p:nvSpPr>
+        <p:spPr>
+          <a:xfrm rot="0">
+            <a:off x="6847840" y="1445260"/>
+            <a:ext cx="4109720" cy="923925"/>
+          </a:xfrm>
+          <a:prstGeom prst="rect"/>
+          <a:noFill/>
+          <a:ln w="0">
+            <a:noFill/>
+            <a:prstDash/>
+          </a:ln>
+        </p:spPr>
+        <p:txBody>
+          <a:bodyPr wrap="square" lIns="89535" tIns="46355" rIns="89535" bIns="46355" numCol="1" vert="horz" anchor="t">
+            <a:spAutoFit/>
+          </a:bodyPr>
+          <a:lstStyle/>
+          <a:p>
+            <a:pPr marL="0" indent="0" rtl="0" algn="l" defTabSz="914400" eaLnBrk="1" latinLnBrk="0" hangingPunct="1">
+              <a:buFontTx/>
+              <a:buNone/>
+            </a:pPr>
+            <a:r>
+              <a:rPr lang="ko-KR" sz="1800">
+                <a:latin typeface="맑은 고딕" charset="0"/>
+                <a:ea typeface="맑은 고딕" charset="0"/>
+              </a:rPr>
+              <a:t>라이트</a:t>
+            </a:r>
+            <a:r>
+              <a:rPr lang="ko-KR" sz="1800">
+                <a:latin typeface="맑은 고딕" charset="0"/>
+                <a:ea typeface="맑은 고딕" charset="0"/>
+              </a:rPr>
+              <a:t> 맵은 실시간으로 생성되는 </a:t>
+            </a:r>
+            <a:r>
+              <a:rPr lang="ko-KR" sz="1800">
+                <a:latin typeface="맑은 고딕" charset="0"/>
+                <a:ea typeface="맑은 고딕" charset="0"/>
+              </a:rPr>
+              <a:t>빛에</a:t>
+            </a:r>
+            <a:r>
+              <a:rPr lang="ko-KR" sz="1800">
+                <a:latin typeface="맑은 고딕" charset="0"/>
+                <a:ea typeface="맑은 고딕" charset="0"/>
+              </a:rPr>
+              <a:t> </a:t>
+            </a:r>
+            <a:r>
+              <a:rPr lang="ko-KR" sz="1800">
+                <a:latin typeface="맑은 고딕" charset="0"/>
+                <a:ea typeface="맑은 고딕" charset="0"/>
+              </a:rPr>
+              <a:t>대한</a:t>
+            </a:r>
+            <a:r>
+              <a:rPr lang="ko-KR" sz="1800">
+                <a:latin typeface="맑은 고딕" charset="0"/>
+                <a:ea typeface="맑은 고딕" charset="0"/>
+              </a:rPr>
+              <a:t> 정보를 한 번에 저장한 </a:t>
+            </a:r>
+            <a:r>
+              <a:rPr lang="ko-KR" sz="1800">
+                <a:latin typeface="맑은 고딕" charset="0"/>
+                <a:ea typeface="맑은 고딕" charset="0"/>
+              </a:rPr>
+              <a:t>텍스처입니다.</a:t>
+            </a:r>
+            <a:endParaRPr lang="ko-KR" altLang="en-US" sz="1800">
               <a:latin typeface="맑은 고딕" charset="0"/>
               <a:ea typeface="맑은 고딕" charset="0"/>
             </a:endParaRPr>
           </a:p>
+        </p:txBody>
+      </p:sp>
+      <p:pic>
+        <p:nvPicPr>
+          <p:cNvPr id="1209" name="그림 26" descr="C:/Users/Admin1/AppData/Roaming/PolarisOffice/ETemp/26564_9303048/fImage292962919169.png"/>
+          <p:cNvPicPr>
+            <a:picLocks noChangeAspect="1"/>
+          </p:cNvPicPr>
+          <p:nvPr/>
+        </p:nvPicPr>
+        <p:blipFill rotWithShape="1">
+          <a:blip r:embed="rId6" cstate="print">
+            <a:extLst>
+              <a:ext uri="{28A0092B-C50C-407E-A947-70E740481C1C}">
+                <a14:useLocalDpi xmlns:a14="http://schemas.microsoft.com/office/drawing/2010/main" val="0"/>
+              </a:ext>
+            </a:extLst>
+          </a:blip>
+          <a:stretch>
+            <a:fillRect/>
+          </a:stretch>
+        </p:blipFill>
+        <p:spPr>
+          <a:xfrm rot="0">
+            <a:off x="1240155" y="1447165"/>
+            <a:ext cx="4135755" cy="3359785"/>
+          </a:xfrm>
+          <a:prstGeom prst="roundRect"/>
+          <a:solidFill>
+            <a:srgbClr val="EDEDED"/>
+          </a:solidFill>
+        </p:spPr>
+      </p:pic>
+      <p:sp>
+        <p:nvSpPr>
+          <p:cNvPr id="1210" name="텍스트 상자 29"/>
+          <p:cNvSpPr txBox="1">
+            <a:spLocks/>
+          </p:cNvSpPr>
+          <p:nvPr/>
+        </p:nvSpPr>
+        <p:spPr>
+          <a:xfrm rot="0">
+            <a:off x="1249045" y="4991735"/>
+            <a:ext cx="4126865" cy="1231265"/>
+          </a:xfrm>
+          <a:prstGeom prst="rect"/>
+          <a:noFill/>
+          <a:ln w="0">
+            <a:noFill/>
+            <a:prstDash/>
+          </a:ln>
+        </p:spPr>
+        <p:txBody>
+          <a:bodyPr wrap="square" lIns="89535" tIns="46355" rIns="89535" bIns="46355" numCol="1" vert="horz" anchor="t">
+            <a:spAutoFit/>
+          </a:bodyPr>
+          <a:lstStyle/>
           <a:p>
             <a:pPr marL="0" indent="0" algn="l" latinLnBrk="0" hangingPunct="1">
               <a:buFontTx/>
               <a:buNone/>
             </a:pPr>
-            <a:endParaRPr lang="ko-KR" altLang="en-US" sz="1800" i="0" b="0">
-              <a:solidFill>
-                <a:schemeClr val="tx1"/>
-              </a:solidFill>
+            <a:r>
+              <a:rPr lang="ko-KR" sz="2000" b="1">
+                <a:solidFill>
+                  <a:srgbClr val="0611F2"/>
+                </a:solidFill>
+                <a:latin typeface="맑은 고딕" charset="0"/>
+                <a:ea typeface="맑은 고딕" charset="0"/>
+              </a:rPr>
+              <a:t>31.</a:t>
+            </a:r>
+            <a:r>
+              <a:rPr lang="ko-KR" sz="2000" b="1">
+                <a:solidFill>
+                  <a:srgbClr val="0611F2"/>
+                </a:solidFill>
+                <a:latin typeface="맑은 고딕" charset="0"/>
+                <a:ea typeface="맑은 고딕" charset="0"/>
+              </a:rPr>
+              <a:t> </a:t>
+            </a:r>
+            <a:r>
+              <a:rPr lang="ko-KR" sz="1800">
+                <a:latin typeface="맑은 고딕" charset="0"/>
+                <a:ea typeface="맑은 고딕" charset="0"/>
+              </a:rPr>
+              <a:t>그러고 나서 Robot 오브젝트의 </a:t>
+            </a:r>
+            <a:r>
+              <a:rPr lang="ko-KR" sz="1800">
+                <a:latin typeface="맑은 고딕" charset="0"/>
+                <a:ea typeface="맑은 고딕" charset="0"/>
+              </a:rPr>
+              <a:t>Contribute</a:t>
+            </a:r>
+            <a:r>
+              <a:rPr lang="ko-KR" sz="1800">
+                <a:latin typeface="맑은 고딕" charset="0"/>
+                <a:ea typeface="맑은 고딕" charset="0"/>
+              </a:rPr>
+              <a:t> Global IIIumination을 </a:t>
+            </a:r>
+            <a:r>
+              <a:rPr lang="ko-KR" sz="1800">
+                <a:latin typeface="맑은 고딕" charset="0"/>
+                <a:ea typeface="맑은 고딕" charset="0"/>
+              </a:rPr>
+              <a:t>활성화한</a:t>
+            </a:r>
+            <a:r>
+              <a:rPr lang="ko-KR" sz="1800">
+                <a:latin typeface="맑은 고딕" charset="0"/>
+                <a:ea typeface="맑은 고딕" charset="0"/>
+              </a:rPr>
+              <a:t> </a:t>
+            </a:r>
+            <a:r>
+              <a:rPr lang="ko-KR" sz="1800">
+                <a:latin typeface="맑은 고딕" charset="0"/>
+                <a:ea typeface="맑은 고딕" charset="0"/>
+              </a:rPr>
+              <a:t>다음</a:t>
+            </a:r>
+            <a:r>
+              <a:rPr lang="ko-KR" sz="1800">
+                <a:latin typeface="맑은 고딕" charset="0"/>
+                <a:ea typeface="맑은 고딕" charset="0"/>
+              </a:rPr>
+              <a:t> </a:t>
+            </a:r>
+            <a:r>
+              <a:rPr lang="ko-KR" sz="1800">
+                <a:latin typeface="맑은 고딕" charset="0"/>
+                <a:ea typeface="맑은 고딕" charset="0"/>
+              </a:rPr>
+              <a:t>Light Probes를 </a:t>
+            </a:r>
+            <a:r>
+              <a:rPr lang="ko-KR" sz="1800">
+                <a:latin typeface="맑은 고딕" charset="0"/>
+                <a:ea typeface="맑은 고딕" charset="0"/>
+              </a:rPr>
+              <a:t>설정합니</a:t>
+            </a:r>
+            <a:r>
+              <a:rPr lang="ko-KR" sz="1800">
+                <a:latin typeface="맑은 고딕" charset="0"/>
+                <a:ea typeface="맑은 고딕" charset="0"/>
+              </a:rPr>
+              <a:t>다.</a:t>
+            </a:r>
+            <a:endParaRPr lang="ko-KR" altLang="en-US" sz="1800">
               <a:latin typeface="맑은 고딕" charset="0"/>
               <a:ea typeface="맑은 고딕" charset="0"/>
             </a:endParaRPr>
           </a:p>
-          <a:p>
-            <a:pPr marL="0" indent="0" algn="l" latinLnBrk="0" hangingPunct="1">
-              <a:buFontTx/>
-              <a:buNone/>
-            </a:pPr>
-            <a:r>
-              <a:rPr lang="ko-KR" sz="1800" i="0" b="0">
+        </p:txBody>
+      </p:sp>
+    </p:spTree>
+  </p:cSld>
+  <p:clrMapOvr>
+    <a:masterClrMapping/>
+  </p:clrMapOvr>
+  <mc:AlternateContent xmlns:mc="http://schemas.openxmlformats.org/markup-compatibility/2006">
+    <mc:Choice xmlns:p14="http://schemas.microsoft.com/office/powerpoint/2010/main" Requires="p14">
+      <p:transition spd="slow" p14:dur="2000"/>
+    </mc:Choice>
+    <mc:Fallback>
+      <p:transition spd="slow"/>
+    </mc:Fallback>
+  </mc:AlternateContent>
+  <p:timing>
+    <p:tnLst>
+      <p:par>
+        <p:cTn id="1" dur="indefinite" restart="never" nodeType="tmRoot"/>
+      </p:par>
+    </p:tnLst>
+  </p:timing>
+</p:sld>
+</file>
+
+<file path=ppt/slides/slide13.xml><?xml version="1.0" encoding="utf-8"?>
+<p:sld xmlns:a="http://schemas.openxmlformats.org/drawingml/2006/main" xmlns:r="http://schemas.openxmlformats.org/officeDocument/2006/relationships" xmlns:p="http://schemas.openxmlformats.org/presentationml/2006/main" xmlns:p14="http://schemas.microsoft.com/office/powerpoint/2010/main">
+  <p:cSld>
+    <p:spTree>
+      <p:nvGrpSpPr>
+        <p:cNvPr id="1" name=""/>
+        <p:cNvGrpSpPr/>
+        <p:nvPr/>
+      </p:nvGrpSpPr>
+      <p:grpSpPr>
+        <a:xfrm>
+          <a:off x="0" y="0"/>
+          <a:ext cx="0" cy="0"/>
+          <a:chOff x="0" y="0"/>
+          <a:chExt cx="0" cy="0"/>
+        </a:xfrm>
+      </p:grpSpPr>
+      <p:sp>
+        <p:nvSpPr>
+          <p:cNvPr id="1031" name="Rect 0"/>
+          <p:cNvSpPr txBox="1">
+            <a:spLocks/>
+          </p:cNvSpPr>
+          <p:nvPr/>
+        </p:nvSpPr>
+        <p:spPr>
+          <a:xfrm>
+            <a:off x="4110990" y="327660"/>
+            <a:ext cx="3987165" cy="478155"/>
+          </a:xfrm>
+          <a:prstGeom prst="rect"/>
+          <a:noFill/>
+          <a:ln w="0">
+            <a:noFill/>
+            <a:prstDash/>
+          </a:ln>
+        </p:spPr>
+        <p:txBody>
+          <a:bodyPr wrap="square" lIns="89535" tIns="46355" rIns="89535" bIns="46355" numCol="1" vert="horz" anchor="t">
+            <a:spAutoFit/>
+          </a:bodyPr>
+          <a:lstStyle/>
+          <a:p>
+            <a:pPr marL="0" indent="0" algn="ctr" latinLnBrk="0">
+              <a:buFontTx/>
+              <a:buNone/>
+            </a:pPr>
+            <a:r>
+              <a:rPr lang="ko-KR" altLang="en-US" sz="2500" b="1">
                 <a:solidFill>
                   <a:schemeClr val="tx1"/>
                 </a:solidFill>
-                <a:latin typeface="맑은 고딕" charset="0"/>
-                <a:ea typeface="맑은 고딕" charset="0"/>
-              </a:rPr>
-              <a:t>그리고 프로브라고 하는 구체에 저장시켜 구현에 필요한 연산만 처리하는 기능입니다.					</a:t>
-            </a:r>
-            <a:endParaRPr lang="ko-KR" altLang="en-US" sz="1800">
+                <a:latin typeface="나눔바른고딕" charset="0"/>
+                <a:ea typeface="나눔바른고딕" charset="0"/>
+              </a:rPr>
+              <a:t>열다섯</a:t>
+            </a:r>
+            <a:r>
+              <a:rPr lang="ko-KR" altLang="en-US" sz="2500" b="1">
+                <a:solidFill>
+                  <a:schemeClr val="tx1"/>
+                </a:solidFill>
+                <a:latin typeface="나눔바른고딕" charset="0"/>
+                <a:ea typeface="나눔바른고딕" charset="0"/>
+              </a:rPr>
+              <a:t> </a:t>
+            </a:r>
+            <a:r>
+              <a:rPr lang="ko-KR" altLang="en-US" sz="2500" b="1">
+                <a:solidFill>
+                  <a:schemeClr val="tx1"/>
+                </a:solidFill>
+                <a:latin typeface="나눔바른고딕" charset="0"/>
+                <a:ea typeface="나눔바른고딕" charset="0"/>
+              </a:rPr>
+              <a:t>번째 튜토리</a:t>
+            </a:r>
+            <a:r>
+              <a:rPr lang="ko-KR" altLang="en-US" sz="2500" b="1">
+                <a:solidFill>
+                  <a:schemeClr val="tx1"/>
+                </a:solidFill>
+                <a:latin typeface="나눔바른고딕" charset="0"/>
+                <a:ea typeface="나눔바른고딕" charset="0"/>
+              </a:rPr>
+              <a:t>얼</a:t>
+            </a:r>
+            <a:endParaRPr lang="ko-KR" altLang="en-US" sz="3000" b="1">
               <a:solidFill>
                 <a:schemeClr val="tx1"/>
               </a:solidFill>
@@ -8004,8 +10005,8 @@
         </p:nvSpPr>
         <p:spPr>
           <a:xfrm rot="0">
-            <a:off x="1227455" y="5584825"/>
-            <a:ext cx="4147185" cy="647065"/>
+            <a:off x="6835140" y="5490845"/>
+            <a:ext cx="4130675" cy="647065"/>
           </a:xfrm>
           <a:prstGeom prst="rect"/>
           <a:noFill/>
@@ -8046,7 +10047,56 @@
                 <a:latin typeface="맑은 고딕" charset="0"/>
                 <a:ea typeface="맑은 고딕" charset="0"/>
               </a:rPr>
-              <a:t>이제 Light Probe Visualization에서 Generate Lighting을 선택합니다.</a:t>
+              <a:t>마지막으로 Scene</a:t>
+            </a:r>
+            <a:r>
+              <a:rPr lang="ko-KR" sz="1800">
+                <a:latin typeface="맑은 고딕" charset="0"/>
+                <a:ea typeface="맑은 고딕" charset="0"/>
+              </a:rPr>
+              <a:t>에서</a:t>
+            </a:r>
+            <a:r>
+              <a:rPr lang="ko-KR" sz="1800">
+                <a:latin typeface="맑은 고딕" charset="0"/>
+                <a:ea typeface="맑은 고딕" charset="0"/>
+              </a:rPr>
+              <a:t> </a:t>
+            </a:r>
+            <a:r>
+              <a:rPr lang="ko-KR" sz="1800">
+                <a:latin typeface="맑은 고딕" charset="0"/>
+                <a:ea typeface="맑은 고딕" charset="0"/>
+              </a:rPr>
+              <a:t>Generate</a:t>
+            </a:r>
+            <a:r>
+              <a:rPr lang="ko-KR" sz="1800">
+                <a:latin typeface="맑은 고딕" charset="0"/>
+                <a:ea typeface="맑은 고딕" charset="0"/>
+              </a:rPr>
+              <a:t> </a:t>
+            </a:r>
+            <a:r>
+              <a:rPr lang="ko-KR" sz="1800">
+                <a:latin typeface="맑은 고딕" charset="0"/>
+                <a:ea typeface="맑은 고딕" charset="0"/>
+              </a:rPr>
+              <a:t>Lighting을</a:t>
+            </a:r>
+            <a:r>
+              <a:rPr lang="ko-KR" sz="1800">
+                <a:latin typeface="맑은 고딕" charset="0"/>
+                <a:ea typeface="맑은 고딕" charset="0"/>
+              </a:rPr>
+              <a:t> </a:t>
+            </a:r>
+            <a:r>
+              <a:rPr lang="ko-KR" sz="1800">
+                <a:latin typeface="맑은 고딕" charset="0"/>
+                <a:ea typeface="맑은 고딕" charset="0"/>
+              </a:rPr>
+              <a:t>선택합니다.</a:t>
             </a:r>
             <a:endParaRPr lang="ko-KR" altLang="en-US" sz="1800">
               <a:latin typeface="맑은 고딕" charset="0"/>
@@ -8057,7 +10107,7 @@
       </p:sp>
       <p:pic>
         <p:nvPicPr>
-          <p:cNvPr id="1056" name="그림 4"/>
+          <p:cNvPr id="1056" name="그림 4" descr="C:/Users/Admin1/AppData/Roaming/PolarisOffice/ETemp/26564_9303048/fImage358712941478.png"/>
           <p:cNvPicPr>
             <a:picLocks noChangeAspect="1"/>
           </p:cNvPicPr>
@@ -8077,23 +10127,25 @@
         </p:blipFill>
         <p:spPr>
           <a:xfrm rot="0">
-            <a:off x="1228090" y="1271270"/>
-            <a:ext cx="4133850" cy="4174490"/>
-          </a:xfrm>
-          <a:prstGeom prst="rect"/>
-          <a:noFill/>
+            <a:off x="6830695" y="1430020"/>
+            <a:ext cx="4126865" cy="3815715"/>
+          </a:xfrm>
+          <a:prstGeom prst="roundRect"/>
+          <a:solidFill>
+            <a:srgbClr val="EDEDED"/>
+          </a:solidFill>
         </p:spPr>
       </p:pic>
       <p:pic>
         <p:nvPicPr>
-          <p:cNvPr id="1058" name="그림 10" descr="C:/Users/Admin1/AppData/Roaming/PolarisOffice/ETemp/21928_10791808/fImage24803535741.png"/>
+          <p:cNvPr id="1057" name="그림 19" descr="C:/Users/Admin1/AppData/Roaming/PolarisOffice/ETemp/26564_9303048/fImage211388841.png"/>
           <p:cNvPicPr>
             <a:picLocks noChangeAspect="1"/>
           </p:cNvPicPr>
           <p:nvPr/>
         </p:nvPicPr>
         <p:blipFill rotWithShape="1">
-          <a:blip r:embed="rId3" cstate="hqprint">
+          <a:blip r:embed="rId5" cstate="hqprint">
             <a:extLst>
               <a:ext uri="{28A0092B-C50C-407E-A947-70E740481C1C}">
                 <a14:useLocalDpi xmlns:a14="http://schemas.microsoft.com/office/drawing/2010/main"/>
@@ -8106,8 +10158,8 @@
         </p:blipFill>
         <p:spPr>
           <a:xfrm rot="0">
-            <a:off x="6824980" y="1271905"/>
-            <a:ext cx="4248785" cy="2178685"/>
+            <a:off x="1240790" y="1438275"/>
+            <a:ext cx="4117975" cy="3532505"/>
           </a:xfrm>
           <a:prstGeom prst="roundRect"/>
           <a:solidFill>
@@ -8115,6 +10167,122 @@
           </a:solidFill>
         </p:spPr>
       </p:pic>
+      <p:sp>
+        <p:nvSpPr>
+          <p:cNvPr id="1058" name="텍스트 상자 20"/>
+          <p:cNvSpPr txBox="1">
+            <a:spLocks/>
+          </p:cNvSpPr>
+          <p:nvPr/>
+        </p:nvSpPr>
+        <p:spPr>
+          <a:xfrm rot="0">
+            <a:off x="1252220" y="5225415"/>
+            <a:ext cx="4115435" cy="908685"/>
+          </a:xfrm>
+          <a:prstGeom prst="rect"/>
+          <a:noFill/>
+        </p:spPr>
+        <p:txBody>
+          <a:bodyPr wrap="square" lIns="0" tIns="0" rIns="0" bIns="0" numCol="1" vert="horz" anchor="t">
+            <a:noAutofit/>
+          </a:bodyPr>
+          <a:lstStyle/>
+          <a:p>
+            <a:pPr marL="0" indent="0" algn="l" latinLnBrk="0" hangingPunct="1">
+              <a:buFontTx/>
+              <a:buNone/>
+            </a:pPr>
+            <a:r>
+              <a:rPr lang="ko-KR" sz="2000" b="1">
+                <a:solidFill>
+                  <a:srgbClr val="0611F2"/>
+                </a:solidFill>
+                <a:latin typeface="맑은 고딕" charset="0"/>
+                <a:ea typeface="맑은 고딕" charset="0"/>
+              </a:rPr>
+              <a:t>44.</a:t>
+            </a:r>
+            <a:r>
+              <a:rPr lang="ko-KR" sz="2000" b="1">
+                <a:solidFill>
+                  <a:srgbClr val="0611F2"/>
+                </a:solidFill>
+                <a:latin typeface="맑은 고딕" charset="0"/>
+                <a:ea typeface="맑은 고딕" charset="0"/>
+              </a:rPr>
+              <a:t> </a:t>
+            </a:r>
+            <a:r>
+              <a:rPr lang="ko-KR" sz="1800">
+                <a:latin typeface="맑은 고딕" charset="0"/>
+                <a:ea typeface="맑은 고딕" charset="0"/>
+              </a:rPr>
+              <a:t>그런 다음 Window에서 </a:t>
+            </a:r>
+            <a:r>
+              <a:rPr lang="ko-KR" sz="1800">
+                <a:latin typeface="맑은 고딕" charset="0"/>
+                <a:ea typeface="맑은 고딕" charset="0"/>
+              </a:rPr>
+              <a:t>Rendering을</a:t>
+            </a:r>
+            <a:r>
+              <a:rPr lang="ko-KR" sz="1800">
+                <a:latin typeface="맑은 고딕" charset="0"/>
+                <a:ea typeface="맑은 고딕" charset="0"/>
+              </a:rPr>
+              <a:t> </a:t>
+            </a:r>
+            <a:r>
+              <a:rPr lang="ko-KR" sz="1800">
+                <a:latin typeface="맑은 고딕" charset="0"/>
+                <a:ea typeface="맑은 고딕" charset="0"/>
+              </a:rPr>
+              <a:t>선택하고</a:t>
+            </a:r>
+            <a:r>
+              <a:rPr lang="ko-KR" sz="1800">
+                <a:latin typeface="맑은 고딕" charset="0"/>
+                <a:ea typeface="맑은 고딕" charset="0"/>
+              </a:rPr>
+              <a:t> Lighting </a:t>
+            </a:r>
+            <a:r>
+              <a:rPr lang="ko-KR" sz="1800">
+                <a:latin typeface="맑은 고딕" charset="0"/>
+                <a:ea typeface="맑은 고딕" charset="0"/>
+              </a:rPr>
+              <a:t>Settings를</a:t>
+            </a:r>
+            <a:r>
+              <a:rPr lang="ko-KR" sz="1800">
+                <a:latin typeface="맑은 고딕" charset="0"/>
+                <a:ea typeface="맑은 고딕" charset="0"/>
+              </a:rPr>
+              <a:t> </a:t>
+            </a:r>
+            <a:r>
+              <a:rPr lang="ko-KR" sz="1800">
+                <a:latin typeface="맑은 고딕" charset="0"/>
+                <a:ea typeface="맑은 고딕" charset="0"/>
+              </a:rPr>
+              <a:t>선택합니다.</a:t>
+            </a:r>
+            <a:r>
+              <a:rPr lang="ko-KR" sz="1800">
+                <a:latin typeface="맑은 고딕" charset="0"/>
+                <a:ea typeface="맑은 고딕" charset="0"/>
+              </a:rPr>
+              <a:t> </a:t>
+            </a:r>
+            <a:endParaRPr lang="ko-KR" altLang="en-US" sz="1800">
+              <a:latin typeface="맑은 고딕" charset="0"/>
+              <a:ea typeface="맑은 고딕" charset="0"/>
+            </a:endParaRPr>
+          </a:p>
+        </p:txBody>
+      </p:sp>
     </p:spTree>
   </p:cSld>
   <p:clrMapOvr>

</xml_diff>